<commit_message>
New wing landmarks images for ppt
</commit_message>
<xml_diff>
--- a/Wing figures and images/Wing images.pptx
+++ b/Wing figures and images/Wing images.pptx
@@ -8,6 +8,8 @@
     <p:sldId id="256" r:id="rId2"/>
     <p:sldId id="257" r:id="rId3"/>
     <p:sldId id="258" r:id="rId4"/>
+    <p:sldId id="259" r:id="rId5"/>
+    <p:sldId id="260" r:id="rId6"/>
   </p:sldIdLst>
   <p:sldSz cx="12192000" cy="6858000"/>
   <p:notesSz cx="6858000" cy="9144000"/>
@@ -247,7 +249,7 @@
           <a:p>
             <a:fld id="{B012F8CE-8D55-49DF-A366-11CAB4E48BBF}" type="datetimeFigureOut">
               <a:rPr lang="en-US" smtClean="0"/>
-              <a:t>8/17/2017</a:t>
+              <a:t>8/25/2017</a:t>
             </a:fld>
             <a:endParaRPr lang="en-US"/>
           </a:p>
@@ -415,7 +417,7 @@
           <a:p>
             <a:fld id="{B012F8CE-8D55-49DF-A366-11CAB4E48BBF}" type="datetimeFigureOut">
               <a:rPr lang="en-US" smtClean="0"/>
-              <a:t>8/17/2017</a:t>
+              <a:t>8/25/2017</a:t>
             </a:fld>
             <a:endParaRPr lang="en-US"/>
           </a:p>
@@ -593,7 +595,7 @@
           <a:p>
             <a:fld id="{B012F8CE-8D55-49DF-A366-11CAB4E48BBF}" type="datetimeFigureOut">
               <a:rPr lang="en-US" smtClean="0"/>
-              <a:t>8/17/2017</a:t>
+              <a:t>8/25/2017</a:t>
             </a:fld>
             <a:endParaRPr lang="en-US"/>
           </a:p>
@@ -761,7 +763,7 @@
           <a:p>
             <a:fld id="{B012F8CE-8D55-49DF-A366-11CAB4E48BBF}" type="datetimeFigureOut">
               <a:rPr lang="en-US" smtClean="0"/>
-              <a:t>8/17/2017</a:t>
+              <a:t>8/25/2017</a:t>
             </a:fld>
             <a:endParaRPr lang="en-US"/>
           </a:p>
@@ -1006,7 +1008,7 @@
           <a:p>
             <a:fld id="{B012F8CE-8D55-49DF-A366-11CAB4E48BBF}" type="datetimeFigureOut">
               <a:rPr lang="en-US" smtClean="0"/>
-              <a:t>8/17/2017</a:t>
+              <a:t>8/25/2017</a:t>
             </a:fld>
             <a:endParaRPr lang="en-US"/>
           </a:p>
@@ -1235,7 +1237,7 @@
           <a:p>
             <a:fld id="{B012F8CE-8D55-49DF-A366-11CAB4E48BBF}" type="datetimeFigureOut">
               <a:rPr lang="en-US" smtClean="0"/>
-              <a:t>8/17/2017</a:t>
+              <a:t>8/25/2017</a:t>
             </a:fld>
             <a:endParaRPr lang="en-US"/>
           </a:p>
@@ -1599,7 +1601,7 @@
           <a:p>
             <a:fld id="{B012F8CE-8D55-49DF-A366-11CAB4E48BBF}" type="datetimeFigureOut">
               <a:rPr lang="en-US" smtClean="0"/>
-              <a:t>8/17/2017</a:t>
+              <a:t>8/25/2017</a:t>
             </a:fld>
             <a:endParaRPr lang="en-US"/>
           </a:p>
@@ -1716,7 +1718,7 @@
           <a:p>
             <a:fld id="{B012F8CE-8D55-49DF-A366-11CAB4E48BBF}" type="datetimeFigureOut">
               <a:rPr lang="en-US" smtClean="0"/>
-              <a:t>8/17/2017</a:t>
+              <a:t>8/25/2017</a:t>
             </a:fld>
             <a:endParaRPr lang="en-US"/>
           </a:p>
@@ -1811,7 +1813,7 @@
           <a:p>
             <a:fld id="{B012F8CE-8D55-49DF-A366-11CAB4E48BBF}" type="datetimeFigureOut">
               <a:rPr lang="en-US" smtClean="0"/>
-              <a:t>8/17/2017</a:t>
+              <a:t>8/25/2017</a:t>
             </a:fld>
             <a:endParaRPr lang="en-US"/>
           </a:p>
@@ -2086,7 +2088,7 @@
           <a:p>
             <a:fld id="{B012F8CE-8D55-49DF-A366-11CAB4E48BBF}" type="datetimeFigureOut">
               <a:rPr lang="en-US" smtClean="0"/>
-              <a:t>8/17/2017</a:t>
+              <a:t>8/25/2017</a:t>
             </a:fld>
             <a:endParaRPr lang="en-US"/>
           </a:p>
@@ -2338,7 +2340,7 @@
           <a:p>
             <a:fld id="{B012F8CE-8D55-49DF-A366-11CAB4E48BBF}" type="datetimeFigureOut">
               <a:rPr lang="en-US" smtClean="0"/>
-              <a:t>8/17/2017</a:t>
+              <a:t>8/25/2017</a:t>
             </a:fld>
             <a:endParaRPr lang="en-US"/>
           </a:p>
@@ -2549,7 +2551,7 @@
           <a:p>
             <a:fld id="{B012F8CE-8D55-49DF-A366-11CAB4E48BBF}" type="datetimeFigureOut">
               <a:rPr lang="en-US" smtClean="0"/>
-              <a:t>8/17/2017</a:t>
+              <a:t>8/25/2017</a:t>
             </a:fld>
             <a:endParaRPr lang="en-US"/>
           </a:p>
@@ -3101,14 +3103,536 @@
       </p:sp>
       <p:sp>
         <p:nvSpPr>
-          <p:cNvPr id="12" name="Oval 11"/>
+          <p:cNvPr id="30" name="TextBox 29"/>
+          <p:cNvSpPr txBox="1"/>
+          <p:nvPr/>
+        </p:nvSpPr>
+        <p:spPr>
+          <a:xfrm>
+            <a:off x="5528945" y="3304042"/>
+            <a:ext cx="388620" cy="230832"/>
+          </a:xfrm>
+          <a:prstGeom prst="rect">
+            <a:avLst/>
+          </a:prstGeom>
+          <a:noFill/>
+        </p:spPr>
+        <p:txBody>
+          <a:bodyPr wrap="square" rtlCol="0">
+            <a:spAutoFit/>
+          </a:bodyPr>
+          <a:lstStyle/>
+          <a:p>
+            <a:r>
+              <a:rPr lang="en-US" sz="900" b="1" dirty="0"/>
+              <a:t>1</a:t>
+            </a:r>
+          </a:p>
+        </p:txBody>
+      </p:sp>
+      <p:sp>
+        <p:nvSpPr>
+          <p:cNvPr id="32" name="TextBox 31"/>
+          <p:cNvSpPr txBox="1"/>
+          <p:nvPr/>
+        </p:nvSpPr>
+        <p:spPr>
+          <a:xfrm>
+            <a:off x="5580415" y="3859185"/>
+            <a:ext cx="388620" cy="230832"/>
+          </a:xfrm>
+          <a:prstGeom prst="rect">
+            <a:avLst/>
+          </a:prstGeom>
+          <a:noFill/>
+        </p:spPr>
+        <p:txBody>
+          <a:bodyPr wrap="square" rtlCol="0">
+            <a:spAutoFit/>
+          </a:bodyPr>
+          <a:lstStyle/>
+          <a:p>
+            <a:r>
+              <a:rPr lang="en-US" sz="900" b="1" dirty="0"/>
+              <a:t>11</a:t>
+            </a:r>
+          </a:p>
+        </p:txBody>
+      </p:sp>
+      <p:sp>
+        <p:nvSpPr>
+          <p:cNvPr id="33" name="TextBox 32"/>
+          <p:cNvSpPr txBox="1"/>
+          <p:nvPr/>
+        </p:nvSpPr>
+        <p:spPr>
+          <a:xfrm>
+            <a:off x="6641104" y="4173844"/>
+            <a:ext cx="388620" cy="230832"/>
+          </a:xfrm>
+          <a:prstGeom prst="rect">
+            <a:avLst/>
+          </a:prstGeom>
+          <a:noFill/>
+        </p:spPr>
+        <p:txBody>
+          <a:bodyPr wrap="square" rtlCol="0">
+            <a:spAutoFit/>
+          </a:bodyPr>
+          <a:lstStyle/>
+          <a:p>
+            <a:r>
+              <a:rPr lang="en-US" sz="900" b="1" dirty="0"/>
+              <a:t>12</a:t>
+            </a:r>
+          </a:p>
+        </p:txBody>
+      </p:sp>
+      <p:sp>
+        <p:nvSpPr>
+          <p:cNvPr id="34" name="TextBox 33"/>
+          <p:cNvSpPr txBox="1"/>
+          <p:nvPr/>
+        </p:nvSpPr>
+        <p:spPr>
+          <a:xfrm>
+            <a:off x="6626212" y="3670657"/>
+            <a:ext cx="388620" cy="230832"/>
+          </a:xfrm>
+          <a:prstGeom prst="rect">
+            <a:avLst/>
+          </a:prstGeom>
+          <a:noFill/>
+        </p:spPr>
+        <p:txBody>
+          <a:bodyPr wrap="square" rtlCol="0">
+            <a:spAutoFit/>
+          </a:bodyPr>
+          <a:lstStyle/>
+          <a:p>
+            <a:r>
+              <a:rPr lang="en-US" sz="900" b="1" dirty="0"/>
+              <a:t>13</a:t>
+            </a:r>
+          </a:p>
+        </p:txBody>
+      </p:sp>
+      <p:sp>
+        <p:nvSpPr>
+          <p:cNvPr id="35" name="TextBox 34"/>
+          <p:cNvSpPr txBox="1"/>
+          <p:nvPr/>
+        </p:nvSpPr>
+        <p:spPr>
+          <a:xfrm>
+            <a:off x="7622140" y="4965188"/>
+            <a:ext cx="388620" cy="230832"/>
+          </a:xfrm>
+          <a:prstGeom prst="rect">
+            <a:avLst/>
+          </a:prstGeom>
+          <a:noFill/>
+        </p:spPr>
+        <p:txBody>
+          <a:bodyPr wrap="square" rtlCol="0">
+            <a:spAutoFit/>
+          </a:bodyPr>
+          <a:lstStyle/>
+          <a:p>
+            <a:r>
+              <a:rPr lang="en-US" sz="900" b="1" dirty="0"/>
+              <a:t>10</a:t>
+            </a:r>
+          </a:p>
+        </p:txBody>
+      </p:sp>
+      <p:sp>
+        <p:nvSpPr>
+          <p:cNvPr id="36" name="TextBox 35"/>
+          <p:cNvSpPr txBox="1"/>
+          <p:nvPr/>
+        </p:nvSpPr>
+        <p:spPr>
+          <a:xfrm>
+            <a:off x="7286616" y="4053648"/>
+            <a:ext cx="388620" cy="230832"/>
+          </a:xfrm>
+          <a:prstGeom prst="rect">
+            <a:avLst/>
+          </a:prstGeom>
+          <a:noFill/>
+        </p:spPr>
+        <p:txBody>
+          <a:bodyPr wrap="square" rtlCol="0">
+            <a:spAutoFit/>
+          </a:bodyPr>
+          <a:lstStyle/>
+          <a:p>
+            <a:r>
+              <a:rPr lang="en-US" sz="900" b="1" dirty="0"/>
+              <a:t>14</a:t>
+            </a:r>
+          </a:p>
+        </p:txBody>
+      </p:sp>
+      <p:sp>
+        <p:nvSpPr>
+          <p:cNvPr id="37" name="TextBox 36"/>
+          <p:cNvSpPr txBox="1"/>
+          <p:nvPr/>
+        </p:nvSpPr>
+        <p:spPr>
+          <a:xfrm>
+            <a:off x="7531135" y="2806048"/>
+            <a:ext cx="388620" cy="230832"/>
+          </a:xfrm>
+          <a:prstGeom prst="rect">
+            <a:avLst/>
+          </a:prstGeom>
+          <a:noFill/>
+        </p:spPr>
+        <p:txBody>
+          <a:bodyPr wrap="square" rtlCol="0">
+            <a:spAutoFit/>
+          </a:bodyPr>
+          <a:lstStyle/>
+          <a:p>
+            <a:r>
+              <a:rPr lang="en-US" sz="900" b="1" dirty="0"/>
+              <a:t>2</a:t>
+            </a:r>
+          </a:p>
+        </p:txBody>
+      </p:sp>
+      <p:sp>
+        <p:nvSpPr>
+          <p:cNvPr id="38" name="TextBox 37"/>
+          <p:cNvSpPr txBox="1"/>
+          <p:nvPr/>
+        </p:nvSpPr>
+        <p:spPr>
+          <a:xfrm>
+            <a:off x="7288363" y="3538541"/>
+            <a:ext cx="388620" cy="230832"/>
+          </a:xfrm>
+          <a:prstGeom prst="rect">
+            <a:avLst/>
+          </a:prstGeom>
+          <a:noFill/>
+        </p:spPr>
+        <p:txBody>
+          <a:bodyPr wrap="square" rtlCol="0">
+            <a:spAutoFit/>
+          </a:bodyPr>
+          <a:lstStyle/>
+          <a:p>
+            <a:r>
+              <a:rPr lang="en-US" sz="900" b="1" dirty="0"/>
+              <a:t>16</a:t>
+            </a:r>
+          </a:p>
+        </p:txBody>
+      </p:sp>
+      <p:sp>
+        <p:nvSpPr>
+          <p:cNvPr id="39" name="TextBox 38"/>
+          <p:cNvSpPr txBox="1"/>
+          <p:nvPr/>
+        </p:nvSpPr>
+        <p:spPr>
+          <a:xfrm>
+            <a:off x="7288363" y="3789705"/>
+            <a:ext cx="388620" cy="230832"/>
+          </a:xfrm>
+          <a:prstGeom prst="rect">
+            <a:avLst/>
+          </a:prstGeom>
+          <a:noFill/>
+        </p:spPr>
+        <p:txBody>
+          <a:bodyPr wrap="square" rtlCol="0">
+            <a:spAutoFit/>
+          </a:bodyPr>
+          <a:lstStyle/>
+          <a:p>
+            <a:r>
+              <a:rPr lang="en-US" sz="900" b="1" dirty="0"/>
+              <a:t>15</a:t>
+            </a:r>
+          </a:p>
+        </p:txBody>
+      </p:sp>
+      <p:sp>
+        <p:nvSpPr>
+          <p:cNvPr id="40" name="TextBox 39"/>
+          <p:cNvSpPr txBox="1"/>
+          <p:nvPr/>
+        </p:nvSpPr>
+        <p:spPr>
+          <a:xfrm>
+            <a:off x="7919755" y="3550759"/>
+            <a:ext cx="388620" cy="230832"/>
+          </a:xfrm>
+          <a:prstGeom prst="rect">
+            <a:avLst/>
+          </a:prstGeom>
+          <a:noFill/>
+        </p:spPr>
+        <p:txBody>
+          <a:bodyPr wrap="square" rtlCol="0">
+            <a:spAutoFit/>
+          </a:bodyPr>
+          <a:lstStyle/>
+          <a:p>
+            <a:r>
+              <a:rPr lang="en-US" sz="900" b="1" dirty="0"/>
+              <a:t>17</a:t>
+            </a:r>
+          </a:p>
+        </p:txBody>
+      </p:sp>
+      <p:sp>
+        <p:nvSpPr>
+          <p:cNvPr id="41" name="TextBox 40"/>
+          <p:cNvSpPr txBox="1"/>
+          <p:nvPr/>
+        </p:nvSpPr>
+        <p:spPr>
+          <a:xfrm>
+            <a:off x="8079775" y="4034856"/>
+            <a:ext cx="388620" cy="230832"/>
+          </a:xfrm>
+          <a:prstGeom prst="rect">
+            <a:avLst/>
+          </a:prstGeom>
+          <a:noFill/>
+        </p:spPr>
+        <p:txBody>
+          <a:bodyPr wrap="square" rtlCol="0">
+            <a:spAutoFit/>
+          </a:bodyPr>
+          <a:lstStyle/>
+          <a:p>
+            <a:r>
+              <a:rPr lang="en-US" sz="900" b="1" dirty="0"/>
+              <a:t>18</a:t>
+            </a:r>
+          </a:p>
+        </p:txBody>
+      </p:sp>
+      <p:sp>
+        <p:nvSpPr>
+          <p:cNvPr id="42" name="TextBox 41"/>
+          <p:cNvSpPr txBox="1"/>
+          <p:nvPr/>
+        </p:nvSpPr>
+        <p:spPr>
+          <a:xfrm>
+            <a:off x="10333346" y="3367244"/>
+            <a:ext cx="388620" cy="230832"/>
+          </a:xfrm>
+          <a:prstGeom prst="rect">
+            <a:avLst/>
+          </a:prstGeom>
+          <a:noFill/>
+        </p:spPr>
+        <p:txBody>
+          <a:bodyPr wrap="square" rtlCol="0">
+            <a:spAutoFit/>
+          </a:bodyPr>
+          <a:lstStyle/>
+          <a:p>
+            <a:r>
+              <a:rPr lang="en-US" sz="900" b="1" dirty="0"/>
+              <a:t>3</a:t>
+            </a:r>
+          </a:p>
+        </p:txBody>
+      </p:sp>
+      <p:sp>
+        <p:nvSpPr>
+          <p:cNvPr id="43" name="TextBox 42"/>
+          <p:cNvSpPr txBox="1"/>
+          <p:nvPr/>
+        </p:nvSpPr>
+        <p:spPr>
+          <a:xfrm>
+            <a:off x="10520834" y="3696372"/>
+            <a:ext cx="388620" cy="230832"/>
+          </a:xfrm>
+          <a:prstGeom prst="rect">
+            <a:avLst/>
+          </a:prstGeom>
+          <a:noFill/>
+        </p:spPr>
+        <p:txBody>
+          <a:bodyPr wrap="square" rtlCol="0">
+            <a:spAutoFit/>
+          </a:bodyPr>
+          <a:lstStyle/>
+          <a:p>
+            <a:r>
+              <a:rPr lang="en-US" sz="900" b="1" dirty="0"/>
+              <a:t>4</a:t>
+            </a:r>
+          </a:p>
+        </p:txBody>
+      </p:sp>
+      <p:sp>
+        <p:nvSpPr>
+          <p:cNvPr id="44" name="TextBox 43"/>
+          <p:cNvSpPr txBox="1"/>
+          <p:nvPr/>
+        </p:nvSpPr>
+        <p:spPr>
+          <a:xfrm>
+            <a:off x="10659096" y="3974601"/>
+            <a:ext cx="388620" cy="230832"/>
+          </a:xfrm>
+          <a:prstGeom prst="rect">
+            <a:avLst/>
+          </a:prstGeom>
+          <a:noFill/>
+        </p:spPr>
+        <p:txBody>
+          <a:bodyPr wrap="square" rtlCol="0">
+            <a:spAutoFit/>
+          </a:bodyPr>
+          <a:lstStyle/>
+          <a:p>
+            <a:r>
+              <a:rPr lang="en-US" sz="900" b="1" dirty="0"/>
+              <a:t>5</a:t>
+            </a:r>
+          </a:p>
+        </p:txBody>
+      </p:sp>
+      <p:sp>
+        <p:nvSpPr>
+          <p:cNvPr id="45" name="TextBox 44"/>
+          <p:cNvSpPr txBox="1"/>
+          <p:nvPr/>
+        </p:nvSpPr>
+        <p:spPr>
+          <a:xfrm>
+            <a:off x="10656127" y="4328780"/>
+            <a:ext cx="388620" cy="230832"/>
+          </a:xfrm>
+          <a:prstGeom prst="rect">
+            <a:avLst/>
+          </a:prstGeom>
+          <a:noFill/>
+        </p:spPr>
+        <p:txBody>
+          <a:bodyPr wrap="square" rtlCol="0">
+            <a:spAutoFit/>
+          </a:bodyPr>
+          <a:lstStyle/>
+          <a:p>
+            <a:r>
+              <a:rPr lang="en-US" sz="900" b="1" dirty="0"/>
+              <a:t>6</a:t>
+            </a:r>
+          </a:p>
+        </p:txBody>
+      </p:sp>
+      <p:sp>
+        <p:nvSpPr>
+          <p:cNvPr id="46" name="TextBox 45"/>
+          <p:cNvSpPr txBox="1"/>
+          <p:nvPr/>
+        </p:nvSpPr>
+        <p:spPr>
+          <a:xfrm>
+            <a:off x="10326524" y="4636724"/>
+            <a:ext cx="388620" cy="230832"/>
+          </a:xfrm>
+          <a:prstGeom prst="rect">
+            <a:avLst/>
+          </a:prstGeom>
+          <a:noFill/>
+        </p:spPr>
+        <p:txBody>
+          <a:bodyPr wrap="square" rtlCol="0">
+            <a:spAutoFit/>
+          </a:bodyPr>
+          <a:lstStyle/>
+          <a:p>
+            <a:r>
+              <a:rPr lang="en-US" sz="900" b="1" dirty="0"/>
+              <a:t>7</a:t>
+            </a:r>
+          </a:p>
+        </p:txBody>
+      </p:sp>
+      <p:sp>
+        <p:nvSpPr>
+          <p:cNvPr id="47" name="TextBox 46"/>
+          <p:cNvSpPr txBox="1"/>
+          <p:nvPr/>
+        </p:nvSpPr>
+        <p:spPr>
+          <a:xfrm>
+            <a:off x="9525274" y="4572620"/>
+            <a:ext cx="388620" cy="230832"/>
+          </a:xfrm>
+          <a:prstGeom prst="rect">
+            <a:avLst/>
+          </a:prstGeom>
+          <a:noFill/>
+        </p:spPr>
+        <p:txBody>
+          <a:bodyPr wrap="square" rtlCol="0">
+            <a:spAutoFit/>
+          </a:bodyPr>
+          <a:lstStyle/>
+          <a:p>
+            <a:r>
+              <a:rPr lang="en-US" sz="900" b="1" dirty="0"/>
+              <a:t>8</a:t>
+            </a:r>
+          </a:p>
+        </p:txBody>
+      </p:sp>
+      <p:sp>
+        <p:nvSpPr>
+          <p:cNvPr id="48" name="TextBox 47"/>
+          <p:cNvSpPr txBox="1"/>
+          <p:nvPr/>
+        </p:nvSpPr>
+        <p:spPr>
+          <a:xfrm>
+            <a:off x="8849619" y="4780500"/>
+            <a:ext cx="388620" cy="230832"/>
+          </a:xfrm>
+          <a:prstGeom prst="rect">
+            <a:avLst/>
+          </a:prstGeom>
+          <a:noFill/>
+        </p:spPr>
+        <p:txBody>
+          <a:bodyPr wrap="square" rtlCol="0">
+            <a:spAutoFit/>
+          </a:bodyPr>
+          <a:lstStyle/>
+          <a:p>
+            <a:r>
+              <a:rPr lang="en-US" sz="900" b="1" dirty="0"/>
+              <a:t>9</a:t>
+            </a:r>
+          </a:p>
+        </p:txBody>
+      </p:sp>
+      <p:sp>
+        <p:nvSpPr>
+          <p:cNvPr id="49" name="Oval 48"/>
           <p:cNvSpPr/>
           <p:nvPr/>
         </p:nvSpPr>
         <p:spPr>
           <a:xfrm>
-            <a:off x="5695509" y="3258620"/>
-            <a:ext cx="89138" cy="102624"/>
+            <a:off x="5678686" y="3259125"/>
+            <a:ext cx="89138" cy="91440"/>
           </a:xfrm>
           <a:prstGeom prst="ellipse">
             <a:avLst/>
@@ -3143,20 +3667,20 @@
           <a:lstStyle/>
           <a:p>
             <a:pPr algn="ctr"/>
-            <a:endParaRPr lang="en-US" dirty="0"/>
-          </a:p>
-        </p:txBody>
-      </p:sp>
-      <p:sp>
-        <p:nvSpPr>
-          <p:cNvPr id="13" name="Oval 12"/>
+            <a:endParaRPr lang="en-US"/>
+          </a:p>
+        </p:txBody>
+      </p:sp>
+      <p:sp>
+        <p:nvSpPr>
+          <p:cNvPr id="50" name="Oval 49"/>
           <p:cNvSpPr/>
           <p:nvPr/>
         </p:nvSpPr>
         <p:spPr>
           <a:xfrm>
-            <a:off x="7605827" y="5125520"/>
-            <a:ext cx="89138" cy="102624"/>
+            <a:off x="6735621" y="4076812"/>
+            <a:ext cx="89138" cy="91440"/>
           </a:xfrm>
           <a:prstGeom prst="ellipse">
             <a:avLst/>
@@ -3197,14 +3721,14 @@
       </p:sp>
       <p:sp>
         <p:nvSpPr>
-          <p:cNvPr id="14" name="Oval 13"/>
+          <p:cNvPr id="51" name="Oval 50"/>
           <p:cNvSpPr/>
           <p:nvPr/>
         </p:nvSpPr>
         <p:spPr>
           <a:xfrm>
-            <a:off x="7605827" y="3083360"/>
-            <a:ext cx="89138" cy="102624"/>
+            <a:off x="6731384" y="3865357"/>
+            <a:ext cx="89138" cy="91440"/>
           </a:xfrm>
           <a:prstGeom prst="ellipse">
             <a:avLst/>
@@ -3245,14 +3769,14 @@
       </p:sp>
       <p:sp>
         <p:nvSpPr>
-          <p:cNvPr id="15" name="Oval 14"/>
+          <p:cNvPr id="52" name="Oval 51"/>
           <p:cNvSpPr/>
           <p:nvPr/>
         </p:nvSpPr>
         <p:spPr>
           <a:xfrm>
-            <a:off x="10196627" y="3563420"/>
-            <a:ext cx="89138" cy="102624"/>
+            <a:off x="7609996" y="3040182"/>
+            <a:ext cx="89138" cy="91440"/>
           </a:xfrm>
           <a:prstGeom prst="ellipse">
             <a:avLst/>
@@ -3293,14 +3817,14 @@
       </p:sp>
       <p:sp>
         <p:nvSpPr>
-          <p:cNvPr id="16" name="Oval 15"/>
+          <p:cNvPr id="53" name="Oval 52"/>
           <p:cNvSpPr/>
           <p:nvPr/>
         </p:nvSpPr>
         <p:spPr>
           <a:xfrm>
-            <a:off x="10387127" y="3792020"/>
-            <a:ext cx="89138" cy="102624"/>
+            <a:off x="7609996" y="5150300"/>
+            <a:ext cx="89138" cy="91440"/>
           </a:xfrm>
           <a:prstGeom prst="ellipse">
             <a:avLst/>
@@ -3341,14 +3865,14 @@
       </p:sp>
       <p:sp>
         <p:nvSpPr>
-          <p:cNvPr id="17" name="Oval 16"/>
+          <p:cNvPr id="54" name="Oval 53"/>
           <p:cNvSpPr/>
           <p:nvPr/>
         </p:nvSpPr>
         <p:spPr>
           <a:xfrm>
-            <a:off x="10479634" y="4025500"/>
-            <a:ext cx="89138" cy="102624"/>
+            <a:off x="8184947" y="4237892"/>
+            <a:ext cx="89138" cy="91440"/>
           </a:xfrm>
           <a:prstGeom prst="ellipse">
             <a:avLst/>
@@ -3389,14 +3913,14 @@
       </p:sp>
       <p:sp>
         <p:nvSpPr>
-          <p:cNvPr id="18" name="Oval 17"/>
+          <p:cNvPr id="55" name="Oval 54"/>
           <p:cNvSpPr/>
           <p:nvPr/>
         </p:nvSpPr>
         <p:spPr>
           <a:xfrm>
-            <a:off x="10431696" y="4258980"/>
-            <a:ext cx="89138" cy="102624"/>
+            <a:off x="10198484" y="3553201"/>
+            <a:ext cx="89138" cy="91440"/>
           </a:xfrm>
           <a:prstGeom prst="ellipse">
             <a:avLst/>
@@ -3437,14 +3961,14 @@
       </p:sp>
       <p:sp>
         <p:nvSpPr>
-          <p:cNvPr id="19" name="Oval 18"/>
+          <p:cNvPr id="56" name="Oval 55"/>
           <p:cNvSpPr/>
           <p:nvPr/>
         </p:nvSpPr>
         <p:spPr>
           <a:xfrm>
-            <a:off x="10107489" y="4508300"/>
-            <a:ext cx="89138" cy="102624"/>
+            <a:off x="10373109" y="3777683"/>
+            <a:ext cx="89138" cy="91440"/>
           </a:xfrm>
           <a:prstGeom prst="ellipse">
             <a:avLst/>
@@ -3485,14 +4009,14 @@
       </p:sp>
       <p:sp>
         <p:nvSpPr>
-          <p:cNvPr id="20" name="Oval 19"/>
+          <p:cNvPr id="57" name="Oval 56"/>
           <p:cNvSpPr/>
           <p:nvPr/>
         </p:nvSpPr>
         <p:spPr>
           <a:xfrm>
-            <a:off x="9510827" y="4752140"/>
-            <a:ext cx="89138" cy="102624"/>
+            <a:off x="10456848" y="4018845"/>
+            <a:ext cx="89138" cy="91440"/>
           </a:xfrm>
           <a:prstGeom prst="ellipse">
             <a:avLst/>
@@ -3533,14 +4057,14 @@
       </p:sp>
       <p:sp>
         <p:nvSpPr>
-          <p:cNvPr id="21" name="Oval 20"/>
+          <p:cNvPr id="58" name="Oval 57"/>
           <p:cNvSpPr/>
           <p:nvPr/>
         </p:nvSpPr>
         <p:spPr>
           <a:xfrm>
-            <a:off x="8809787" y="4957880"/>
-            <a:ext cx="89138" cy="102624"/>
+            <a:off x="10412279" y="4276836"/>
+            <a:ext cx="89138" cy="91440"/>
           </a:xfrm>
           <a:prstGeom prst="ellipse">
             <a:avLst/>
@@ -3581,14 +4105,14 @@
       </p:sp>
       <p:sp>
         <p:nvSpPr>
-          <p:cNvPr id="22" name="Oval 21"/>
+          <p:cNvPr id="59" name="Oval 58"/>
           <p:cNvSpPr/>
           <p:nvPr/>
         </p:nvSpPr>
         <p:spPr>
           <a:xfrm>
-            <a:off x="6737147" y="4098960"/>
-            <a:ext cx="89138" cy="102624"/>
+            <a:off x="10109346" y="4513892"/>
+            <a:ext cx="89138" cy="91440"/>
           </a:xfrm>
           <a:prstGeom prst="ellipse">
             <a:avLst/>
@@ -3629,14 +4153,14 @@
       </p:sp>
       <p:sp>
         <p:nvSpPr>
-          <p:cNvPr id="23" name="Oval 22"/>
+          <p:cNvPr id="60" name="Oval 59"/>
           <p:cNvSpPr/>
           <p:nvPr/>
         </p:nvSpPr>
         <p:spPr>
           <a:xfrm>
-            <a:off x="6737147" y="3855832"/>
-            <a:ext cx="89138" cy="102624"/>
+            <a:off x="9561731" y="4752140"/>
+            <a:ext cx="89138" cy="91440"/>
           </a:xfrm>
           <a:prstGeom prst="ellipse">
             <a:avLst/>
@@ -3677,14 +4201,14 @@
       </p:sp>
       <p:sp>
         <p:nvSpPr>
-          <p:cNvPr id="24" name="Oval 23"/>
+          <p:cNvPr id="61" name="Oval 60"/>
           <p:cNvSpPr/>
           <p:nvPr/>
         </p:nvSpPr>
         <p:spPr>
           <a:xfrm>
-            <a:off x="7270547" y="4001293"/>
-            <a:ext cx="89138" cy="102624"/>
+            <a:off x="8899909" y="4961280"/>
+            <a:ext cx="89138" cy="91440"/>
           </a:xfrm>
           <a:prstGeom prst="ellipse">
             <a:avLst/>
@@ -3725,14 +4249,14 @@
       </p:sp>
       <p:sp>
         <p:nvSpPr>
-          <p:cNvPr id="25" name="Oval 24"/>
+          <p:cNvPr id="62" name="Oval 61"/>
           <p:cNvSpPr/>
           <p:nvPr/>
         </p:nvSpPr>
         <p:spPr>
           <a:xfrm>
-            <a:off x="7270547" y="3740708"/>
-            <a:ext cx="89138" cy="102624"/>
+            <a:off x="7310018" y="4006941"/>
+            <a:ext cx="89138" cy="91440"/>
           </a:xfrm>
           <a:prstGeom prst="ellipse">
             <a:avLst/>
@@ -3773,14 +4297,14 @@
       </p:sp>
       <p:sp>
         <p:nvSpPr>
-          <p:cNvPr id="26" name="Oval 25"/>
+          <p:cNvPr id="63" name="Oval 62"/>
           <p:cNvSpPr/>
           <p:nvPr/>
         </p:nvSpPr>
         <p:spPr>
           <a:xfrm>
-            <a:off x="7270547" y="3490050"/>
-            <a:ext cx="89138" cy="102624"/>
+            <a:off x="7310018" y="3740353"/>
+            <a:ext cx="89138" cy="91440"/>
           </a:xfrm>
           <a:prstGeom prst="ellipse">
             <a:avLst/>
@@ -3821,14 +4345,14 @@
       </p:sp>
       <p:sp>
         <p:nvSpPr>
-          <p:cNvPr id="27" name="Oval 26"/>
+          <p:cNvPr id="64" name="Oval 63"/>
           <p:cNvSpPr/>
           <p:nvPr/>
         </p:nvSpPr>
         <p:spPr>
           <a:xfrm>
-            <a:off x="8184947" y="4220168"/>
-            <a:ext cx="89138" cy="102624"/>
+            <a:off x="7310018" y="3477727"/>
+            <a:ext cx="89138" cy="91440"/>
           </a:xfrm>
           <a:prstGeom prst="ellipse">
             <a:avLst/>
@@ -3869,14 +4393,14 @@
       </p:sp>
       <p:sp>
         <p:nvSpPr>
-          <p:cNvPr id="28" name="Oval 27"/>
+          <p:cNvPr id="65" name="Oval 64"/>
           <p:cNvSpPr/>
           <p:nvPr/>
         </p:nvSpPr>
         <p:spPr>
           <a:xfrm>
-            <a:off x="8024927" y="3460796"/>
-            <a:ext cx="89138" cy="102624"/>
+            <a:off x="8035206" y="3458586"/>
+            <a:ext cx="89138" cy="91440"/>
           </a:xfrm>
           <a:prstGeom prst="ellipse">
             <a:avLst/>
@@ -3912,576 +4436,6 @@
           <a:p>
             <a:pPr algn="ctr"/>
             <a:endParaRPr lang="en-US"/>
-          </a:p>
-        </p:txBody>
-      </p:sp>
-      <p:sp>
-        <p:nvSpPr>
-          <p:cNvPr id="30" name="TextBox 29"/>
-          <p:cNvSpPr txBox="1"/>
-          <p:nvPr/>
-        </p:nvSpPr>
-        <p:spPr>
-          <a:xfrm>
-            <a:off x="5545768" y="3289720"/>
-            <a:ext cx="388620" cy="230832"/>
-          </a:xfrm>
-          <a:prstGeom prst="rect">
-            <a:avLst/>
-          </a:prstGeom>
-          <a:noFill/>
-        </p:spPr>
-        <p:txBody>
-          <a:bodyPr wrap="square" rtlCol="0">
-            <a:spAutoFit/>
-          </a:bodyPr>
-          <a:lstStyle/>
-          <a:p>
-            <a:r>
-              <a:rPr lang="en-US" sz="900" b="1" dirty="0"/>
-              <a:t>1</a:t>
-            </a:r>
-          </a:p>
-        </p:txBody>
-      </p:sp>
-      <p:sp>
-        <p:nvSpPr>
-          <p:cNvPr id="31" name="Oval 30"/>
-          <p:cNvSpPr/>
-          <p:nvPr/>
-        </p:nvSpPr>
-        <p:spPr>
-          <a:xfrm>
-            <a:off x="5685587" y="4073960"/>
-            <a:ext cx="89138" cy="102624"/>
-          </a:xfrm>
-          <a:prstGeom prst="ellipse">
-            <a:avLst/>
-          </a:prstGeom>
-          <a:solidFill>
-            <a:srgbClr val="FFFF00"/>
-          </a:solidFill>
-          <a:ln>
-            <a:solidFill>
-              <a:schemeClr val="tx1"/>
-            </a:solidFill>
-          </a:ln>
-        </p:spPr>
-        <p:style>
-          <a:lnRef idx="2">
-            <a:schemeClr val="accent1">
-              <a:shade val="50000"/>
-            </a:schemeClr>
-          </a:lnRef>
-          <a:fillRef idx="1">
-            <a:schemeClr val="accent1"/>
-          </a:fillRef>
-          <a:effectRef idx="0">
-            <a:schemeClr val="accent1"/>
-          </a:effectRef>
-          <a:fontRef idx="minor">
-            <a:schemeClr val="lt1"/>
-          </a:fontRef>
-        </p:style>
-        <p:txBody>
-          <a:bodyPr rtlCol="0" anchor="ctr"/>
-          <a:lstStyle/>
-          <a:p>
-            <a:pPr algn="ctr"/>
-            <a:endParaRPr lang="en-US"/>
-          </a:p>
-        </p:txBody>
-      </p:sp>
-      <p:sp>
-        <p:nvSpPr>
-          <p:cNvPr id="32" name="TextBox 31"/>
-          <p:cNvSpPr txBox="1"/>
-          <p:nvPr/>
-        </p:nvSpPr>
-        <p:spPr>
-          <a:xfrm>
-            <a:off x="5580415" y="3885877"/>
-            <a:ext cx="388620" cy="230832"/>
-          </a:xfrm>
-          <a:prstGeom prst="rect">
-            <a:avLst/>
-          </a:prstGeom>
-          <a:noFill/>
-        </p:spPr>
-        <p:txBody>
-          <a:bodyPr wrap="square" rtlCol="0">
-            <a:spAutoFit/>
-          </a:bodyPr>
-          <a:lstStyle/>
-          <a:p>
-            <a:r>
-              <a:rPr lang="en-US" sz="900" b="1" dirty="0"/>
-              <a:t>11</a:t>
-            </a:r>
-          </a:p>
-        </p:txBody>
-      </p:sp>
-      <p:sp>
-        <p:nvSpPr>
-          <p:cNvPr id="33" name="TextBox 32"/>
-          <p:cNvSpPr txBox="1"/>
-          <p:nvPr/>
-        </p:nvSpPr>
-        <p:spPr>
-          <a:xfrm>
-            <a:off x="6641104" y="4173844"/>
-            <a:ext cx="388620" cy="230832"/>
-          </a:xfrm>
-          <a:prstGeom prst="rect">
-            <a:avLst/>
-          </a:prstGeom>
-          <a:noFill/>
-        </p:spPr>
-        <p:txBody>
-          <a:bodyPr wrap="square" rtlCol="0">
-            <a:spAutoFit/>
-          </a:bodyPr>
-          <a:lstStyle/>
-          <a:p>
-            <a:r>
-              <a:rPr lang="en-US" sz="900" b="1" dirty="0"/>
-              <a:t>12</a:t>
-            </a:r>
-          </a:p>
-        </p:txBody>
-      </p:sp>
-      <p:sp>
-        <p:nvSpPr>
-          <p:cNvPr id="34" name="TextBox 33"/>
-          <p:cNvSpPr txBox="1"/>
-          <p:nvPr/>
-        </p:nvSpPr>
-        <p:spPr>
-          <a:xfrm>
-            <a:off x="6626212" y="3670657"/>
-            <a:ext cx="388620" cy="230832"/>
-          </a:xfrm>
-          <a:prstGeom prst="rect">
-            <a:avLst/>
-          </a:prstGeom>
-          <a:noFill/>
-        </p:spPr>
-        <p:txBody>
-          <a:bodyPr wrap="square" rtlCol="0">
-            <a:spAutoFit/>
-          </a:bodyPr>
-          <a:lstStyle/>
-          <a:p>
-            <a:r>
-              <a:rPr lang="en-US" sz="900" b="1" dirty="0"/>
-              <a:t>13</a:t>
-            </a:r>
-          </a:p>
-        </p:txBody>
-      </p:sp>
-      <p:sp>
-        <p:nvSpPr>
-          <p:cNvPr id="35" name="TextBox 34"/>
-          <p:cNvSpPr txBox="1"/>
-          <p:nvPr/>
-        </p:nvSpPr>
-        <p:spPr>
-          <a:xfrm>
-            <a:off x="7622140" y="4965188"/>
-            <a:ext cx="388620" cy="230832"/>
-          </a:xfrm>
-          <a:prstGeom prst="rect">
-            <a:avLst/>
-          </a:prstGeom>
-          <a:noFill/>
-        </p:spPr>
-        <p:txBody>
-          <a:bodyPr wrap="square" rtlCol="0">
-            <a:spAutoFit/>
-          </a:bodyPr>
-          <a:lstStyle/>
-          <a:p>
-            <a:r>
-              <a:rPr lang="en-US" sz="900" b="1" dirty="0"/>
-              <a:t>10</a:t>
-            </a:r>
-          </a:p>
-        </p:txBody>
-      </p:sp>
-      <p:sp>
-        <p:nvSpPr>
-          <p:cNvPr id="36" name="TextBox 35"/>
-          <p:cNvSpPr txBox="1"/>
-          <p:nvPr/>
-        </p:nvSpPr>
-        <p:spPr>
-          <a:xfrm>
-            <a:off x="7279676" y="4027142"/>
-            <a:ext cx="388620" cy="230832"/>
-          </a:xfrm>
-          <a:prstGeom prst="rect">
-            <a:avLst/>
-          </a:prstGeom>
-          <a:noFill/>
-        </p:spPr>
-        <p:txBody>
-          <a:bodyPr wrap="square" rtlCol="0">
-            <a:spAutoFit/>
-          </a:bodyPr>
-          <a:lstStyle/>
-          <a:p>
-            <a:r>
-              <a:rPr lang="en-US" sz="900" b="1" dirty="0"/>
-              <a:t>14</a:t>
-            </a:r>
-          </a:p>
-        </p:txBody>
-      </p:sp>
-      <p:sp>
-        <p:nvSpPr>
-          <p:cNvPr id="37" name="TextBox 36"/>
-          <p:cNvSpPr txBox="1"/>
-          <p:nvPr/>
-        </p:nvSpPr>
-        <p:spPr>
-          <a:xfrm>
-            <a:off x="7499828" y="2794820"/>
-            <a:ext cx="388620" cy="230832"/>
-          </a:xfrm>
-          <a:prstGeom prst="rect">
-            <a:avLst/>
-          </a:prstGeom>
-          <a:noFill/>
-        </p:spPr>
-        <p:txBody>
-          <a:bodyPr wrap="square" rtlCol="0">
-            <a:spAutoFit/>
-          </a:bodyPr>
-          <a:lstStyle/>
-          <a:p>
-            <a:r>
-              <a:rPr lang="en-US" sz="900" b="1" dirty="0"/>
-              <a:t>2</a:t>
-            </a:r>
-          </a:p>
-        </p:txBody>
-      </p:sp>
-      <p:sp>
-        <p:nvSpPr>
-          <p:cNvPr id="38" name="TextBox 37"/>
-          <p:cNvSpPr txBox="1"/>
-          <p:nvPr/>
-        </p:nvSpPr>
-        <p:spPr>
-          <a:xfrm>
-            <a:off x="7288363" y="3526749"/>
-            <a:ext cx="388620" cy="230832"/>
-          </a:xfrm>
-          <a:prstGeom prst="rect">
-            <a:avLst/>
-          </a:prstGeom>
-          <a:noFill/>
-        </p:spPr>
-        <p:txBody>
-          <a:bodyPr wrap="square" rtlCol="0">
-            <a:spAutoFit/>
-          </a:bodyPr>
-          <a:lstStyle/>
-          <a:p>
-            <a:r>
-              <a:rPr lang="en-US" sz="900" b="1" dirty="0"/>
-              <a:t>16</a:t>
-            </a:r>
-          </a:p>
-        </p:txBody>
-      </p:sp>
-      <p:sp>
-        <p:nvSpPr>
-          <p:cNvPr id="39" name="TextBox 38"/>
-          <p:cNvSpPr txBox="1"/>
-          <p:nvPr/>
-        </p:nvSpPr>
-        <p:spPr>
-          <a:xfrm>
-            <a:off x="7288363" y="3789705"/>
-            <a:ext cx="388620" cy="230832"/>
-          </a:xfrm>
-          <a:prstGeom prst="rect">
-            <a:avLst/>
-          </a:prstGeom>
-          <a:noFill/>
-        </p:spPr>
-        <p:txBody>
-          <a:bodyPr wrap="square" rtlCol="0">
-            <a:spAutoFit/>
-          </a:bodyPr>
-          <a:lstStyle/>
-          <a:p>
-            <a:r>
-              <a:rPr lang="en-US" sz="900" b="1" dirty="0"/>
-              <a:t>15</a:t>
-            </a:r>
-          </a:p>
-        </p:txBody>
-      </p:sp>
-      <p:sp>
-        <p:nvSpPr>
-          <p:cNvPr id="40" name="TextBox 39"/>
-          <p:cNvSpPr txBox="1"/>
-          <p:nvPr/>
-        </p:nvSpPr>
-        <p:spPr>
-          <a:xfrm>
-            <a:off x="7919755" y="3550759"/>
-            <a:ext cx="388620" cy="230832"/>
-          </a:xfrm>
-          <a:prstGeom prst="rect">
-            <a:avLst/>
-          </a:prstGeom>
-          <a:noFill/>
-        </p:spPr>
-        <p:txBody>
-          <a:bodyPr wrap="square" rtlCol="0">
-            <a:spAutoFit/>
-          </a:bodyPr>
-          <a:lstStyle/>
-          <a:p>
-            <a:r>
-              <a:rPr lang="en-US" sz="900" b="1" dirty="0"/>
-              <a:t>17</a:t>
-            </a:r>
-          </a:p>
-        </p:txBody>
-      </p:sp>
-      <p:sp>
-        <p:nvSpPr>
-          <p:cNvPr id="41" name="TextBox 40"/>
-          <p:cNvSpPr txBox="1"/>
-          <p:nvPr/>
-        </p:nvSpPr>
-        <p:spPr>
-          <a:xfrm>
-            <a:off x="8079775" y="4034856"/>
-            <a:ext cx="388620" cy="230832"/>
-          </a:xfrm>
-          <a:prstGeom prst="rect">
-            <a:avLst/>
-          </a:prstGeom>
-          <a:noFill/>
-        </p:spPr>
-        <p:txBody>
-          <a:bodyPr wrap="square" rtlCol="0">
-            <a:spAutoFit/>
-          </a:bodyPr>
-          <a:lstStyle/>
-          <a:p>
-            <a:r>
-              <a:rPr lang="en-US" sz="900" b="1" dirty="0"/>
-              <a:t>18</a:t>
-            </a:r>
-          </a:p>
-        </p:txBody>
-      </p:sp>
-      <p:sp>
-        <p:nvSpPr>
-          <p:cNvPr id="42" name="TextBox 41"/>
-          <p:cNvSpPr txBox="1"/>
-          <p:nvPr/>
-        </p:nvSpPr>
-        <p:spPr>
-          <a:xfrm>
-            <a:off x="10333346" y="3367244"/>
-            <a:ext cx="388620" cy="230832"/>
-          </a:xfrm>
-          <a:prstGeom prst="rect">
-            <a:avLst/>
-          </a:prstGeom>
-          <a:noFill/>
-        </p:spPr>
-        <p:txBody>
-          <a:bodyPr wrap="square" rtlCol="0">
-            <a:spAutoFit/>
-          </a:bodyPr>
-          <a:lstStyle/>
-          <a:p>
-            <a:r>
-              <a:rPr lang="en-US" sz="900" b="1" dirty="0"/>
-              <a:t>3</a:t>
-            </a:r>
-          </a:p>
-        </p:txBody>
-      </p:sp>
-      <p:sp>
-        <p:nvSpPr>
-          <p:cNvPr id="43" name="TextBox 42"/>
-          <p:cNvSpPr txBox="1"/>
-          <p:nvPr/>
-        </p:nvSpPr>
-        <p:spPr>
-          <a:xfrm>
-            <a:off x="10520834" y="3696372"/>
-            <a:ext cx="388620" cy="230832"/>
-          </a:xfrm>
-          <a:prstGeom prst="rect">
-            <a:avLst/>
-          </a:prstGeom>
-          <a:noFill/>
-        </p:spPr>
-        <p:txBody>
-          <a:bodyPr wrap="square" rtlCol="0">
-            <a:spAutoFit/>
-          </a:bodyPr>
-          <a:lstStyle/>
-          <a:p>
-            <a:r>
-              <a:rPr lang="en-US" sz="900" b="1" dirty="0"/>
-              <a:t>4</a:t>
-            </a:r>
-          </a:p>
-        </p:txBody>
-      </p:sp>
-      <p:sp>
-        <p:nvSpPr>
-          <p:cNvPr id="44" name="TextBox 43"/>
-          <p:cNvSpPr txBox="1"/>
-          <p:nvPr/>
-        </p:nvSpPr>
-        <p:spPr>
-          <a:xfrm>
-            <a:off x="10659096" y="3974601"/>
-            <a:ext cx="388620" cy="230832"/>
-          </a:xfrm>
-          <a:prstGeom prst="rect">
-            <a:avLst/>
-          </a:prstGeom>
-          <a:noFill/>
-        </p:spPr>
-        <p:txBody>
-          <a:bodyPr wrap="square" rtlCol="0">
-            <a:spAutoFit/>
-          </a:bodyPr>
-          <a:lstStyle/>
-          <a:p>
-            <a:r>
-              <a:rPr lang="en-US" sz="900" b="1" dirty="0"/>
-              <a:t>5</a:t>
-            </a:r>
-          </a:p>
-        </p:txBody>
-      </p:sp>
-      <p:sp>
-        <p:nvSpPr>
-          <p:cNvPr id="45" name="TextBox 44"/>
-          <p:cNvSpPr txBox="1"/>
-          <p:nvPr/>
-        </p:nvSpPr>
-        <p:spPr>
-          <a:xfrm>
-            <a:off x="10656127" y="4328780"/>
-            <a:ext cx="388620" cy="230832"/>
-          </a:xfrm>
-          <a:prstGeom prst="rect">
-            <a:avLst/>
-          </a:prstGeom>
-          <a:noFill/>
-        </p:spPr>
-        <p:txBody>
-          <a:bodyPr wrap="square" rtlCol="0">
-            <a:spAutoFit/>
-          </a:bodyPr>
-          <a:lstStyle/>
-          <a:p>
-            <a:r>
-              <a:rPr lang="en-US" sz="900" b="1" dirty="0"/>
-              <a:t>6</a:t>
-            </a:r>
-          </a:p>
-        </p:txBody>
-      </p:sp>
-      <p:sp>
-        <p:nvSpPr>
-          <p:cNvPr id="46" name="TextBox 45"/>
-          <p:cNvSpPr txBox="1"/>
-          <p:nvPr/>
-        </p:nvSpPr>
-        <p:spPr>
-          <a:xfrm>
-            <a:off x="10326524" y="4636724"/>
-            <a:ext cx="388620" cy="230832"/>
-          </a:xfrm>
-          <a:prstGeom prst="rect">
-            <a:avLst/>
-          </a:prstGeom>
-          <a:noFill/>
-        </p:spPr>
-        <p:txBody>
-          <a:bodyPr wrap="square" rtlCol="0">
-            <a:spAutoFit/>
-          </a:bodyPr>
-          <a:lstStyle/>
-          <a:p>
-            <a:r>
-              <a:rPr lang="en-US" sz="900" b="1" dirty="0"/>
-              <a:t>7</a:t>
-            </a:r>
-          </a:p>
-        </p:txBody>
-      </p:sp>
-      <p:sp>
-        <p:nvSpPr>
-          <p:cNvPr id="47" name="TextBox 46"/>
-          <p:cNvSpPr txBox="1"/>
-          <p:nvPr/>
-        </p:nvSpPr>
-        <p:spPr>
-          <a:xfrm>
-            <a:off x="9525274" y="4572620"/>
-            <a:ext cx="388620" cy="230832"/>
-          </a:xfrm>
-          <a:prstGeom prst="rect">
-            <a:avLst/>
-          </a:prstGeom>
-          <a:noFill/>
-        </p:spPr>
-        <p:txBody>
-          <a:bodyPr wrap="square" rtlCol="0">
-            <a:spAutoFit/>
-          </a:bodyPr>
-          <a:lstStyle/>
-          <a:p>
-            <a:r>
-              <a:rPr lang="en-US" sz="900" b="1" dirty="0"/>
-              <a:t>8</a:t>
-            </a:r>
-          </a:p>
-        </p:txBody>
-      </p:sp>
-      <p:sp>
-        <p:nvSpPr>
-          <p:cNvPr id="48" name="TextBox 47"/>
-          <p:cNvSpPr txBox="1"/>
-          <p:nvPr/>
-        </p:nvSpPr>
-        <p:spPr>
-          <a:xfrm>
-            <a:off x="8849619" y="4780500"/>
-            <a:ext cx="388620" cy="230832"/>
-          </a:xfrm>
-          <a:prstGeom prst="rect">
-            <a:avLst/>
-          </a:prstGeom>
-          <a:noFill/>
-        </p:spPr>
-        <p:txBody>
-          <a:bodyPr wrap="square" rtlCol="0">
-            <a:spAutoFit/>
-          </a:bodyPr>
-          <a:lstStyle/>
-          <a:p>
-            <a:r>
-              <a:rPr lang="en-US" sz="900" b="1" dirty="0"/>
-              <a:t>9</a:t>
-            </a:r>
           </a:p>
         </p:txBody>
       </p:sp>
@@ -4546,13 +4500,390 @@
       </p:pic>
       <p:sp>
         <p:nvSpPr>
-          <p:cNvPr id="11" name="Oval 10"/>
+          <p:cNvPr id="30" name="TextBox 29"/>
+          <p:cNvSpPr txBox="1"/>
+          <p:nvPr/>
+        </p:nvSpPr>
+        <p:spPr>
+          <a:xfrm>
+            <a:off x="2658939" y="3701564"/>
+            <a:ext cx="388620" cy="230832"/>
+          </a:xfrm>
+          <a:prstGeom prst="rect">
+            <a:avLst/>
+          </a:prstGeom>
+          <a:noFill/>
+        </p:spPr>
+        <p:txBody>
+          <a:bodyPr wrap="square" rtlCol="0">
+            <a:spAutoFit/>
+          </a:bodyPr>
+          <a:lstStyle/>
+          <a:p>
+            <a:r>
+              <a:rPr lang="en-US" sz="900" b="1" dirty="0"/>
+              <a:t>1</a:t>
+            </a:r>
+          </a:p>
+        </p:txBody>
+      </p:sp>
+      <p:sp>
+        <p:nvSpPr>
+          <p:cNvPr id="32" name="TextBox 31"/>
+          <p:cNvSpPr txBox="1"/>
+          <p:nvPr/>
+        </p:nvSpPr>
+        <p:spPr>
+          <a:xfrm>
+            <a:off x="5607720" y="3857665"/>
+            <a:ext cx="388620" cy="230832"/>
+          </a:xfrm>
+          <a:prstGeom prst="rect">
+            <a:avLst/>
+          </a:prstGeom>
+          <a:noFill/>
+        </p:spPr>
+        <p:txBody>
+          <a:bodyPr wrap="square" rtlCol="0">
+            <a:spAutoFit/>
+          </a:bodyPr>
+          <a:lstStyle/>
+          <a:p>
+            <a:r>
+              <a:rPr lang="en-US" sz="900" b="1" dirty="0"/>
+              <a:t>11</a:t>
+            </a:r>
+          </a:p>
+        </p:txBody>
+      </p:sp>
+      <p:sp>
+        <p:nvSpPr>
+          <p:cNvPr id="33" name="TextBox 32"/>
+          <p:cNvSpPr txBox="1"/>
+          <p:nvPr/>
+        </p:nvSpPr>
+        <p:spPr>
+          <a:xfrm>
+            <a:off x="7622134" y="5535976"/>
+            <a:ext cx="388620" cy="230832"/>
+          </a:xfrm>
+          <a:prstGeom prst="rect">
+            <a:avLst/>
+          </a:prstGeom>
+          <a:noFill/>
+        </p:spPr>
+        <p:txBody>
+          <a:bodyPr wrap="square" rtlCol="0">
+            <a:spAutoFit/>
+          </a:bodyPr>
+          <a:lstStyle/>
+          <a:p>
+            <a:r>
+              <a:rPr lang="en-US" sz="900" b="1" dirty="0"/>
+              <a:t>12</a:t>
+            </a:r>
+          </a:p>
+        </p:txBody>
+      </p:sp>
+      <p:sp>
+        <p:nvSpPr>
+          <p:cNvPr id="34" name="TextBox 33"/>
+          <p:cNvSpPr txBox="1"/>
+          <p:nvPr/>
+        </p:nvSpPr>
+        <p:spPr>
+          <a:xfrm>
+            <a:off x="6305279" y="5496099"/>
+            <a:ext cx="388620" cy="230832"/>
+          </a:xfrm>
+          <a:prstGeom prst="rect">
+            <a:avLst/>
+          </a:prstGeom>
+          <a:noFill/>
+        </p:spPr>
+        <p:txBody>
+          <a:bodyPr wrap="square" rtlCol="0">
+            <a:spAutoFit/>
+          </a:bodyPr>
+          <a:lstStyle/>
+          <a:p>
+            <a:r>
+              <a:rPr lang="en-US" sz="900" b="1" dirty="0"/>
+              <a:t>13</a:t>
+            </a:r>
+          </a:p>
+        </p:txBody>
+      </p:sp>
+      <p:sp>
+        <p:nvSpPr>
+          <p:cNvPr id="35" name="TextBox 34"/>
+          <p:cNvSpPr txBox="1"/>
+          <p:nvPr/>
+        </p:nvSpPr>
+        <p:spPr>
+          <a:xfrm>
+            <a:off x="8843200" y="5369382"/>
+            <a:ext cx="388620" cy="230832"/>
+          </a:xfrm>
+          <a:prstGeom prst="rect">
+            <a:avLst/>
+          </a:prstGeom>
+          <a:noFill/>
+        </p:spPr>
+        <p:txBody>
+          <a:bodyPr wrap="square" rtlCol="0">
+            <a:spAutoFit/>
+          </a:bodyPr>
+          <a:lstStyle/>
+          <a:p>
+            <a:r>
+              <a:rPr lang="en-US" sz="900" b="1" dirty="0"/>
+              <a:t>10</a:t>
+            </a:r>
+          </a:p>
+        </p:txBody>
+      </p:sp>
+      <p:sp>
+        <p:nvSpPr>
+          <p:cNvPr id="37" name="TextBox 36"/>
+          <p:cNvSpPr txBox="1"/>
+          <p:nvPr/>
+        </p:nvSpPr>
+        <p:spPr>
+          <a:xfrm>
+            <a:off x="10318547" y="3319605"/>
+            <a:ext cx="388620" cy="230832"/>
+          </a:xfrm>
+          <a:prstGeom prst="rect">
+            <a:avLst/>
+          </a:prstGeom>
+          <a:noFill/>
+        </p:spPr>
+        <p:txBody>
+          <a:bodyPr wrap="square" rtlCol="0">
+            <a:spAutoFit/>
+          </a:bodyPr>
+          <a:lstStyle/>
+          <a:p>
+            <a:r>
+              <a:rPr lang="en-US" sz="900" b="1" dirty="0"/>
+              <a:t>2</a:t>
+            </a:r>
+          </a:p>
+        </p:txBody>
+      </p:sp>
+      <p:sp>
+        <p:nvSpPr>
+          <p:cNvPr id="42" name="TextBox 41"/>
+          <p:cNvSpPr txBox="1"/>
+          <p:nvPr/>
+        </p:nvSpPr>
+        <p:spPr>
+          <a:xfrm>
+            <a:off x="10519679" y="3578038"/>
+            <a:ext cx="388620" cy="230832"/>
+          </a:xfrm>
+          <a:prstGeom prst="rect">
+            <a:avLst/>
+          </a:prstGeom>
+          <a:noFill/>
+        </p:spPr>
+        <p:txBody>
+          <a:bodyPr wrap="square" rtlCol="0">
+            <a:spAutoFit/>
+          </a:bodyPr>
+          <a:lstStyle/>
+          <a:p>
+            <a:r>
+              <a:rPr lang="en-US" sz="900" b="1" dirty="0"/>
+              <a:t>3</a:t>
+            </a:r>
+          </a:p>
+        </p:txBody>
+      </p:sp>
+      <p:sp>
+        <p:nvSpPr>
+          <p:cNvPr id="43" name="TextBox 42"/>
+          <p:cNvSpPr txBox="1"/>
+          <p:nvPr/>
+        </p:nvSpPr>
+        <p:spPr>
+          <a:xfrm>
+            <a:off x="7876175" y="3538148"/>
+            <a:ext cx="388620" cy="230832"/>
+          </a:xfrm>
+          <a:prstGeom prst="rect">
+            <a:avLst/>
+          </a:prstGeom>
+          <a:noFill/>
+        </p:spPr>
+        <p:txBody>
+          <a:bodyPr wrap="square" rtlCol="0">
+            <a:spAutoFit/>
+          </a:bodyPr>
+          <a:lstStyle/>
+          <a:p>
+            <a:r>
+              <a:rPr lang="en-US" sz="900" b="1" dirty="0"/>
+              <a:t>4</a:t>
+            </a:r>
+          </a:p>
+        </p:txBody>
+      </p:sp>
+      <p:sp>
+        <p:nvSpPr>
+          <p:cNvPr id="44" name="TextBox 43"/>
+          <p:cNvSpPr txBox="1"/>
+          <p:nvPr/>
+        </p:nvSpPr>
+        <p:spPr>
+          <a:xfrm>
+            <a:off x="10651560" y="3960574"/>
+            <a:ext cx="388620" cy="230832"/>
+          </a:xfrm>
+          <a:prstGeom prst="rect">
+            <a:avLst/>
+          </a:prstGeom>
+          <a:noFill/>
+        </p:spPr>
+        <p:txBody>
+          <a:bodyPr wrap="square" rtlCol="0">
+            <a:spAutoFit/>
+          </a:bodyPr>
+          <a:lstStyle/>
+          <a:p>
+            <a:r>
+              <a:rPr lang="en-US" sz="900" b="1" dirty="0"/>
+              <a:t>5</a:t>
+            </a:r>
+          </a:p>
+        </p:txBody>
+      </p:sp>
+      <p:sp>
+        <p:nvSpPr>
+          <p:cNvPr id="45" name="TextBox 44"/>
+          <p:cNvSpPr txBox="1"/>
+          <p:nvPr/>
+        </p:nvSpPr>
+        <p:spPr>
+          <a:xfrm>
+            <a:off x="10646564" y="4351382"/>
+            <a:ext cx="388620" cy="230832"/>
+          </a:xfrm>
+          <a:prstGeom prst="rect">
+            <a:avLst/>
+          </a:prstGeom>
+          <a:noFill/>
+        </p:spPr>
+        <p:txBody>
+          <a:bodyPr wrap="square" rtlCol="0">
+            <a:spAutoFit/>
+          </a:bodyPr>
+          <a:lstStyle/>
+          <a:p>
+            <a:r>
+              <a:rPr lang="en-US" sz="900" b="1" dirty="0"/>
+              <a:t>6</a:t>
+            </a:r>
+          </a:p>
+        </p:txBody>
+      </p:sp>
+      <p:sp>
+        <p:nvSpPr>
+          <p:cNvPr id="46" name="TextBox 45"/>
+          <p:cNvSpPr txBox="1"/>
+          <p:nvPr/>
+        </p:nvSpPr>
+        <p:spPr>
+          <a:xfrm>
+            <a:off x="10329458" y="4610370"/>
+            <a:ext cx="388620" cy="230832"/>
+          </a:xfrm>
+          <a:prstGeom prst="rect">
+            <a:avLst/>
+          </a:prstGeom>
+          <a:noFill/>
+        </p:spPr>
+        <p:txBody>
+          <a:bodyPr wrap="square" rtlCol="0">
+            <a:spAutoFit/>
+          </a:bodyPr>
+          <a:lstStyle/>
+          <a:p>
+            <a:r>
+              <a:rPr lang="en-US" sz="900" b="1" dirty="0"/>
+              <a:t>7</a:t>
+            </a:r>
+          </a:p>
+        </p:txBody>
+      </p:sp>
+      <p:sp>
+        <p:nvSpPr>
+          <p:cNvPr id="47" name="TextBox 46"/>
+          <p:cNvSpPr txBox="1"/>
+          <p:nvPr/>
+        </p:nvSpPr>
+        <p:spPr>
+          <a:xfrm>
+            <a:off x="8205505" y="4038961"/>
+            <a:ext cx="388620" cy="230832"/>
+          </a:xfrm>
+          <a:prstGeom prst="rect">
+            <a:avLst/>
+          </a:prstGeom>
+          <a:noFill/>
+        </p:spPr>
+        <p:txBody>
+          <a:bodyPr wrap="square" rtlCol="0">
+            <a:spAutoFit/>
+          </a:bodyPr>
+          <a:lstStyle/>
+          <a:p>
+            <a:r>
+              <a:rPr lang="en-US" sz="900" b="1" dirty="0"/>
+              <a:t>8</a:t>
+            </a:r>
+          </a:p>
+        </p:txBody>
+      </p:sp>
+      <p:sp>
+        <p:nvSpPr>
+          <p:cNvPr id="48" name="TextBox 47"/>
+          <p:cNvSpPr txBox="1"/>
+          <p:nvPr/>
+        </p:nvSpPr>
+        <p:spPr>
+          <a:xfrm>
+            <a:off x="9661615" y="5094598"/>
+            <a:ext cx="388620" cy="230832"/>
+          </a:xfrm>
+          <a:prstGeom prst="rect">
+            <a:avLst/>
+          </a:prstGeom>
+          <a:noFill/>
+        </p:spPr>
+        <p:txBody>
+          <a:bodyPr wrap="square" rtlCol="0">
+            <a:spAutoFit/>
+          </a:bodyPr>
+          <a:lstStyle/>
+          <a:p>
+            <a:r>
+              <a:rPr lang="en-US" sz="900" b="1" dirty="0"/>
+              <a:t>9</a:t>
+            </a:r>
+          </a:p>
+        </p:txBody>
+      </p:sp>
+      <p:sp>
+        <p:nvSpPr>
+          <p:cNvPr id="50" name="Oval 49"/>
           <p:cNvSpPr/>
           <p:nvPr/>
         </p:nvSpPr>
         <p:spPr>
           <a:xfrm>
-            <a:off x="5695509" y="4082404"/>
+            <a:off x="10410265" y="3845861"/>
             <a:ext cx="89138" cy="91440"/>
           </a:xfrm>
           <a:prstGeom prst="ellipse">
@@ -4594,14 +4925,14 @@
       </p:sp>
       <p:sp>
         <p:nvSpPr>
-          <p:cNvPr id="12" name="Oval 11"/>
+          <p:cNvPr id="51" name="Oval 50"/>
           <p:cNvSpPr/>
           <p:nvPr/>
         </p:nvSpPr>
         <p:spPr>
           <a:xfrm>
-            <a:off x="5695509" y="3258620"/>
-            <a:ext cx="89138" cy="102624"/>
+            <a:off x="8183912" y="4234997"/>
+            <a:ext cx="89138" cy="91440"/>
           </a:xfrm>
           <a:prstGeom prst="ellipse">
             <a:avLst/>
@@ -4636,20 +4967,20 @@
           <a:lstStyle/>
           <a:p>
             <a:pPr algn="ctr"/>
-            <a:endParaRPr lang="en-US" dirty="0"/>
-          </a:p>
-        </p:txBody>
-      </p:sp>
-      <p:sp>
-        <p:nvSpPr>
-          <p:cNvPr id="13" name="Oval 12"/>
+            <a:endParaRPr lang="en-US"/>
+          </a:p>
+        </p:txBody>
+      </p:sp>
+      <p:sp>
+        <p:nvSpPr>
+          <p:cNvPr id="52" name="Oval 51"/>
           <p:cNvSpPr/>
           <p:nvPr/>
         </p:nvSpPr>
         <p:spPr>
           <a:xfrm>
-            <a:off x="7605827" y="5125520"/>
-            <a:ext cx="89138" cy="102624"/>
+            <a:off x="7599716" y="5118574"/>
+            <a:ext cx="89138" cy="91440"/>
           </a:xfrm>
           <a:prstGeom prst="ellipse">
             <a:avLst/>
@@ -4690,14 +5021,14 @@
       </p:sp>
       <p:sp>
         <p:nvSpPr>
-          <p:cNvPr id="14" name="Oval 13"/>
+          <p:cNvPr id="53" name="Oval 52"/>
           <p:cNvSpPr/>
           <p:nvPr/>
         </p:nvSpPr>
         <p:spPr>
           <a:xfrm>
-            <a:off x="7605827" y="3083360"/>
-            <a:ext cx="89138" cy="102624"/>
+            <a:off x="8070485" y="3448414"/>
+            <a:ext cx="89138" cy="91440"/>
           </a:xfrm>
           <a:prstGeom prst="ellipse">
             <a:avLst/>
@@ -4738,14 +5069,14 @@
       </p:sp>
       <p:sp>
         <p:nvSpPr>
-          <p:cNvPr id="15" name="Oval 14"/>
+          <p:cNvPr id="54" name="Oval 53"/>
           <p:cNvSpPr/>
           <p:nvPr/>
         </p:nvSpPr>
         <p:spPr>
           <a:xfrm>
-            <a:off x="10196627" y="3563420"/>
-            <a:ext cx="89138" cy="102624"/>
+            <a:off x="10229409" y="3572745"/>
+            <a:ext cx="89138" cy="91440"/>
           </a:xfrm>
           <a:prstGeom prst="ellipse">
             <a:avLst/>
@@ -4786,14 +5117,14 @@
       </p:sp>
       <p:sp>
         <p:nvSpPr>
-          <p:cNvPr id="16" name="Oval 15"/>
+          <p:cNvPr id="55" name="Oval 54"/>
           <p:cNvSpPr/>
           <p:nvPr/>
         </p:nvSpPr>
         <p:spPr>
           <a:xfrm>
-            <a:off x="10387127" y="3792020"/>
-            <a:ext cx="89138" cy="102624"/>
+            <a:off x="5712892" y="4081896"/>
+            <a:ext cx="89138" cy="91440"/>
           </a:xfrm>
           <a:prstGeom prst="ellipse">
             <a:avLst/>
@@ -4834,14 +5165,14 @@
       </p:sp>
       <p:sp>
         <p:nvSpPr>
-          <p:cNvPr id="17" name="Oval 16"/>
+          <p:cNvPr id="56" name="Oval 55"/>
           <p:cNvSpPr/>
           <p:nvPr/>
         </p:nvSpPr>
         <p:spPr>
           <a:xfrm>
-            <a:off x="10479634" y="4025500"/>
-            <a:ext cx="89138" cy="102624"/>
+            <a:off x="10393077" y="4263728"/>
+            <a:ext cx="89138" cy="91440"/>
           </a:xfrm>
           <a:prstGeom prst="ellipse">
             <a:avLst/>
@@ -4882,14 +5213,14 @@
       </p:sp>
       <p:sp>
         <p:nvSpPr>
-          <p:cNvPr id="18" name="Oval 17"/>
+          <p:cNvPr id="57" name="Oval 56"/>
           <p:cNvSpPr/>
           <p:nvPr/>
         </p:nvSpPr>
         <p:spPr>
           <a:xfrm>
-            <a:off x="10431696" y="4258980"/>
-            <a:ext cx="89138" cy="102624"/>
+            <a:off x="10055747" y="4518930"/>
+            <a:ext cx="89138" cy="91440"/>
           </a:xfrm>
           <a:prstGeom prst="ellipse">
             <a:avLst/>
@@ -4930,14 +5261,14 @@
       </p:sp>
       <p:sp>
         <p:nvSpPr>
-          <p:cNvPr id="19" name="Oval 18"/>
+          <p:cNvPr id="58" name="Oval 57"/>
           <p:cNvSpPr/>
           <p:nvPr/>
         </p:nvSpPr>
         <p:spPr>
           <a:xfrm>
-            <a:off x="10107489" y="4508300"/>
-            <a:ext cx="89138" cy="102624"/>
+            <a:off x="9562749" y="4736258"/>
+            <a:ext cx="89138" cy="91440"/>
           </a:xfrm>
           <a:prstGeom prst="ellipse">
             <a:avLst/>
@@ -4978,14 +5309,14 @@
       </p:sp>
       <p:sp>
         <p:nvSpPr>
-          <p:cNvPr id="20" name="Oval 19"/>
+          <p:cNvPr id="59" name="Oval 58"/>
           <p:cNvSpPr/>
           <p:nvPr/>
         </p:nvSpPr>
         <p:spPr>
           <a:xfrm>
-            <a:off x="9510827" y="4752140"/>
-            <a:ext cx="89138" cy="102624"/>
+            <a:off x="8801567" y="4943120"/>
+            <a:ext cx="89138" cy="91440"/>
           </a:xfrm>
           <a:prstGeom prst="ellipse">
             <a:avLst/>
@@ -5026,14 +5357,14 @@
       </p:sp>
       <p:sp>
         <p:nvSpPr>
-          <p:cNvPr id="21" name="Oval 20"/>
+          <p:cNvPr id="60" name="Oval 59"/>
           <p:cNvSpPr/>
           <p:nvPr/>
         </p:nvSpPr>
         <p:spPr>
           <a:xfrm>
-            <a:off x="8809787" y="4957880"/>
-            <a:ext cx="89138" cy="102624"/>
+            <a:off x="2853249" y="3677540"/>
+            <a:ext cx="89138" cy="91440"/>
           </a:xfrm>
           <a:prstGeom prst="ellipse">
             <a:avLst/>
@@ -5074,14 +5405,14 @@
       </p:sp>
       <p:sp>
         <p:nvSpPr>
-          <p:cNvPr id="22" name="Oval 21"/>
+          <p:cNvPr id="61" name="Oval 60"/>
           <p:cNvSpPr/>
           <p:nvPr/>
         </p:nvSpPr>
         <p:spPr>
           <a:xfrm>
-            <a:off x="6737147" y="4098960"/>
-            <a:ext cx="89138" cy="102624"/>
+            <a:off x="6410451" y="5118574"/>
+            <a:ext cx="89138" cy="91440"/>
           </a:xfrm>
           <a:prstGeom prst="ellipse">
             <a:avLst/>
@@ -5120,16 +5451,546 @@
           </a:p>
         </p:txBody>
       </p:sp>
-      <p:sp>
-        <p:nvSpPr>
-          <p:cNvPr id="23" name="Oval 22"/>
+    </p:spTree>
+    <p:extLst>
+      <p:ext uri="{BB962C8B-B14F-4D97-AF65-F5344CB8AC3E}">
+        <p14:creationId xmlns:p14="http://schemas.microsoft.com/office/powerpoint/2010/main" val="3776460200"/>
+      </p:ext>
+    </p:extLst>
+  </p:cSld>
+  <p:clrMapOvr>
+    <a:masterClrMapping/>
+  </p:clrMapOvr>
+</p:sld>
+</file>
+
+<file path=ppt/slides/slide4.xml><?xml version="1.0" encoding="utf-8"?>
+<p:sld xmlns:a="http://schemas.openxmlformats.org/drawingml/2006/main" xmlns:r="http://schemas.openxmlformats.org/officeDocument/2006/relationships" xmlns:p="http://schemas.openxmlformats.org/presentationml/2006/main">
+  <p:cSld>
+    <p:spTree>
+      <p:nvGrpSpPr>
+        <p:cNvPr id="1" name=""/>
+        <p:cNvGrpSpPr/>
+        <p:nvPr/>
+      </p:nvGrpSpPr>
+      <p:grpSpPr>
+        <a:xfrm>
+          <a:off x="0" y="0"/>
+          <a:ext cx="0" cy="0"/>
+          <a:chOff x="0" y="0"/>
+          <a:chExt cx="0" cy="0"/>
+        </a:xfrm>
+      </p:grpSpPr>
+      <p:sp>
+        <p:nvSpPr>
+          <p:cNvPr id="2" name="Title 1"/>
+          <p:cNvSpPr>
+            <a:spLocks noGrp="1"/>
+          </p:cNvSpPr>
+          <p:nvPr>
+            <p:ph type="title"/>
+          </p:nvPr>
+        </p:nvSpPr>
+        <p:spPr/>
+        <p:txBody>
+          <a:bodyPr/>
+          <a:lstStyle/>
+          <a:p>
+            <a:r>
+              <a:rPr lang="en-US" dirty="0"/>
+              <a:t>13 and 18 landmarks</a:t>
+            </a:r>
+          </a:p>
+        </p:txBody>
+      </p:sp>
+      <p:sp>
+        <p:nvSpPr>
+          <p:cNvPr id="3" name="Content Placeholder 2"/>
+          <p:cNvSpPr>
+            <a:spLocks noGrp="1"/>
+          </p:cNvSpPr>
+          <p:nvPr>
+            <p:ph idx="1"/>
+          </p:nvPr>
+        </p:nvSpPr>
+        <p:spPr/>
+        <p:txBody>
+          <a:bodyPr/>
+          <a:lstStyle/>
+          <a:p>
+            <a:endParaRPr lang="en-US"/>
+          </a:p>
+        </p:txBody>
+      </p:sp>
+      <p:pic>
+        <p:nvPicPr>
+          <p:cNvPr id="4" name="Content Placeholder 3"/>
+          <p:cNvPicPr>
+            <a:picLocks noChangeAspect="1"/>
+          </p:cNvPicPr>
+          <p:nvPr/>
+        </p:nvPicPr>
+        <p:blipFill>
+          <a:blip r:embed="rId2">
+            <a:extLst>
+              <a:ext uri="{28A0092B-C50C-407E-A947-70E740481C1C}">
+                <a14:useLocalDpi xmlns:a14="http://schemas.microsoft.com/office/drawing/2010/main" val="0"/>
+              </a:ext>
+            </a:extLst>
+          </a:blip>
+          <a:stretch>
+            <a:fillRect/>
+          </a:stretch>
+        </p:blipFill>
+        <p:spPr>
+          <a:xfrm>
+            <a:off x="952500" y="1986756"/>
+            <a:ext cx="10287000" cy="4029075"/>
+          </a:xfrm>
+          <a:prstGeom prst="rect">
+            <a:avLst/>
+          </a:prstGeom>
+        </p:spPr>
+      </p:pic>
+      <p:sp>
+        <p:nvSpPr>
+          <p:cNvPr id="5" name="TextBox 4"/>
+          <p:cNvSpPr txBox="1"/>
+          <p:nvPr/>
+        </p:nvSpPr>
+        <p:spPr>
+          <a:xfrm>
+            <a:off x="2658939" y="3701564"/>
+            <a:ext cx="388620" cy="292388"/>
+          </a:xfrm>
+          <a:prstGeom prst="rect">
+            <a:avLst/>
+          </a:prstGeom>
+          <a:noFill/>
+        </p:spPr>
+        <p:txBody>
+          <a:bodyPr wrap="square" rtlCol="0">
+            <a:spAutoFit/>
+          </a:bodyPr>
+          <a:lstStyle/>
+          <a:p>
+            <a:r>
+              <a:rPr lang="en-US" sz="1300" b="1" dirty="0">
+                <a:solidFill>
+                  <a:schemeClr val="bg1"/>
+                </a:solidFill>
+              </a:rPr>
+              <a:t>1</a:t>
+            </a:r>
+          </a:p>
+        </p:txBody>
+      </p:sp>
+      <p:sp>
+        <p:nvSpPr>
+          <p:cNvPr id="6" name="TextBox 5"/>
+          <p:cNvSpPr txBox="1"/>
+          <p:nvPr/>
+        </p:nvSpPr>
+        <p:spPr>
+          <a:xfrm>
+            <a:off x="5563151" y="3847416"/>
+            <a:ext cx="388620" cy="292388"/>
+          </a:xfrm>
+          <a:prstGeom prst="rect">
+            <a:avLst/>
+          </a:prstGeom>
+          <a:noFill/>
+        </p:spPr>
+        <p:txBody>
+          <a:bodyPr wrap="square" rtlCol="0">
+            <a:spAutoFit/>
+          </a:bodyPr>
+          <a:lstStyle/>
+          <a:p>
+            <a:r>
+              <a:rPr lang="en-US" sz="1300" b="1" dirty="0">
+                <a:solidFill>
+                  <a:schemeClr val="bg1"/>
+                </a:solidFill>
+              </a:rPr>
+              <a:t>11</a:t>
+            </a:r>
+          </a:p>
+        </p:txBody>
+      </p:sp>
+      <p:sp>
+        <p:nvSpPr>
+          <p:cNvPr id="7" name="TextBox 6"/>
+          <p:cNvSpPr txBox="1"/>
+          <p:nvPr/>
+        </p:nvSpPr>
+        <p:spPr>
+          <a:xfrm>
+            <a:off x="7589191" y="5224951"/>
+            <a:ext cx="388620" cy="292388"/>
+          </a:xfrm>
+          <a:prstGeom prst="rect">
+            <a:avLst/>
+          </a:prstGeom>
+          <a:noFill/>
+        </p:spPr>
+        <p:txBody>
+          <a:bodyPr wrap="square" rtlCol="0">
+            <a:spAutoFit/>
+          </a:bodyPr>
+          <a:lstStyle/>
+          <a:p>
+            <a:r>
+              <a:rPr lang="en-US" sz="1300" b="1" dirty="0">
+                <a:solidFill>
+                  <a:schemeClr val="bg1"/>
+                </a:solidFill>
+              </a:rPr>
+              <a:t>12</a:t>
+            </a:r>
+          </a:p>
+        </p:txBody>
+      </p:sp>
+      <p:sp>
+        <p:nvSpPr>
+          <p:cNvPr id="8" name="TextBox 7"/>
+          <p:cNvSpPr txBox="1"/>
+          <p:nvPr/>
+        </p:nvSpPr>
+        <p:spPr>
+          <a:xfrm>
+            <a:off x="6305279" y="5224951"/>
+            <a:ext cx="388620" cy="292388"/>
+          </a:xfrm>
+          <a:prstGeom prst="rect">
+            <a:avLst/>
+          </a:prstGeom>
+          <a:noFill/>
+        </p:spPr>
+        <p:txBody>
+          <a:bodyPr wrap="square" rtlCol="0">
+            <a:spAutoFit/>
+          </a:bodyPr>
+          <a:lstStyle/>
+          <a:p>
+            <a:r>
+              <a:rPr lang="en-US" sz="1300" b="1" dirty="0">
+                <a:solidFill>
+                  <a:schemeClr val="bg1"/>
+                </a:solidFill>
+              </a:rPr>
+              <a:t>13</a:t>
+            </a:r>
+          </a:p>
+        </p:txBody>
+      </p:sp>
+      <p:sp>
+        <p:nvSpPr>
+          <p:cNvPr id="9" name="TextBox 8"/>
+          <p:cNvSpPr txBox="1"/>
+          <p:nvPr/>
+        </p:nvSpPr>
+        <p:spPr>
+          <a:xfrm>
+            <a:off x="8801567" y="5063820"/>
+            <a:ext cx="388620" cy="292388"/>
+          </a:xfrm>
+          <a:prstGeom prst="rect">
+            <a:avLst/>
+          </a:prstGeom>
+          <a:noFill/>
+        </p:spPr>
+        <p:txBody>
+          <a:bodyPr wrap="square" rtlCol="0">
+            <a:spAutoFit/>
+          </a:bodyPr>
+          <a:lstStyle/>
+          <a:p>
+            <a:r>
+              <a:rPr lang="en-US" sz="1300" b="1" dirty="0">
+                <a:solidFill>
+                  <a:schemeClr val="bg1"/>
+                </a:solidFill>
+              </a:rPr>
+              <a:t>10</a:t>
+            </a:r>
+          </a:p>
+        </p:txBody>
+      </p:sp>
+      <p:sp>
+        <p:nvSpPr>
+          <p:cNvPr id="10" name="TextBox 9"/>
+          <p:cNvSpPr txBox="1"/>
+          <p:nvPr/>
+        </p:nvSpPr>
+        <p:spPr>
+          <a:xfrm>
+            <a:off x="10287905" y="3403599"/>
+            <a:ext cx="388620" cy="292388"/>
+          </a:xfrm>
+          <a:prstGeom prst="rect">
+            <a:avLst/>
+          </a:prstGeom>
+          <a:noFill/>
+        </p:spPr>
+        <p:txBody>
+          <a:bodyPr wrap="square" rtlCol="0">
+            <a:spAutoFit/>
+          </a:bodyPr>
+          <a:lstStyle/>
+          <a:p>
+            <a:r>
+              <a:rPr lang="en-US" sz="1300" b="1" dirty="0">
+                <a:solidFill>
+                  <a:schemeClr val="bg1"/>
+                </a:solidFill>
+              </a:rPr>
+              <a:t>2</a:t>
+            </a:r>
+          </a:p>
+        </p:txBody>
+      </p:sp>
+      <p:sp>
+        <p:nvSpPr>
+          <p:cNvPr id="11" name="TextBox 10"/>
+          <p:cNvSpPr txBox="1"/>
+          <p:nvPr/>
+        </p:nvSpPr>
+        <p:spPr>
+          <a:xfrm>
+            <a:off x="10468399" y="3669584"/>
+            <a:ext cx="388620" cy="292388"/>
+          </a:xfrm>
+          <a:prstGeom prst="rect">
+            <a:avLst/>
+          </a:prstGeom>
+          <a:noFill/>
+        </p:spPr>
+        <p:txBody>
+          <a:bodyPr wrap="square" rtlCol="0">
+            <a:spAutoFit/>
+          </a:bodyPr>
+          <a:lstStyle/>
+          <a:p>
+            <a:r>
+              <a:rPr lang="en-US" sz="1300" b="1" dirty="0">
+                <a:solidFill>
+                  <a:schemeClr val="bg1"/>
+                </a:solidFill>
+              </a:rPr>
+              <a:t>3</a:t>
+            </a:r>
+          </a:p>
+        </p:txBody>
+      </p:sp>
+      <p:sp>
+        <p:nvSpPr>
+          <p:cNvPr id="12" name="TextBox 11"/>
+          <p:cNvSpPr txBox="1"/>
+          <p:nvPr/>
+        </p:nvSpPr>
+        <p:spPr>
+          <a:xfrm>
+            <a:off x="7977811" y="3167272"/>
+            <a:ext cx="388620" cy="292388"/>
+          </a:xfrm>
+          <a:prstGeom prst="rect">
+            <a:avLst/>
+          </a:prstGeom>
+          <a:noFill/>
+        </p:spPr>
+        <p:txBody>
+          <a:bodyPr wrap="square" rtlCol="0">
+            <a:spAutoFit/>
+          </a:bodyPr>
+          <a:lstStyle/>
+          <a:p>
+            <a:r>
+              <a:rPr lang="en-US" sz="1300" b="1" dirty="0">
+                <a:solidFill>
+                  <a:schemeClr val="bg1"/>
+                </a:solidFill>
+              </a:rPr>
+              <a:t>4</a:t>
+            </a:r>
+          </a:p>
+        </p:txBody>
+      </p:sp>
+      <p:sp>
+        <p:nvSpPr>
+          <p:cNvPr id="13" name="TextBox 12"/>
+          <p:cNvSpPr txBox="1"/>
+          <p:nvPr/>
+        </p:nvSpPr>
+        <p:spPr>
+          <a:xfrm>
+            <a:off x="10526533" y="3909120"/>
+            <a:ext cx="388620" cy="292388"/>
+          </a:xfrm>
+          <a:prstGeom prst="rect">
+            <a:avLst/>
+          </a:prstGeom>
+          <a:noFill/>
+        </p:spPr>
+        <p:txBody>
+          <a:bodyPr wrap="square" rtlCol="0">
+            <a:spAutoFit/>
+          </a:bodyPr>
+          <a:lstStyle/>
+          <a:p>
+            <a:r>
+              <a:rPr lang="en-US" sz="1300" b="1" dirty="0">
+                <a:solidFill>
+                  <a:schemeClr val="bg1"/>
+                </a:solidFill>
+              </a:rPr>
+              <a:t>5</a:t>
+            </a:r>
+          </a:p>
+        </p:txBody>
+      </p:sp>
+      <p:sp>
+        <p:nvSpPr>
+          <p:cNvPr id="14" name="TextBox 13"/>
+          <p:cNvSpPr txBox="1"/>
+          <p:nvPr/>
+        </p:nvSpPr>
+        <p:spPr>
+          <a:xfrm>
+            <a:off x="10507047" y="4268447"/>
+            <a:ext cx="438669" cy="292388"/>
+          </a:xfrm>
+          <a:prstGeom prst="rect">
+            <a:avLst/>
+          </a:prstGeom>
+          <a:noFill/>
+        </p:spPr>
+        <p:txBody>
+          <a:bodyPr wrap="square" rtlCol="0">
+            <a:spAutoFit/>
+          </a:bodyPr>
+          <a:lstStyle/>
+          <a:p>
+            <a:r>
+              <a:rPr lang="en-US" sz="1300" b="1" dirty="0">
+                <a:solidFill>
+                  <a:schemeClr val="bg1"/>
+                </a:solidFill>
+              </a:rPr>
+              <a:t>6</a:t>
+            </a:r>
+          </a:p>
+        </p:txBody>
+      </p:sp>
+      <p:sp>
+        <p:nvSpPr>
+          <p:cNvPr id="15" name="TextBox 14"/>
+          <p:cNvSpPr txBox="1"/>
+          <p:nvPr/>
+        </p:nvSpPr>
+        <p:spPr>
+          <a:xfrm>
+            <a:off x="10114701" y="4512149"/>
+            <a:ext cx="388620" cy="292388"/>
+          </a:xfrm>
+          <a:prstGeom prst="rect">
+            <a:avLst/>
+          </a:prstGeom>
+          <a:noFill/>
+        </p:spPr>
+        <p:txBody>
+          <a:bodyPr wrap="square" rtlCol="0">
+            <a:spAutoFit/>
+          </a:bodyPr>
+          <a:lstStyle/>
+          <a:p>
+            <a:r>
+              <a:rPr lang="en-US" sz="1300" b="1" dirty="0">
+                <a:solidFill>
+                  <a:schemeClr val="bg1"/>
+                </a:solidFill>
+              </a:rPr>
+              <a:t>7</a:t>
+            </a:r>
+          </a:p>
+        </p:txBody>
+      </p:sp>
+      <p:sp>
+        <p:nvSpPr>
+          <p:cNvPr id="16" name="TextBox 15"/>
+          <p:cNvSpPr txBox="1"/>
+          <p:nvPr/>
+        </p:nvSpPr>
+        <p:spPr>
+          <a:xfrm>
+            <a:off x="8078740" y="3968505"/>
+            <a:ext cx="388620" cy="292388"/>
+          </a:xfrm>
+          <a:prstGeom prst="rect">
+            <a:avLst/>
+          </a:prstGeom>
+          <a:noFill/>
+        </p:spPr>
+        <p:txBody>
+          <a:bodyPr wrap="square" rtlCol="0">
+            <a:spAutoFit/>
+          </a:bodyPr>
+          <a:lstStyle/>
+          <a:p>
+            <a:r>
+              <a:rPr lang="en-US" sz="1300" b="1" dirty="0">
+                <a:solidFill>
+                  <a:schemeClr val="bg1"/>
+                </a:solidFill>
+              </a:rPr>
+              <a:t>8</a:t>
+            </a:r>
+          </a:p>
+        </p:txBody>
+      </p:sp>
+      <p:sp>
+        <p:nvSpPr>
+          <p:cNvPr id="17" name="TextBox 16"/>
+          <p:cNvSpPr txBox="1"/>
+          <p:nvPr/>
+        </p:nvSpPr>
+        <p:spPr>
+          <a:xfrm>
+            <a:off x="9607318" y="4816441"/>
+            <a:ext cx="388620" cy="292388"/>
+          </a:xfrm>
+          <a:prstGeom prst="rect">
+            <a:avLst/>
+          </a:prstGeom>
+          <a:noFill/>
+        </p:spPr>
+        <p:txBody>
+          <a:bodyPr wrap="square" rtlCol="0">
+            <a:spAutoFit/>
+          </a:bodyPr>
+          <a:lstStyle/>
+          <a:p>
+            <a:r>
+              <a:rPr lang="en-US" sz="1300" b="1" dirty="0">
+                <a:solidFill>
+                  <a:schemeClr val="bg1"/>
+                </a:solidFill>
+              </a:rPr>
+              <a:t>9</a:t>
+            </a:r>
+          </a:p>
+        </p:txBody>
+      </p:sp>
+      <p:sp>
+        <p:nvSpPr>
+          <p:cNvPr id="18" name="Oval 17"/>
           <p:cNvSpPr/>
           <p:nvPr/>
         </p:nvSpPr>
         <p:spPr>
           <a:xfrm>
-            <a:off x="6737147" y="3855832"/>
-            <a:ext cx="89138" cy="102624"/>
+            <a:off x="10393731" y="3815778"/>
+            <a:ext cx="89138" cy="91440"/>
           </a:xfrm>
           <a:prstGeom prst="ellipse">
             <a:avLst/>
@@ -5164,20 +6025,24 @@
           <a:lstStyle/>
           <a:p>
             <a:pPr algn="ctr"/>
-            <a:endParaRPr lang="en-US"/>
-          </a:p>
-        </p:txBody>
-      </p:sp>
-      <p:sp>
-        <p:nvSpPr>
-          <p:cNvPr id="24" name="Oval 23"/>
+            <a:endParaRPr lang="en-US" sz="1300">
+              <a:solidFill>
+                <a:schemeClr val="bg1"/>
+              </a:solidFill>
+            </a:endParaRPr>
+          </a:p>
+        </p:txBody>
+      </p:sp>
+      <p:sp>
+        <p:nvSpPr>
+          <p:cNvPr id="19" name="Oval 18"/>
           <p:cNvSpPr/>
           <p:nvPr/>
         </p:nvSpPr>
         <p:spPr>
           <a:xfrm>
-            <a:off x="7270547" y="4001293"/>
-            <a:ext cx="89138" cy="102624"/>
+            <a:off x="8183912" y="4234997"/>
+            <a:ext cx="89138" cy="91440"/>
           </a:xfrm>
           <a:prstGeom prst="ellipse">
             <a:avLst/>
@@ -5212,20 +6077,24 @@
           <a:lstStyle/>
           <a:p>
             <a:pPr algn="ctr"/>
-            <a:endParaRPr lang="en-US"/>
-          </a:p>
-        </p:txBody>
-      </p:sp>
-      <p:sp>
-        <p:nvSpPr>
-          <p:cNvPr id="25" name="Oval 24"/>
+            <a:endParaRPr lang="en-US" sz="1300">
+              <a:solidFill>
+                <a:schemeClr val="bg1"/>
+              </a:solidFill>
+            </a:endParaRPr>
+          </a:p>
+        </p:txBody>
+      </p:sp>
+      <p:sp>
+        <p:nvSpPr>
+          <p:cNvPr id="20" name="Oval 19"/>
           <p:cNvSpPr/>
           <p:nvPr/>
         </p:nvSpPr>
         <p:spPr>
           <a:xfrm>
-            <a:off x="7270547" y="3740708"/>
-            <a:ext cx="89138" cy="102624"/>
+            <a:off x="7599716" y="5118574"/>
+            <a:ext cx="89138" cy="91440"/>
           </a:xfrm>
           <a:prstGeom prst="ellipse">
             <a:avLst/>
@@ -5260,20 +6129,24 @@
           <a:lstStyle/>
           <a:p>
             <a:pPr algn="ctr"/>
-            <a:endParaRPr lang="en-US"/>
-          </a:p>
-        </p:txBody>
-      </p:sp>
-      <p:sp>
-        <p:nvSpPr>
-          <p:cNvPr id="26" name="Oval 25"/>
+            <a:endParaRPr lang="en-US" sz="1300">
+              <a:solidFill>
+                <a:schemeClr val="bg1"/>
+              </a:solidFill>
+            </a:endParaRPr>
+          </a:p>
+        </p:txBody>
+      </p:sp>
+      <p:sp>
+        <p:nvSpPr>
+          <p:cNvPr id="21" name="Oval 20"/>
           <p:cNvSpPr/>
           <p:nvPr/>
         </p:nvSpPr>
         <p:spPr>
           <a:xfrm>
-            <a:off x="7270547" y="3490050"/>
-            <a:ext cx="89138" cy="102624"/>
+            <a:off x="8070485" y="3448414"/>
+            <a:ext cx="89138" cy="91440"/>
           </a:xfrm>
           <a:prstGeom prst="ellipse">
             <a:avLst/>
@@ -5308,20 +6181,24 @@
           <a:lstStyle/>
           <a:p>
             <a:pPr algn="ctr"/>
-            <a:endParaRPr lang="en-US"/>
-          </a:p>
-        </p:txBody>
-      </p:sp>
-      <p:sp>
-        <p:nvSpPr>
-          <p:cNvPr id="27" name="Oval 26"/>
+            <a:endParaRPr lang="en-US" sz="1300">
+              <a:solidFill>
+                <a:schemeClr val="bg1"/>
+              </a:solidFill>
+            </a:endParaRPr>
+          </a:p>
+        </p:txBody>
+      </p:sp>
+      <p:sp>
+        <p:nvSpPr>
+          <p:cNvPr id="22" name="Oval 21"/>
           <p:cNvSpPr/>
           <p:nvPr/>
         </p:nvSpPr>
         <p:spPr>
           <a:xfrm>
-            <a:off x="8184947" y="4220168"/>
-            <a:ext cx="89138" cy="102624"/>
+            <a:off x="10229409" y="3572745"/>
+            <a:ext cx="89138" cy="91440"/>
           </a:xfrm>
           <a:prstGeom prst="ellipse">
             <a:avLst/>
@@ -5356,20 +6233,24 @@
           <a:lstStyle/>
           <a:p>
             <a:pPr algn="ctr"/>
-            <a:endParaRPr lang="en-US"/>
-          </a:p>
-        </p:txBody>
-      </p:sp>
-      <p:sp>
-        <p:nvSpPr>
-          <p:cNvPr id="28" name="Oval 27"/>
+            <a:endParaRPr lang="en-US" sz="1300">
+              <a:solidFill>
+                <a:schemeClr val="bg1"/>
+              </a:solidFill>
+            </a:endParaRPr>
+          </a:p>
+        </p:txBody>
+      </p:sp>
+      <p:sp>
+        <p:nvSpPr>
+          <p:cNvPr id="23" name="Oval 22"/>
           <p:cNvSpPr/>
           <p:nvPr/>
         </p:nvSpPr>
         <p:spPr>
           <a:xfrm>
-            <a:off x="8024927" y="3460796"/>
-            <a:ext cx="89138" cy="102624"/>
+            <a:off x="5712892" y="4081896"/>
+            <a:ext cx="89138" cy="91440"/>
           </a:xfrm>
           <a:prstGeom prst="ellipse">
             <a:avLst/>
@@ -5404,49 +6285,24 @@
           <a:lstStyle/>
           <a:p>
             <a:pPr algn="ctr"/>
-            <a:endParaRPr lang="en-US"/>
-          </a:p>
-        </p:txBody>
-      </p:sp>
-      <p:sp>
-        <p:nvSpPr>
-          <p:cNvPr id="30" name="TextBox 29"/>
-          <p:cNvSpPr txBox="1"/>
-          <p:nvPr/>
-        </p:nvSpPr>
-        <p:spPr>
-          <a:xfrm>
-            <a:off x="5618422" y="3326939"/>
-            <a:ext cx="388620" cy="230832"/>
-          </a:xfrm>
-          <a:prstGeom prst="rect">
-            <a:avLst/>
-          </a:prstGeom>
-          <a:noFill/>
-        </p:spPr>
-        <p:txBody>
-          <a:bodyPr wrap="square" rtlCol="0">
-            <a:spAutoFit/>
-          </a:bodyPr>
-          <a:lstStyle/>
-          <a:p>
-            <a:r>
-              <a:rPr lang="en-US" sz="900" b="1" dirty="0"/>
-              <a:t>1</a:t>
-            </a:r>
-          </a:p>
-        </p:txBody>
-      </p:sp>
-      <p:sp>
-        <p:nvSpPr>
-          <p:cNvPr id="31" name="Oval 30"/>
+            <a:endParaRPr lang="en-US" sz="1300">
+              <a:solidFill>
+                <a:schemeClr val="bg1"/>
+              </a:solidFill>
+            </a:endParaRPr>
+          </a:p>
+        </p:txBody>
+      </p:sp>
+      <p:sp>
+        <p:nvSpPr>
+          <p:cNvPr id="24" name="Oval 23"/>
           <p:cNvSpPr/>
           <p:nvPr/>
         </p:nvSpPr>
         <p:spPr>
           <a:xfrm>
-            <a:off x="5685587" y="4073960"/>
-            <a:ext cx="89138" cy="102624"/>
+            <a:off x="10393077" y="4263728"/>
+            <a:ext cx="89138" cy="91440"/>
           </a:xfrm>
           <a:prstGeom prst="ellipse">
             <a:avLst/>
@@ -5481,20 +6337,490 @@
           <a:lstStyle/>
           <a:p>
             <a:pPr algn="ctr"/>
+            <a:endParaRPr lang="en-US" sz="1300">
+              <a:solidFill>
+                <a:schemeClr val="bg1"/>
+              </a:solidFill>
+            </a:endParaRPr>
+          </a:p>
+        </p:txBody>
+      </p:sp>
+      <p:sp>
+        <p:nvSpPr>
+          <p:cNvPr id="25" name="Oval 24"/>
+          <p:cNvSpPr/>
+          <p:nvPr/>
+        </p:nvSpPr>
+        <p:spPr>
+          <a:xfrm>
+            <a:off x="10055747" y="4518930"/>
+            <a:ext cx="89138" cy="91440"/>
+          </a:xfrm>
+          <a:prstGeom prst="ellipse">
+            <a:avLst/>
+          </a:prstGeom>
+          <a:solidFill>
+            <a:srgbClr val="FFFF00"/>
+          </a:solidFill>
+          <a:ln>
+            <a:solidFill>
+              <a:schemeClr val="tx1"/>
+            </a:solidFill>
+          </a:ln>
+        </p:spPr>
+        <p:style>
+          <a:lnRef idx="2">
+            <a:schemeClr val="accent1">
+              <a:shade val="50000"/>
+            </a:schemeClr>
+          </a:lnRef>
+          <a:fillRef idx="1">
+            <a:schemeClr val="accent1"/>
+          </a:fillRef>
+          <a:effectRef idx="0">
+            <a:schemeClr val="accent1"/>
+          </a:effectRef>
+          <a:fontRef idx="minor">
+            <a:schemeClr val="lt1"/>
+          </a:fontRef>
+        </p:style>
+        <p:txBody>
+          <a:bodyPr rtlCol="0" anchor="ctr"/>
+          <a:lstStyle/>
+          <a:p>
+            <a:pPr algn="ctr"/>
+            <a:endParaRPr lang="en-US" sz="1300">
+              <a:solidFill>
+                <a:schemeClr val="bg1"/>
+              </a:solidFill>
+            </a:endParaRPr>
+          </a:p>
+        </p:txBody>
+      </p:sp>
+      <p:sp>
+        <p:nvSpPr>
+          <p:cNvPr id="26" name="Oval 25"/>
+          <p:cNvSpPr/>
+          <p:nvPr/>
+        </p:nvSpPr>
+        <p:spPr>
+          <a:xfrm>
+            <a:off x="9562749" y="4736258"/>
+            <a:ext cx="89138" cy="91440"/>
+          </a:xfrm>
+          <a:prstGeom prst="ellipse">
+            <a:avLst/>
+          </a:prstGeom>
+          <a:solidFill>
+            <a:srgbClr val="FFFF00"/>
+          </a:solidFill>
+          <a:ln>
+            <a:solidFill>
+              <a:schemeClr val="tx1"/>
+            </a:solidFill>
+          </a:ln>
+        </p:spPr>
+        <p:style>
+          <a:lnRef idx="2">
+            <a:schemeClr val="accent1">
+              <a:shade val="50000"/>
+            </a:schemeClr>
+          </a:lnRef>
+          <a:fillRef idx="1">
+            <a:schemeClr val="accent1"/>
+          </a:fillRef>
+          <a:effectRef idx="0">
+            <a:schemeClr val="accent1"/>
+          </a:effectRef>
+          <a:fontRef idx="minor">
+            <a:schemeClr val="lt1"/>
+          </a:fontRef>
+        </p:style>
+        <p:txBody>
+          <a:bodyPr rtlCol="0" anchor="ctr"/>
+          <a:lstStyle/>
+          <a:p>
+            <a:pPr algn="ctr"/>
+            <a:endParaRPr lang="en-US" sz="1300">
+              <a:solidFill>
+                <a:schemeClr val="bg1"/>
+              </a:solidFill>
+            </a:endParaRPr>
+          </a:p>
+        </p:txBody>
+      </p:sp>
+      <p:sp>
+        <p:nvSpPr>
+          <p:cNvPr id="27" name="Oval 26"/>
+          <p:cNvSpPr/>
+          <p:nvPr/>
+        </p:nvSpPr>
+        <p:spPr>
+          <a:xfrm>
+            <a:off x="8801567" y="4943120"/>
+            <a:ext cx="89138" cy="91440"/>
+          </a:xfrm>
+          <a:prstGeom prst="ellipse">
+            <a:avLst/>
+          </a:prstGeom>
+          <a:solidFill>
+            <a:srgbClr val="FFFF00"/>
+          </a:solidFill>
+          <a:ln>
+            <a:solidFill>
+              <a:schemeClr val="tx1"/>
+            </a:solidFill>
+          </a:ln>
+        </p:spPr>
+        <p:style>
+          <a:lnRef idx="2">
+            <a:schemeClr val="accent1">
+              <a:shade val="50000"/>
+            </a:schemeClr>
+          </a:lnRef>
+          <a:fillRef idx="1">
+            <a:schemeClr val="accent1"/>
+          </a:fillRef>
+          <a:effectRef idx="0">
+            <a:schemeClr val="accent1"/>
+          </a:effectRef>
+          <a:fontRef idx="minor">
+            <a:schemeClr val="lt1"/>
+          </a:fontRef>
+        </p:style>
+        <p:txBody>
+          <a:bodyPr rtlCol="0" anchor="ctr"/>
+          <a:lstStyle/>
+          <a:p>
+            <a:pPr algn="ctr"/>
+            <a:endParaRPr lang="en-US" sz="1300">
+              <a:solidFill>
+                <a:schemeClr val="bg1"/>
+              </a:solidFill>
+            </a:endParaRPr>
+          </a:p>
+        </p:txBody>
+      </p:sp>
+      <p:sp>
+        <p:nvSpPr>
+          <p:cNvPr id="28" name="Oval 27"/>
+          <p:cNvSpPr/>
+          <p:nvPr/>
+        </p:nvSpPr>
+        <p:spPr>
+          <a:xfrm>
+            <a:off x="2853249" y="3677540"/>
+            <a:ext cx="89138" cy="91440"/>
+          </a:xfrm>
+          <a:prstGeom prst="ellipse">
+            <a:avLst/>
+          </a:prstGeom>
+          <a:solidFill>
+            <a:srgbClr val="FFFF00"/>
+          </a:solidFill>
+          <a:ln>
+            <a:solidFill>
+              <a:schemeClr val="tx1"/>
+            </a:solidFill>
+          </a:ln>
+        </p:spPr>
+        <p:style>
+          <a:lnRef idx="2">
+            <a:schemeClr val="accent1">
+              <a:shade val="50000"/>
+            </a:schemeClr>
+          </a:lnRef>
+          <a:fillRef idx="1">
+            <a:schemeClr val="accent1"/>
+          </a:fillRef>
+          <a:effectRef idx="0">
+            <a:schemeClr val="accent1"/>
+          </a:effectRef>
+          <a:fontRef idx="minor">
+            <a:schemeClr val="lt1"/>
+          </a:fontRef>
+        </p:style>
+        <p:txBody>
+          <a:bodyPr rtlCol="0" anchor="ctr"/>
+          <a:lstStyle/>
+          <a:p>
+            <a:pPr algn="ctr"/>
+            <a:endParaRPr lang="en-US" sz="1300">
+              <a:solidFill>
+                <a:schemeClr val="bg1"/>
+              </a:solidFill>
+            </a:endParaRPr>
+          </a:p>
+        </p:txBody>
+      </p:sp>
+      <p:sp>
+        <p:nvSpPr>
+          <p:cNvPr id="29" name="Oval 28"/>
+          <p:cNvSpPr/>
+          <p:nvPr/>
+        </p:nvSpPr>
+        <p:spPr>
+          <a:xfrm>
+            <a:off x="6410451" y="5118574"/>
+            <a:ext cx="89138" cy="91440"/>
+          </a:xfrm>
+          <a:prstGeom prst="ellipse">
+            <a:avLst/>
+          </a:prstGeom>
+          <a:solidFill>
+            <a:srgbClr val="FFFF00"/>
+          </a:solidFill>
+          <a:ln>
+            <a:solidFill>
+              <a:schemeClr val="tx1"/>
+            </a:solidFill>
+          </a:ln>
+        </p:spPr>
+        <p:style>
+          <a:lnRef idx="2">
+            <a:schemeClr val="accent1">
+              <a:shade val="50000"/>
+            </a:schemeClr>
+          </a:lnRef>
+          <a:fillRef idx="1">
+            <a:schemeClr val="accent1"/>
+          </a:fillRef>
+          <a:effectRef idx="0">
+            <a:schemeClr val="accent1"/>
+          </a:effectRef>
+          <a:fontRef idx="minor">
+            <a:schemeClr val="lt1"/>
+          </a:fontRef>
+        </p:style>
+        <p:txBody>
+          <a:bodyPr rtlCol="0" anchor="ctr"/>
+          <a:lstStyle/>
+          <a:p>
+            <a:pPr algn="ctr"/>
+            <a:endParaRPr lang="en-US" sz="1300">
+              <a:solidFill>
+                <a:schemeClr val="bg1"/>
+              </a:solidFill>
+            </a:endParaRPr>
+          </a:p>
+        </p:txBody>
+      </p:sp>
+      <p:sp>
+        <p:nvSpPr>
+          <p:cNvPr id="30" name="Oval 29"/>
+          <p:cNvSpPr/>
+          <p:nvPr/>
+        </p:nvSpPr>
+        <p:spPr>
+          <a:xfrm>
+            <a:off x="10450500" y="4011156"/>
+            <a:ext cx="89138" cy="91440"/>
+          </a:xfrm>
+          <a:prstGeom prst="ellipse">
+            <a:avLst/>
+          </a:prstGeom>
+          <a:solidFill>
+            <a:srgbClr val="FFFF00"/>
+          </a:solidFill>
+          <a:ln>
+            <a:solidFill>
+              <a:schemeClr val="tx1"/>
+            </a:solidFill>
+          </a:ln>
+        </p:spPr>
+        <p:style>
+          <a:lnRef idx="2">
+            <a:schemeClr val="accent1">
+              <a:shade val="50000"/>
+            </a:schemeClr>
+          </a:lnRef>
+          <a:fillRef idx="1">
+            <a:schemeClr val="accent1"/>
+          </a:fillRef>
+          <a:effectRef idx="0">
+            <a:schemeClr val="accent1"/>
+          </a:effectRef>
+          <a:fontRef idx="minor">
+            <a:schemeClr val="lt1"/>
+          </a:fontRef>
+        </p:style>
+        <p:txBody>
+          <a:bodyPr rtlCol="0" anchor="ctr"/>
+          <a:lstStyle/>
+          <a:p>
+            <a:pPr algn="ctr"/>
+            <a:endParaRPr lang="en-US" sz="1300">
+              <a:solidFill>
+                <a:schemeClr val="bg1"/>
+              </a:solidFill>
+            </a:endParaRPr>
+          </a:p>
+        </p:txBody>
+      </p:sp>
+    </p:spTree>
+    <p:extLst>
+      <p:ext uri="{BB962C8B-B14F-4D97-AF65-F5344CB8AC3E}">
+        <p14:creationId xmlns:p14="http://schemas.microsoft.com/office/powerpoint/2010/main" val="269609631"/>
+      </p:ext>
+    </p:extLst>
+  </p:cSld>
+  <p:clrMapOvr>
+    <a:masterClrMapping/>
+  </p:clrMapOvr>
+</p:sld>
+</file>
+
+<file path=ppt/slides/slide5.xml><?xml version="1.0" encoding="utf-8"?>
+<p:sld xmlns:a="http://schemas.openxmlformats.org/drawingml/2006/main" xmlns:r="http://schemas.openxmlformats.org/officeDocument/2006/relationships" xmlns:p="http://schemas.openxmlformats.org/presentationml/2006/main">
+  <p:cSld>
+    <p:spTree>
+      <p:nvGrpSpPr>
+        <p:cNvPr id="1" name=""/>
+        <p:cNvGrpSpPr/>
+        <p:nvPr/>
+      </p:nvGrpSpPr>
+      <p:grpSpPr>
+        <a:xfrm>
+          <a:off x="0" y="0"/>
+          <a:ext cx="0" cy="0"/>
+          <a:chOff x="0" y="0"/>
+          <a:chExt cx="0" cy="0"/>
+        </a:xfrm>
+      </p:grpSpPr>
+      <p:sp>
+        <p:nvSpPr>
+          <p:cNvPr id="2" name="Title 1"/>
+          <p:cNvSpPr>
+            <a:spLocks noGrp="1"/>
+          </p:cNvSpPr>
+          <p:nvPr>
+            <p:ph type="title"/>
+          </p:nvPr>
+        </p:nvSpPr>
+        <p:spPr/>
+        <p:txBody>
+          <a:bodyPr/>
+          <a:lstStyle/>
+          <a:p>
+            <a:r>
+              <a:rPr lang="en-US" dirty="0"/>
+              <a:t>13 and 18 landmarks</a:t>
+            </a:r>
+            <a:endParaRPr lang="en-US" dirty="0"/>
+          </a:p>
+        </p:txBody>
+      </p:sp>
+      <p:sp>
+        <p:nvSpPr>
+          <p:cNvPr id="3" name="Content Placeholder 2"/>
+          <p:cNvSpPr>
+            <a:spLocks noGrp="1"/>
+          </p:cNvSpPr>
+          <p:nvPr>
+            <p:ph idx="1"/>
+          </p:nvPr>
+        </p:nvSpPr>
+        <p:spPr/>
+        <p:txBody>
+          <a:bodyPr/>
+          <a:lstStyle/>
+          <a:p>
             <a:endParaRPr lang="en-US"/>
           </a:p>
         </p:txBody>
       </p:sp>
-      <p:sp>
-        <p:nvSpPr>
-          <p:cNvPr id="32" name="TextBox 31"/>
+      <p:pic>
+        <p:nvPicPr>
+          <p:cNvPr id="4" name="Content Placeholder 3"/>
+          <p:cNvPicPr>
+            <a:picLocks noChangeAspect="1"/>
+          </p:cNvPicPr>
+          <p:nvPr/>
+        </p:nvPicPr>
+        <p:blipFill>
+          <a:blip r:embed="rId2">
+            <a:extLst>
+              <a:ext uri="{28A0092B-C50C-407E-A947-70E740481C1C}">
+                <a14:useLocalDpi xmlns:a14="http://schemas.microsoft.com/office/drawing/2010/main" val="0"/>
+              </a:ext>
+            </a:extLst>
+          </a:blip>
+          <a:stretch>
+            <a:fillRect/>
+          </a:stretch>
+        </p:blipFill>
+        <p:spPr>
+          <a:xfrm>
+            <a:off x="952500" y="1986756"/>
+            <a:ext cx="10287000" cy="4029075"/>
+          </a:xfrm>
+          <a:prstGeom prst="rect">
+            <a:avLst/>
+          </a:prstGeom>
+        </p:spPr>
+      </p:pic>
+      <p:sp>
+        <p:nvSpPr>
+          <p:cNvPr id="5" name="Oval 4"/>
+          <p:cNvSpPr/>
+          <p:nvPr/>
+        </p:nvSpPr>
+        <p:spPr>
+          <a:xfrm>
+            <a:off x="5695509" y="4082404"/>
+            <a:ext cx="89138" cy="91440"/>
+          </a:xfrm>
+          <a:prstGeom prst="ellipse">
+            <a:avLst/>
+          </a:prstGeom>
+          <a:solidFill>
+            <a:srgbClr val="FFFF00"/>
+          </a:solidFill>
+          <a:ln>
+            <a:solidFill>
+              <a:schemeClr val="tx1"/>
+            </a:solidFill>
+          </a:ln>
+        </p:spPr>
+        <p:style>
+          <a:lnRef idx="2">
+            <a:schemeClr val="accent1">
+              <a:shade val="50000"/>
+            </a:schemeClr>
+          </a:lnRef>
+          <a:fillRef idx="1">
+            <a:schemeClr val="accent1"/>
+          </a:fillRef>
+          <a:effectRef idx="0">
+            <a:schemeClr val="accent1"/>
+          </a:effectRef>
+          <a:fontRef idx="minor">
+            <a:schemeClr val="lt1"/>
+          </a:fontRef>
+        </p:style>
+        <p:txBody>
+          <a:bodyPr rtlCol="0" anchor="ctr"/>
+          <a:lstStyle/>
+          <a:p>
+            <a:pPr algn="ctr"/>
+            <a:endParaRPr lang="en-US" sz="1300">
+              <a:solidFill>
+                <a:schemeClr val="bg1"/>
+              </a:solidFill>
+            </a:endParaRPr>
+          </a:p>
+        </p:txBody>
+      </p:sp>
+      <p:sp>
+        <p:nvSpPr>
+          <p:cNvPr id="6" name="TextBox 5"/>
           <p:cNvSpPr txBox="1"/>
           <p:nvPr/>
         </p:nvSpPr>
         <p:spPr>
           <a:xfrm>
-            <a:off x="5580415" y="3885877"/>
-            <a:ext cx="388620" cy="230832"/>
+            <a:off x="5580415" y="3304298"/>
+            <a:ext cx="388620" cy="292388"/>
           </a:xfrm>
           <a:prstGeom prst="rect">
             <a:avLst/>
@@ -5508,22 +6834,26 @@
           <a:lstStyle/>
           <a:p>
             <a:r>
-              <a:rPr lang="en-US" sz="900" b="1" dirty="0"/>
-              <a:t>11</a:t>
-            </a:r>
-          </a:p>
-        </p:txBody>
-      </p:sp>
-      <p:sp>
-        <p:nvSpPr>
-          <p:cNvPr id="33" name="TextBox 32"/>
+              <a:rPr lang="en-US" sz="1300" b="1" dirty="0">
+                <a:solidFill>
+                  <a:schemeClr val="bg1"/>
+                </a:solidFill>
+              </a:rPr>
+              <a:t>1</a:t>
+            </a:r>
+          </a:p>
+        </p:txBody>
+      </p:sp>
+      <p:sp>
+        <p:nvSpPr>
+          <p:cNvPr id="7" name="TextBox 6"/>
           <p:cNvSpPr txBox="1"/>
           <p:nvPr/>
         </p:nvSpPr>
         <p:spPr>
           <a:xfrm>
-            <a:off x="6641104" y="4173844"/>
-            <a:ext cx="388620" cy="230832"/>
+            <a:off x="5548434" y="3843147"/>
+            <a:ext cx="388620" cy="292388"/>
           </a:xfrm>
           <a:prstGeom prst="rect">
             <a:avLst/>
@@ -5537,22 +6867,26 @@
           <a:lstStyle/>
           <a:p>
             <a:r>
-              <a:rPr lang="en-US" sz="900" b="1" dirty="0"/>
-              <a:t>12</a:t>
-            </a:r>
-          </a:p>
-        </p:txBody>
-      </p:sp>
-      <p:sp>
-        <p:nvSpPr>
-          <p:cNvPr id="34" name="TextBox 33"/>
+              <a:rPr lang="en-US" sz="1300" b="1" dirty="0">
+                <a:solidFill>
+                  <a:schemeClr val="bg1"/>
+                </a:solidFill>
+              </a:rPr>
+              <a:t>11</a:t>
+            </a:r>
+          </a:p>
+        </p:txBody>
+      </p:sp>
+      <p:sp>
+        <p:nvSpPr>
+          <p:cNvPr id="8" name="TextBox 7"/>
           <p:cNvSpPr txBox="1"/>
           <p:nvPr/>
         </p:nvSpPr>
         <p:spPr>
           <a:xfrm>
-            <a:off x="6626212" y="3670657"/>
-            <a:ext cx="388620" cy="230832"/>
+            <a:off x="6605040" y="4176362"/>
+            <a:ext cx="388620" cy="292388"/>
           </a:xfrm>
           <a:prstGeom prst="rect">
             <a:avLst/>
@@ -5566,22 +6900,26 @@
           <a:lstStyle/>
           <a:p>
             <a:r>
-              <a:rPr lang="en-US" sz="900" b="1" dirty="0"/>
-              <a:t>13</a:t>
-            </a:r>
-          </a:p>
-        </p:txBody>
-      </p:sp>
-      <p:sp>
-        <p:nvSpPr>
-          <p:cNvPr id="35" name="TextBox 34"/>
+              <a:rPr lang="en-US" sz="1300" b="1" dirty="0">
+                <a:solidFill>
+                  <a:schemeClr val="bg1"/>
+                </a:solidFill>
+              </a:rPr>
+              <a:t>12</a:t>
+            </a:r>
+          </a:p>
+        </p:txBody>
+      </p:sp>
+      <p:sp>
+        <p:nvSpPr>
+          <p:cNvPr id="9" name="TextBox 8"/>
           <p:cNvSpPr txBox="1"/>
           <p:nvPr/>
         </p:nvSpPr>
         <p:spPr>
           <a:xfrm>
-            <a:off x="7622140" y="4965188"/>
-            <a:ext cx="388620" cy="230832"/>
+            <a:off x="6584047" y="3626739"/>
+            <a:ext cx="388620" cy="292388"/>
           </a:xfrm>
           <a:prstGeom prst="rect">
             <a:avLst/>
@@ -5595,22 +6933,26 @@
           <a:lstStyle/>
           <a:p>
             <a:r>
-              <a:rPr lang="en-US" sz="900" b="1" dirty="0"/>
-              <a:t>10</a:t>
-            </a:r>
-          </a:p>
-        </p:txBody>
-      </p:sp>
-      <p:sp>
-        <p:nvSpPr>
-          <p:cNvPr id="36" name="TextBox 35"/>
+              <a:rPr lang="en-US" sz="1300" b="1" dirty="0">
+                <a:solidFill>
+                  <a:schemeClr val="bg1"/>
+                </a:solidFill>
+              </a:rPr>
+              <a:t>13</a:t>
+            </a:r>
+          </a:p>
+        </p:txBody>
+      </p:sp>
+      <p:sp>
+        <p:nvSpPr>
+          <p:cNvPr id="10" name="TextBox 9"/>
           <p:cNvSpPr txBox="1"/>
           <p:nvPr/>
         </p:nvSpPr>
         <p:spPr>
           <a:xfrm>
-            <a:off x="7279676" y="4027142"/>
-            <a:ext cx="388620" cy="230832"/>
+            <a:off x="7609996" y="5190203"/>
+            <a:ext cx="388620" cy="292388"/>
           </a:xfrm>
           <a:prstGeom prst="rect">
             <a:avLst/>
@@ -5624,22 +6966,26 @@
           <a:lstStyle/>
           <a:p>
             <a:r>
-              <a:rPr lang="en-US" sz="900" b="1" dirty="0"/>
-              <a:t>14</a:t>
-            </a:r>
-          </a:p>
-        </p:txBody>
-      </p:sp>
-      <p:sp>
-        <p:nvSpPr>
-          <p:cNvPr id="37" name="TextBox 36"/>
+              <a:rPr lang="en-US" sz="1300" b="1" dirty="0">
+                <a:solidFill>
+                  <a:schemeClr val="bg1"/>
+                </a:solidFill>
+              </a:rPr>
+              <a:t>10</a:t>
+            </a:r>
+          </a:p>
+        </p:txBody>
+      </p:sp>
+      <p:sp>
+        <p:nvSpPr>
+          <p:cNvPr id="11" name="TextBox 10"/>
           <p:cNvSpPr txBox="1"/>
           <p:nvPr/>
         </p:nvSpPr>
         <p:spPr>
           <a:xfrm>
-            <a:off x="7499828" y="2794820"/>
-            <a:ext cx="388620" cy="230832"/>
+            <a:off x="7350952" y="4030168"/>
+            <a:ext cx="388620" cy="292388"/>
           </a:xfrm>
           <a:prstGeom prst="rect">
             <a:avLst/>
@@ -5653,22 +6999,26 @@
           <a:lstStyle/>
           <a:p>
             <a:r>
-              <a:rPr lang="en-US" sz="900" b="1" dirty="0"/>
-              <a:t>2</a:t>
-            </a:r>
-          </a:p>
-        </p:txBody>
-      </p:sp>
-      <p:sp>
-        <p:nvSpPr>
-          <p:cNvPr id="38" name="TextBox 37"/>
+              <a:rPr lang="en-US" sz="1300" b="1" dirty="0">
+                <a:solidFill>
+                  <a:schemeClr val="bg1"/>
+                </a:solidFill>
+              </a:rPr>
+              <a:t>14</a:t>
+            </a:r>
+          </a:p>
+        </p:txBody>
+      </p:sp>
+      <p:sp>
+        <p:nvSpPr>
+          <p:cNvPr id="12" name="TextBox 11"/>
           <p:cNvSpPr txBox="1"/>
           <p:nvPr/>
         </p:nvSpPr>
         <p:spPr>
           <a:xfrm>
-            <a:off x="7288363" y="3526749"/>
-            <a:ext cx="388620" cy="230832"/>
+            <a:off x="7703219" y="2910260"/>
+            <a:ext cx="388620" cy="292388"/>
           </a:xfrm>
           <a:prstGeom prst="rect">
             <a:avLst/>
@@ -5682,22 +7032,26 @@
           <a:lstStyle/>
           <a:p>
             <a:r>
-              <a:rPr lang="en-US" sz="900" b="1" dirty="0"/>
-              <a:t>16</a:t>
-            </a:r>
-          </a:p>
-        </p:txBody>
-      </p:sp>
-      <p:sp>
-        <p:nvSpPr>
-          <p:cNvPr id="39" name="TextBox 38"/>
+              <a:rPr lang="en-US" sz="1300" b="1" dirty="0">
+                <a:solidFill>
+                  <a:schemeClr val="bg1"/>
+                </a:solidFill>
+              </a:rPr>
+              <a:t>2</a:t>
+            </a:r>
+          </a:p>
+        </p:txBody>
+      </p:sp>
+      <p:sp>
+        <p:nvSpPr>
+          <p:cNvPr id="13" name="TextBox 12"/>
           <p:cNvSpPr txBox="1"/>
           <p:nvPr/>
         </p:nvSpPr>
         <p:spPr>
           <a:xfrm>
-            <a:off x="7288363" y="3789705"/>
-            <a:ext cx="388620" cy="230832"/>
+            <a:off x="7363997" y="3508566"/>
+            <a:ext cx="388620" cy="292388"/>
           </a:xfrm>
           <a:prstGeom prst="rect">
             <a:avLst/>
@@ -5711,22 +7065,26 @@
           <a:lstStyle/>
           <a:p>
             <a:r>
-              <a:rPr lang="en-US" sz="900" b="1" dirty="0"/>
-              <a:t>15</a:t>
-            </a:r>
-          </a:p>
-        </p:txBody>
-      </p:sp>
-      <p:sp>
-        <p:nvSpPr>
-          <p:cNvPr id="40" name="TextBox 39"/>
+              <a:rPr lang="en-US" sz="1300" b="1" dirty="0">
+                <a:solidFill>
+                  <a:schemeClr val="bg1"/>
+                </a:solidFill>
+              </a:rPr>
+              <a:t>16</a:t>
+            </a:r>
+          </a:p>
+        </p:txBody>
+      </p:sp>
+      <p:sp>
+        <p:nvSpPr>
+          <p:cNvPr id="14" name="TextBox 13"/>
           <p:cNvSpPr txBox="1"/>
           <p:nvPr/>
         </p:nvSpPr>
         <p:spPr>
           <a:xfrm>
-            <a:off x="7919755" y="3550759"/>
-            <a:ext cx="388620" cy="230832"/>
+            <a:off x="7363997" y="3766165"/>
+            <a:ext cx="388620" cy="292388"/>
           </a:xfrm>
           <a:prstGeom prst="rect">
             <a:avLst/>
@@ -5740,22 +7098,26 @@
           <a:lstStyle/>
           <a:p>
             <a:r>
-              <a:rPr lang="en-US" sz="900" b="1" dirty="0"/>
-              <a:t>17</a:t>
-            </a:r>
-          </a:p>
-        </p:txBody>
-      </p:sp>
-      <p:sp>
-        <p:nvSpPr>
-          <p:cNvPr id="41" name="TextBox 40"/>
+              <a:rPr lang="en-US" sz="1300" b="1" dirty="0">
+                <a:solidFill>
+                  <a:schemeClr val="bg1"/>
+                </a:solidFill>
+              </a:rPr>
+              <a:t>15</a:t>
+            </a:r>
+          </a:p>
+        </p:txBody>
+      </p:sp>
+      <p:sp>
+        <p:nvSpPr>
+          <p:cNvPr id="15" name="TextBox 14"/>
           <p:cNvSpPr txBox="1"/>
           <p:nvPr/>
         </p:nvSpPr>
         <p:spPr>
           <a:xfrm>
-            <a:off x="8079775" y="4034856"/>
-            <a:ext cx="388620" cy="230832"/>
+            <a:off x="7919755" y="3550759"/>
+            <a:ext cx="388620" cy="292388"/>
           </a:xfrm>
           <a:prstGeom prst="rect">
             <a:avLst/>
@@ -5769,22 +7131,26 @@
           <a:lstStyle/>
           <a:p>
             <a:r>
-              <a:rPr lang="en-US" sz="900" b="1" dirty="0"/>
-              <a:t>18</a:t>
-            </a:r>
-          </a:p>
-        </p:txBody>
-      </p:sp>
-      <p:sp>
-        <p:nvSpPr>
-          <p:cNvPr id="42" name="TextBox 41"/>
+              <a:rPr lang="en-US" sz="1300" b="1" dirty="0">
+                <a:solidFill>
+                  <a:schemeClr val="bg1"/>
+                </a:solidFill>
+              </a:rPr>
+              <a:t>17</a:t>
+            </a:r>
+          </a:p>
+        </p:txBody>
+      </p:sp>
+      <p:sp>
+        <p:nvSpPr>
+          <p:cNvPr id="16" name="TextBox 15"/>
           <p:cNvSpPr txBox="1"/>
           <p:nvPr/>
         </p:nvSpPr>
         <p:spPr>
           <a:xfrm>
-            <a:off x="10333346" y="3367244"/>
-            <a:ext cx="388620" cy="230832"/>
+            <a:off x="8079775" y="4034856"/>
+            <a:ext cx="388620" cy="292388"/>
           </a:xfrm>
           <a:prstGeom prst="rect">
             <a:avLst/>
@@ -5798,22 +7164,26 @@
           <a:lstStyle/>
           <a:p>
             <a:r>
-              <a:rPr lang="en-US" sz="900" b="1" dirty="0"/>
-              <a:t>3</a:t>
-            </a:r>
-          </a:p>
-        </p:txBody>
-      </p:sp>
-      <p:sp>
-        <p:nvSpPr>
-          <p:cNvPr id="43" name="TextBox 42"/>
+              <a:rPr lang="en-US" sz="1300" b="1" dirty="0">
+                <a:solidFill>
+                  <a:schemeClr val="bg1"/>
+                </a:solidFill>
+              </a:rPr>
+              <a:t>18</a:t>
+            </a:r>
+          </a:p>
+        </p:txBody>
+      </p:sp>
+      <p:sp>
+        <p:nvSpPr>
+          <p:cNvPr id="17" name="TextBox 16"/>
           <p:cNvSpPr txBox="1"/>
           <p:nvPr/>
         </p:nvSpPr>
         <p:spPr>
           <a:xfrm>
-            <a:off x="10520834" y="3696372"/>
-            <a:ext cx="388620" cy="230832"/>
+            <a:off x="10262538" y="3374420"/>
+            <a:ext cx="388620" cy="292388"/>
           </a:xfrm>
           <a:prstGeom prst="rect">
             <a:avLst/>
@@ -5827,22 +7197,26 @@
           <a:lstStyle/>
           <a:p>
             <a:r>
-              <a:rPr lang="en-US" sz="900" b="1" dirty="0"/>
-              <a:t>4</a:t>
-            </a:r>
-          </a:p>
-        </p:txBody>
-      </p:sp>
-      <p:sp>
-        <p:nvSpPr>
-          <p:cNvPr id="44" name="TextBox 43"/>
+              <a:rPr lang="en-US" sz="1300" b="1" dirty="0">
+                <a:solidFill>
+                  <a:schemeClr val="bg1"/>
+                </a:solidFill>
+              </a:rPr>
+              <a:t>3</a:t>
+            </a:r>
+          </a:p>
+        </p:txBody>
+      </p:sp>
+      <p:sp>
+        <p:nvSpPr>
+          <p:cNvPr id="18" name="TextBox 17"/>
           <p:cNvSpPr txBox="1"/>
           <p:nvPr/>
         </p:nvSpPr>
         <p:spPr>
           <a:xfrm>
-            <a:off x="10659096" y="3974601"/>
-            <a:ext cx="388620" cy="230832"/>
+            <a:off x="10462253" y="3696953"/>
+            <a:ext cx="388620" cy="292388"/>
           </a:xfrm>
           <a:prstGeom prst="rect">
             <a:avLst/>
@@ -5856,22 +7230,26 @@
           <a:lstStyle/>
           <a:p>
             <a:r>
-              <a:rPr lang="en-US" sz="900" b="1" dirty="0"/>
-              <a:t>5</a:t>
-            </a:r>
-          </a:p>
-        </p:txBody>
-      </p:sp>
-      <p:sp>
-        <p:nvSpPr>
-          <p:cNvPr id="45" name="TextBox 44"/>
+              <a:rPr lang="en-US" sz="1300" b="1" dirty="0">
+                <a:solidFill>
+                  <a:schemeClr val="bg1"/>
+                </a:solidFill>
+              </a:rPr>
+              <a:t>4</a:t>
+            </a:r>
+          </a:p>
+        </p:txBody>
+      </p:sp>
+      <p:sp>
+        <p:nvSpPr>
+          <p:cNvPr id="19" name="TextBox 18"/>
           <p:cNvSpPr txBox="1"/>
           <p:nvPr/>
         </p:nvSpPr>
         <p:spPr>
           <a:xfrm>
-            <a:off x="10656127" y="4328780"/>
-            <a:ext cx="388620" cy="230832"/>
+            <a:off x="10558668" y="3958814"/>
+            <a:ext cx="388620" cy="292388"/>
           </a:xfrm>
           <a:prstGeom prst="rect">
             <a:avLst/>
@@ -5885,22 +7263,26 @@
           <a:lstStyle/>
           <a:p>
             <a:r>
-              <a:rPr lang="en-US" sz="900" b="1" dirty="0"/>
-              <a:t>6</a:t>
-            </a:r>
-          </a:p>
-        </p:txBody>
-      </p:sp>
-      <p:sp>
-        <p:nvSpPr>
-          <p:cNvPr id="46" name="TextBox 45"/>
+              <a:rPr lang="en-US" sz="1300" b="1" dirty="0">
+                <a:solidFill>
+                  <a:schemeClr val="bg1"/>
+                </a:solidFill>
+              </a:rPr>
+              <a:t>5</a:t>
+            </a:r>
+          </a:p>
+        </p:txBody>
+      </p:sp>
+      <p:sp>
+        <p:nvSpPr>
+          <p:cNvPr id="20" name="TextBox 19"/>
           <p:cNvSpPr txBox="1"/>
           <p:nvPr/>
         </p:nvSpPr>
         <p:spPr>
           <a:xfrm>
-            <a:off x="10326524" y="4636724"/>
-            <a:ext cx="388620" cy="230832"/>
+            <a:off x="10497802" y="4260451"/>
+            <a:ext cx="388620" cy="292388"/>
           </a:xfrm>
           <a:prstGeom prst="rect">
             <a:avLst/>
@@ -5914,22 +7296,26 @@
           <a:lstStyle/>
           <a:p>
             <a:r>
-              <a:rPr lang="en-US" sz="900" b="1" dirty="0"/>
-              <a:t>7</a:t>
-            </a:r>
-          </a:p>
-        </p:txBody>
-      </p:sp>
-      <p:sp>
-        <p:nvSpPr>
-          <p:cNvPr id="47" name="TextBox 46"/>
+              <a:rPr lang="en-US" sz="1300" b="1" dirty="0">
+                <a:solidFill>
+                  <a:schemeClr val="bg1"/>
+                </a:solidFill>
+              </a:rPr>
+              <a:t>6</a:t>
+            </a:r>
+          </a:p>
+        </p:txBody>
+      </p:sp>
+      <p:sp>
+        <p:nvSpPr>
+          <p:cNvPr id="21" name="TextBox 20"/>
           <p:cNvSpPr txBox="1"/>
           <p:nvPr/>
         </p:nvSpPr>
         <p:spPr>
           <a:xfrm>
-            <a:off x="9525274" y="4572620"/>
-            <a:ext cx="388620" cy="230832"/>
+            <a:off x="10135573" y="4552839"/>
+            <a:ext cx="388620" cy="292388"/>
           </a:xfrm>
           <a:prstGeom prst="rect">
             <a:avLst/>
@@ -5943,22 +7329,26 @@
           <a:lstStyle/>
           <a:p>
             <a:r>
-              <a:rPr lang="en-US" sz="900" b="1" dirty="0"/>
-              <a:t>8</a:t>
-            </a:r>
-          </a:p>
-        </p:txBody>
-      </p:sp>
-      <p:sp>
-        <p:nvSpPr>
-          <p:cNvPr id="48" name="TextBox 47"/>
+              <a:rPr lang="en-US" sz="1300" b="1" dirty="0">
+                <a:solidFill>
+                  <a:schemeClr val="bg1"/>
+                </a:solidFill>
+              </a:rPr>
+              <a:t>7</a:t>
+            </a:r>
+          </a:p>
+        </p:txBody>
+      </p:sp>
+      <p:sp>
+        <p:nvSpPr>
+          <p:cNvPr id="22" name="TextBox 21"/>
           <p:cNvSpPr txBox="1"/>
           <p:nvPr/>
         </p:nvSpPr>
         <p:spPr>
           <a:xfrm>
-            <a:off x="8849619" y="4780500"/>
-            <a:ext cx="388620" cy="230832"/>
+            <a:off x="9607858" y="4797860"/>
+            <a:ext cx="388620" cy="292388"/>
           </a:xfrm>
           <a:prstGeom prst="rect">
             <a:avLst/>
@@ -5972,16 +7362,937 @@
           <a:lstStyle/>
           <a:p>
             <a:r>
-              <a:rPr lang="en-US" sz="900" b="1" dirty="0"/>
+              <a:rPr lang="en-US" sz="1300" b="1" dirty="0">
+                <a:solidFill>
+                  <a:schemeClr val="bg1"/>
+                </a:solidFill>
+              </a:rPr>
+              <a:t>8</a:t>
+            </a:r>
+          </a:p>
+        </p:txBody>
+      </p:sp>
+      <p:sp>
+        <p:nvSpPr>
+          <p:cNvPr id="23" name="TextBox 22"/>
+          <p:cNvSpPr txBox="1"/>
+          <p:nvPr/>
+        </p:nvSpPr>
+        <p:spPr>
+          <a:xfrm>
+            <a:off x="8899909" y="5030520"/>
+            <a:ext cx="388620" cy="292388"/>
+          </a:xfrm>
+          <a:prstGeom prst="rect">
+            <a:avLst/>
+          </a:prstGeom>
+          <a:noFill/>
+        </p:spPr>
+        <p:txBody>
+          <a:bodyPr wrap="square" rtlCol="0">
+            <a:spAutoFit/>
+          </a:bodyPr>
+          <a:lstStyle/>
+          <a:p>
+            <a:r>
+              <a:rPr lang="en-US" sz="1300" b="1" dirty="0">
+                <a:solidFill>
+                  <a:schemeClr val="bg1"/>
+                </a:solidFill>
+              </a:rPr>
               <a:t>9</a:t>
             </a:r>
+          </a:p>
+        </p:txBody>
+      </p:sp>
+      <p:sp>
+        <p:nvSpPr>
+          <p:cNvPr id="24" name="Oval 23"/>
+          <p:cNvSpPr/>
+          <p:nvPr/>
+        </p:nvSpPr>
+        <p:spPr>
+          <a:xfrm>
+            <a:off x="5678686" y="3259125"/>
+            <a:ext cx="89138" cy="91440"/>
+          </a:xfrm>
+          <a:prstGeom prst="ellipse">
+            <a:avLst/>
+          </a:prstGeom>
+          <a:solidFill>
+            <a:srgbClr val="FFFF00"/>
+          </a:solidFill>
+          <a:ln>
+            <a:solidFill>
+              <a:schemeClr val="tx1"/>
+            </a:solidFill>
+          </a:ln>
+        </p:spPr>
+        <p:style>
+          <a:lnRef idx="2">
+            <a:schemeClr val="accent1">
+              <a:shade val="50000"/>
+            </a:schemeClr>
+          </a:lnRef>
+          <a:fillRef idx="1">
+            <a:schemeClr val="accent1"/>
+          </a:fillRef>
+          <a:effectRef idx="0">
+            <a:schemeClr val="accent1"/>
+          </a:effectRef>
+          <a:fontRef idx="minor">
+            <a:schemeClr val="lt1"/>
+          </a:fontRef>
+        </p:style>
+        <p:txBody>
+          <a:bodyPr rtlCol="0" anchor="ctr"/>
+          <a:lstStyle/>
+          <a:p>
+            <a:pPr algn="ctr"/>
+            <a:endParaRPr lang="en-US" sz="1300">
+              <a:solidFill>
+                <a:schemeClr val="bg1"/>
+              </a:solidFill>
+            </a:endParaRPr>
+          </a:p>
+        </p:txBody>
+      </p:sp>
+      <p:sp>
+        <p:nvSpPr>
+          <p:cNvPr id="25" name="Oval 24"/>
+          <p:cNvSpPr/>
+          <p:nvPr/>
+        </p:nvSpPr>
+        <p:spPr>
+          <a:xfrm>
+            <a:off x="6735621" y="4076812"/>
+            <a:ext cx="89138" cy="91440"/>
+          </a:xfrm>
+          <a:prstGeom prst="ellipse">
+            <a:avLst/>
+          </a:prstGeom>
+          <a:solidFill>
+            <a:srgbClr val="FFFF00"/>
+          </a:solidFill>
+          <a:ln>
+            <a:solidFill>
+              <a:schemeClr val="tx1"/>
+            </a:solidFill>
+          </a:ln>
+        </p:spPr>
+        <p:style>
+          <a:lnRef idx="2">
+            <a:schemeClr val="accent1">
+              <a:shade val="50000"/>
+            </a:schemeClr>
+          </a:lnRef>
+          <a:fillRef idx="1">
+            <a:schemeClr val="accent1"/>
+          </a:fillRef>
+          <a:effectRef idx="0">
+            <a:schemeClr val="accent1"/>
+          </a:effectRef>
+          <a:fontRef idx="minor">
+            <a:schemeClr val="lt1"/>
+          </a:fontRef>
+        </p:style>
+        <p:txBody>
+          <a:bodyPr rtlCol="0" anchor="ctr"/>
+          <a:lstStyle/>
+          <a:p>
+            <a:pPr algn="ctr"/>
+            <a:endParaRPr lang="en-US" sz="1300">
+              <a:solidFill>
+                <a:schemeClr val="bg1"/>
+              </a:solidFill>
+            </a:endParaRPr>
+          </a:p>
+        </p:txBody>
+      </p:sp>
+      <p:sp>
+        <p:nvSpPr>
+          <p:cNvPr id="26" name="Oval 25"/>
+          <p:cNvSpPr/>
+          <p:nvPr/>
+        </p:nvSpPr>
+        <p:spPr>
+          <a:xfrm>
+            <a:off x="6731384" y="3865357"/>
+            <a:ext cx="89138" cy="91440"/>
+          </a:xfrm>
+          <a:prstGeom prst="ellipse">
+            <a:avLst/>
+          </a:prstGeom>
+          <a:solidFill>
+            <a:srgbClr val="FFFF00"/>
+          </a:solidFill>
+          <a:ln>
+            <a:solidFill>
+              <a:schemeClr val="tx1"/>
+            </a:solidFill>
+          </a:ln>
+        </p:spPr>
+        <p:style>
+          <a:lnRef idx="2">
+            <a:schemeClr val="accent1">
+              <a:shade val="50000"/>
+            </a:schemeClr>
+          </a:lnRef>
+          <a:fillRef idx="1">
+            <a:schemeClr val="accent1"/>
+          </a:fillRef>
+          <a:effectRef idx="0">
+            <a:schemeClr val="accent1"/>
+          </a:effectRef>
+          <a:fontRef idx="minor">
+            <a:schemeClr val="lt1"/>
+          </a:fontRef>
+        </p:style>
+        <p:txBody>
+          <a:bodyPr rtlCol="0" anchor="ctr"/>
+          <a:lstStyle/>
+          <a:p>
+            <a:pPr algn="ctr"/>
+            <a:endParaRPr lang="en-US" sz="1300">
+              <a:solidFill>
+                <a:schemeClr val="bg1"/>
+              </a:solidFill>
+            </a:endParaRPr>
+          </a:p>
+        </p:txBody>
+      </p:sp>
+      <p:sp>
+        <p:nvSpPr>
+          <p:cNvPr id="27" name="Oval 26"/>
+          <p:cNvSpPr/>
+          <p:nvPr/>
+        </p:nvSpPr>
+        <p:spPr>
+          <a:xfrm>
+            <a:off x="7609996" y="3040182"/>
+            <a:ext cx="89138" cy="91440"/>
+          </a:xfrm>
+          <a:prstGeom prst="ellipse">
+            <a:avLst/>
+          </a:prstGeom>
+          <a:solidFill>
+            <a:srgbClr val="FFFF00"/>
+          </a:solidFill>
+          <a:ln>
+            <a:solidFill>
+              <a:schemeClr val="tx1"/>
+            </a:solidFill>
+          </a:ln>
+        </p:spPr>
+        <p:style>
+          <a:lnRef idx="2">
+            <a:schemeClr val="accent1">
+              <a:shade val="50000"/>
+            </a:schemeClr>
+          </a:lnRef>
+          <a:fillRef idx="1">
+            <a:schemeClr val="accent1"/>
+          </a:fillRef>
+          <a:effectRef idx="0">
+            <a:schemeClr val="accent1"/>
+          </a:effectRef>
+          <a:fontRef idx="minor">
+            <a:schemeClr val="lt1"/>
+          </a:fontRef>
+        </p:style>
+        <p:txBody>
+          <a:bodyPr rtlCol="0" anchor="ctr"/>
+          <a:lstStyle/>
+          <a:p>
+            <a:pPr algn="ctr"/>
+            <a:endParaRPr lang="en-US" sz="1300">
+              <a:solidFill>
+                <a:schemeClr val="bg1"/>
+              </a:solidFill>
+            </a:endParaRPr>
+          </a:p>
+        </p:txBody>
+      </p:sp>
+      <p:sp>
+        <p:nvSpPr>
+          <p:cNvPr id="28" name="Oval 27"/>
+          <p:cNvSpPr/>
+          <p:nvPr/>
+        </p:nvSpPr>
+        <p:spPr>
+          <a:xfrm>
+            <a:off x="7609996" y="5150300"/>
+            <a:ext cx="89138" cy="91440"/>
+          </a:xfrm>
+          <a:prstGeom prst="ellipse">
+            <a:avLst/>
+          </a:prstGeom>
+          <a:solidFill>
+            <a:srgbClr val="FFFF00"/>
+          </a:solidFill>
+          <a:ln>
+            <a:solidFill>
+              <a:schemeClr val="tx1"/>
+            </a:solidFill>
+          </a:ln>
+        </p:spPr>
+        <p:style>
+          <a:lnRef idx="2">
+            <a:schemeClr val="accent1">
+              <a:shade val="50000"/>
+            </a:schemeClr>
+          </a:lnRef>
+          <a:fillRef idx="1">
+            <a:schemeClr val="accent1"/>
+          </a:fillRef>
+          <a:effectRef idx="0">
+            <a:schemeClr val="accent1"/>
+          </a:effectRef>
+          <a:fontRef idx="minor">
+            <a:schemeClr val="lt1"/>
+          </a:fontRef>
+        </p:style>
+        <p:txBody>
+          <a:bodyPr rtlCol="0" anchor="ctr"/>
+          <a:lstStyle/>
+          <a:p>
+            <a:pPr algn="ctr"/>
+            <a:endParaRPr lang="en-US" sz="1300">
+              <a:solidFill>
+                <a:schemeClr val="bg1"/>
+              </a:solidFill>
+            </a:endParaRPr>
+          </a:p>
+        </p:txBody>
+      </p:sp>
+      <p:sp>
+        <p:nvSpPr>
+          <p:cNvPr id="29" name="Oval 28"/>
+          <p:cNvSpPr/>
+          <p:nvPr/>
+        </p:nvSpPr>
+        <p:spPr>
+          <a:xfrm>
+            <a:off x="8184947" y="4237892"/>
+            <a:ext cx="89138" cy="91440"/>
+          </a:xfrm>
+          <a:prstGeom prst="ellipse">
+            <a:avLst/>
+          </a:prstGeom>
+          <a:solidFill>
+            <a:srgbClr val="FFFF00"/>
+          </a:solidFill>
+          <a:ln>
+            <a:solidFill>
+              <a:schemeClr val="tx1"/>
+            </a:solidFill>
+          </a:ln>
+        </p:spPr>
+        <p:style>
+          <a:lnRef idx="2">
+            <a:schemeClr val="accent1">
+              <a:shade val="50000"/>
+            </a:schemeClr>
+          </a:lnRef>
+          <a:fillRef idx="1">
+            <a:schemeClr val="accent1"/>
+          </a:fillRef>
+          <a:effectRef idx="0">
+            <a:schemeClr val="accent1"/>
+          </a:effectRef>
+          <a:fontRef idx="minor">
+            <a:schemeClr val="lt1"/>
+          </a:fontRef>
+        </p:style>
+        <p:txBody>
+          <a:bodyPr rtlCol="0" anchor="ctr"/>
+          <a:lstStyle/>
+          <a:p>
+            <a:pPr algn="ctr"/>
+            <a:endParaRPr lang="en-US" sz="1300">
+              <a:solidFill>
+                <a:schemeClr val="bg1"/>
+              </a:solidFill>
+            </a:endParaRPr>
+          </a:p>
+        </p:txBody>
+      </p:sp>
+      <p:sp>
+        <p:nvSpPr>
+          <p:cNvPr id="30" name="Oval 29"/>
+          <p:cNvSpPr/>
+          <p:nvPr/>
+        </p:nvSpPr>
+        <p:spPr>
+          <a:xfrm>
+            <a:off x="10198484" y="3553201"/>
+            <a:ext cx="89138" cy="91440"/>
+          </a:xfrm>
+          <a:prstGeom prst="ellipse">
+            <a:avLst/>
+          </a:prstGeom>
+          <a:solidFill>
+            <a:srgbClr val="FFFF00"/>
+          </a:solidFill>
+          <a:ln>
+            <a:solidFill>
+              <a:schemeClr val="tx1"/>
+            </a:solidFill>
+          </a:ln>
+        </p:spPr>
+        <p:style>
+          <a:lnRef idx="2">
+            <a:schemeClr val="accent1">
+              <a:shade val="50000"/>
+            </a:schemeClr>
+          </a:lnRef>
+          <a:fillRef idx="1">
+            <a:schemeClr val="accent1"/>
+          </a:fillRef>
+          <a:effectRef idx="0">
+            <a:schemeClr val="accent1"/>
+          </a:effectRef>
+          <a:fontRef idx="minor">
+            <a:schemeClr val="lt1"/>
+          </a:fontRef>
+        </p:style>
+        <p:txBody>
+          <a:bodyPr rtlCol="0" anchor="ctr"/>
+          <a:lstStyle/>
+          <a:p>
+            <a:pPr algn="ctr"/>
+            <a:endParaRPr lang="en-US" sz="1300">
+              <a:solidFill>
+                <a:schemeClr val="bg1"/>
+              </a:solidFill>
+            </a:endParaRPr>
+          </a:p>
+        </p:txBody>
+      </p:sp>
+      <p:sp>
+        <p:nvSpPr>
+          <p:cNvPr id="31" name="Oval 30"/>
+          <p:cNvSpPr/>
+          <p:nvPr/>
+        </p:nvSpPr>
+        <p:spPr>
+          <a:xfrm>
+            <a:off x="10373109" y="3777683"/>
+            <a:ext cx="89138" cy="91440"/>
+          </a:xfrm>
+          <a:prstGeom prst="ellipse">
+            <a:avLst/>
+          </a:prstGeom>
+          <a:solidFill>
+            <a:srgbClr val="FFFF00"/>
+          </a:solidFill>
+          <a:ln>
+            <a:solidFill>
+              <a:schemeClr val="tx1"/>
+            </a:solidFill>
+          </a:ln>
+        </p:spPr>
+        <p:style>
+          <a:lnRef idx="2">
+            <a:schemeClr val="accent1">
+              <a:shade val="50000"/>
+            </a:schemeClr>
+          </a:lnRef>
+          <a:fillRef idx="1">
+            <a:schemeClr val="accent1"/>
+          </a:fillRef>
+          <a:effectRef idx="0">
+            <a:schemeClr val="accent1"/>
+          </a:effectRef>
+          <a:fontRef idx="minor">
+            <a:schemeClr val="lt1"/>
+          </a:fontRef>
+        </p:style>
+        <p:txBody>
+          <a:bodyPr rtlCol="0" anchor="ctr"/>
+          <a:lstStyle/>
+          <a:p>
+            <a:pPr algn="ctr"/>
+            <a:endParaRPr lang="en-US" sz="1300">
+              <a:solidFill>
+                <a:schemeClr val="bg1"/>
+              </a:solidFill>
+            </a:endParaRPr>
+          </a:p>
+        </p:txBody>
+      </p:sp>
+      <p:sp>
+        <p:nvSpPr>
+          <p:cNvPr id="32" name="Oval 31"/>
+          <p:cNvSpPr/>
+          <p:nvPr/>
+        </p:nvSpPr>
+        <p:spPr>
+          <a:xfrm>
+            <a:off x="10456848" y="4018845"/>
+            <a:ext cx="89138" cy="91440"/>
+          </a:xfrm>
+          <a:prstGeom prst="ellipse">
+            <a:avLst/>
+          </a:prstGeom>
+          <a:solidFill>
+            <a:srgbClr val="FFFF00"/>
+          </a:solidFill>
+          <a:ln>
+            <a:solidFill>
+              <a:schemeClr val="tx1"/>
+            </a:solidFill>
+          </a:ln>
+        </p:spPr>
+        <p:style>
+          <a:lnRef idx="2">
+            <a:schemeClr val="accent1">
+              <a:shade val="50000"/>
+            </a:schemeClr>
+          </a:lnRef>
+          <a:fillRef idx="1">
+            <a:schemeClr val="accent1"/>
+          </a:fillRef>
+          <a:effectRef idx="0">
+            <a:schemeClr val="accent1"/>
+          </a:effectRef>
+          <a:fontRef idx="minor">
+            <a:schemeClr val="lt1"/>
+          </a:fontRef>
+        </p:style>
+        <p:txBody>
+          <a:bodyPr rtlCol="0" anchor="ctr"/>
+          <a:lstStyle/>
+          <a:p>
+            <a:pPr algn="ctr"/>
+            <a:endParaRPr lang="en-US" sz="1300">
+              <a:solidFill>
+                <a:schemeClr val="bg1"/>
+              </a:solidFill>
+            </a:endParaRPr>
+          </a:p>
+        </p:txBody>
+      </p:sp>
+      <p:sp>
+        <p:nvSpPr>
+          <p:cNvPr id="33" name="Oval 32"/>
+          <p:cNvSpPr/>
+          <p:nvPr/>
+        </p:nvSpPr>
+        <p:spPr>
+          <a:xfrm>
+            <a:off x="10412279" y="4276836"/>
+            <a:ext cx="89138" cy="91440"/>
+          </a:xfrm>
+          <a:prstGeom prst="ellipse">
+            <a:avLst/>
+          </a:prstGeom>
+          <a:solidFill>
+            <a:srgbClr val="FFFF00"/>
+          </a:solidFill>
+          <a:ln>
+            <a:solidFill>
+              <a:schemeClr val="tx1"/>
+            </a:solidFill>
+          </a:ln>
+        </p:spPr>
+        <p:style>
+          <a:lnRef idx="2">
+            <a:schemeClr val="accent1">
+              <a:shade val="50000"/>
+            </a:schemeClr>
+          </a:lnRef>
+          <a:fillRef idx="1">
+            <a:schemeClr val="accent1"/>
+          </a:fillRef>
+          <a:effectRef idx="0">
+            <a:schemeClr val="accent1"/>
+          </a:effectRef>
+          <a:fontRef idx="minor">
+            <a:schemeClr val="lt1"/>
+          </a:fontRef>
+        </p:style>
+        <p:txBody>
+          <a:bodyPr rtlCol="0" anchor="ctr"/>
+          <a:lstStyle/>
+          <a:p>
+            <a:pPr algn="ctr"/>
+            <a:endParaRPr lang="en-US" sz="1300">
+              <a:solidFill>
+                <a:schemeClr val="bg1"/>
+              </a:solidFill>
+            </a:endParaRPr>
+          </a:p>
+        </p:txBody>
+      </p:sp>
+      <p:sp>
+        <p:nvSpPr>
+          <p:cNvPr id="34" name="Oval 33"/>
+          <p:cNvSpPr/>
+          <p:nvPr/>
+        </p:nvSpPr>
+        <p:spPr>
+          <a:xfrm>
+            <a:off x="10109346" y="4513892"/>
+            <a:ext cx="89138" cy="91440"/>
+          </a:xfrm>
+          <a:prstGeom prst="ellipse">
+            <a:avLst/>
+          </a:prstGeom>
+          <a:solidFill>
+            <a:srgbClr val="FFFF00"/>
+          </a:solidFill>
+          <a:ln>
+            <a:solidFill>
+              <a:schemeClr val="tx1"/>
+            </a:solidFill>
+          </a:ln>
+        </p:spPr>
+        <p:style>
+          <a:lnRef idx="2">
+            <a:schemeClr val="accent1">
+              <a:shade val="50000"/>
+            </a:schemeClr>
+          </a:lnRef>
+          <a:fillRef idx="1">
+            <a:schemeClr val="accent1"/>
+          </a:fillRef>
+          <a:effectRef idx="0">
+            <a:schemeClr val="accent1"/>
+          </a:effectRef>
+          <a:fontRef idx="minor">
+            <a:schemeClr val="lt1"/>
+          </a:fontRef>
+        </p:style>
+        <p:txBody>
+          <a:bodyPr rtlCol="0" anchor="ctr"/>
+          <a:lstStyle/>
+          <a:p>
+            <a:pPr algn="ctr"/>
+            <a:endParaRPr lang="en-US" sz="1300">
+              <a:solidFill>
+                <a:schemeClr val="bg1"/>
+              </a:solidFill>
+            </a:endParaRPr>
+          </a:p>
+        </p:txBody>
+      </p:sp>
+      <p:sp>
+        <p:nvSpPr>
+          <p:cNvPr id="35" name="Oval 34"/>
+          <p:cNvSpPr/>
+          <p:nvPr/>
+        </p:nvSpPr>
+        <p:spPr>
+          <a:xfrm>
+            <a:off x="9561731" y="4752140"/>
+            <a:ext cx="89138" cy="91440"/>
+          </a:xfrm>
+          <a:prstGeom prst="ellipse">
+            <a:avLst/>
+          </a:prstGeom>
+          <a:solidFill>
+            <a:srgbClr val="FFFF00"/>
+          </a:solidFill>
+          <a:ln>
+            <a:solidFill>
+              <a:schemeClr val="tx1"/>
+            </a:solidFill>
+          </a:ln>
+        </p:spPr>
+        <p:style>
+          <a:lnRef idx="2">
+            <a:schemeClr val="accent1">
+              <a:shade val="50000"/>
+            </a:schemeClr>
+          </a:lnRef>
+          <a:fillRef idx="1">
+            <a:schemeClr val="accent1"/>
+          </a:fillRef>
+          <a:effectRef idx="0">
+            <a:schemeClr val="accent1"/>
+          </a:effectRef>
+          <a:fontRef idx="minor">
+            <a:schemeClr val="lt1"/>
+          </a:fontRef>
+        </p:style>
+        <p:txBody>
+          <a:bodyPr rtlCol="0" anchor="ctr"/>
+          <a:lstStyle/>
+          <a:p>
+            <a:pPr algn="ctr"/>
+            <a:endParaRPr lang="en-US" sz="1300">
+              <a:solidFill>
+                <a:schemeClr val="bg1"/>
+              </a:solidFill>
+            </a:endParaRPr>
+          </a:p>
+        </p:txBody>
+      </p:sp>
+      <p:sp>
+        <p:nvSpPr>
+          <p:cNvPr id="36" name="Oval 35"/>
+          <p:cNvSpPr/>
+          <p:nvPr/>
+        </p:nvSpPr>
+        <p:spPr>
+          <a:xfrm>
+            <a:off x="8899909" y="4961280"/>
+            <a:ext cx="89138" cy="91440"/>
+          </a:xfrm>
+          <a:prstGeom prst="ellipse">
+            <a:avLst/>
+          </a:prstGeom>
+          <a:solidFill>
+            <a:srgbClr val="FFFF00"/>
+          </a:solidFill>
+          <a:ln>
+            <a:solidFill>
+              <a:schemeClr val="tx1"/>
+            </a:solidFill>
+          </a:ln>
+        </p:spPr>
+        <p:style>
+          <a:lnRef idx="2">
+            <a:schemeClr val="accent1">
+              <a:shade val="50000"/>
+            </a:schemeClr>
+          </a:lnRef>
+          <a:fillRef idx="1">
+            <a:schemeClr val="accent1"/>
+          </a:fillRef>
+          <a:effectRef idx="0">
+            <a:schemeClr val="accent1"/>
+          </a:effectRef>
+          <a:fontRef idx="minor">
+            <a:schemeClr val="lt1"/>
+          </a:fontRef>
+        </p:style>
+        <p:txBody>
+          <a:bodyPr rtlCol="0" anchor="ctr"/>
+          <a:lstStyle/>
+          <a:p>
+            <a:pPr algn="ctr"/>
+            <a:endParaRPr lang="en-US" sz="1300">
+              <a:solidFill>
+                <a:schemeClr val="bg1"/>
+              </a:solidFill>
+            </a:endParaRPr>
+          </a:p>
+        </p:txBody>
+      </p:sp>
+      <p:sp>
+        <p:nvSpPr>
+          <p:cNvPr id="37" name="Oval 36"/>
+          <p:cNvSpPr/>
+          <p:nvPr/>
+        </p:nvSpPr>
+        <p:spPr>
+          <a:xfrm>
+            <a:off x="7310018" y="4006941"/>
+            <a:ext cx="89138" cy="91440"/>
+          </a:xfrm>
+          <a:prstGeom prst="ellipse">
+            <a:avLst/>
+          </a:prstGeom>
+          <a:solidFill>
+            <a:srgbClr val="FFFF00"/>
+          </a:solidFill>
+          <a:ln>
+            <a:solidFill>
+              <a:schemeClr val="tx1"/>
+            </a:solidFill>
+          </a:ln>
+        </p:spPr>
+        <p:style>
+          <a:lnRef idx="2">
+            <a:schemeClr val="accent1">
+              <a:shade val="50000"/>
+            </a:schemeClr>
+          </a:lnRef>
+          <a:fillRef idx="1">
+            <a:schemeClr val="accent1"/>
+          </a:fillRef>
+          <a:effectRef idx="0">
+            <a:schemeClr val="accent1"/>
+          </a:effectRef>
+          <a:fontRef idx="minor">
+            <a:schemeClr val="lt1"/>
+          </a:fontRef>
+        </p:style>
+        <p:txBody>
+          <a:bodyPr rtlCol="0" anchor="ctr"/>
+          <a:lstStyle/>
+          <a:p>
+            <a:pPr algn="ctr"/>
+            <a:endParaRPr lang="en-US" sz="1300">
+              <a:solidFill>
+                <a:schemeClr val="bg1"/>
+              </a:solidFill>
+            </a:endParaRPr>
+          </a:p>
+        </p:txBody>
+      </p:sp>
+      <p:sp>
+        <p:nvSpPr>
+          <p:cNvPr id="38" name="Oval 37"/>
+          <p:cNvSpPr/>
+          <p:nvPr/>
+        </p:nvSpPr>
+        <p:spPr>
+          <a:xfrm>
+            <a:off x="7310018" y="3740353"/>
+            <a:ext cx="89138" cy="91440"/>
+          </a:xfrm>
+          <a:prstGeom prst="ellipse">
+            <a:avLst/>
+          </a:prstGeom>
+          <a:solidFill>
+            <a:srgbClr val="FFFF00"/>
+          </a:solidFill>
+          <a:ln>
+            <a:solidFill>
+              <a:schemeClr val="tx1"/>
+            </a:solidFill>
+          </a:ln>
+        </p:spPr>
+        <p:style>
+          <a:lnRef idx="2">
+            <a:schemeClr val="accent1">
+              <a:shade val="50000"/>
+            </a:schemeClr>
+          </a:lnRef>
+          <a:fillRef idx="1">
+            <a:schemeClr val="accent1"/>
+          </a:fillRef>
+          <a:effectRef idx="0">
+            <a:schemeClr val="accent1"/>
+          </a:effectRef>
+          <a:fontRef idx="minor">
+            <a:schemeClr val="lt1"/>
+          </a:fontRef>
+        </p:style>
+        <p:txBody>
+          <a:bodyPr rtlCol="0" anchor="ctr"/>
+          <a:lstStyle/>
+          <a:p>
+            <a:pPr algn="ctr"/>
+            <a:endParaRPr lang="en-US" sz="1300">
+              <a:solidFill>
+                <a:schemeClr val="bg1"/>
+              </a:solidFill>
+            </a:endParaRPr>
+          </a:p>
+        </p:txBody>
+      </p:sp>
+      <p:sp>
+        <p:nvSpPr>
+          <p:cNvPr id="39" name="Oval 38"/>
+          <p:cNvSpPr/>
+          <p:nvPr/>
+        </p:nvSpPr>
+        <p:spPr>
+          <a:xfrm>
+            <a:off x="7310018" y="3477727"/>
+            <a:ext cx="89138" cy="91440"/>
+          </a:xfrm>
+          <a:prstGeom prst="ellipse">
+            <a:avLst/>
+          </a:prstGeom>
+          <a:solidFill>
+            <a:srgbClr val="FFFF00"/>
+          </a:solidFill>
+          <a:ln>
+            <a:solidFill>
+              <a:schemeClr val="tx1"/>
+            </a:solidFill>
+          </a:ln>
+        </p:spPr>
+        <p:style>
+          <a:lnRef idx="2">
+            <a:schemeClr val="accent1">
+              <a:shade val="50000"/>
+            </a:schemeClr>
+          </a:lnRef>
+          <a:fillRef idx="1">
+            <a:schemeClr val="accent1"/>
+          </a:fillRef>
+          <a:effectRef idx="0">
+            <a:schemeClr val="accent1"/>
+          </a:effectRef>
+          <a:fontRef idx="minor">
+            <a:schemeClr val="lt1"/>
+          </a:fontRef>
+        </p:style>
+        <p:txBody>
+          <a:bodyPr rtlCol="0" anchor="ctr"/>
+          <a:lstStyle/>
+          <a:p>
+            <a:pPr algn="ctr"/>
+            <a:endParaRPr lang="en-US" sz="1300">
+              <a:solidFill>
+                <a:schemeClr val="bg1"/>
+              </a:solidFill>
+            </a:endParaRPr>
+          </a:p>
+        </p:txBody>
+      </p:sp>
+      <p:sp>
+        <p:nvSpPr>
+          <p:cNvPr id="40" name="Oval 39"/>
+          <p:cNvSpPr/>
+          <p:nvPr/>
+        </p:nvSpPr>
+        <p:spPr>
+          <a:xfrm>
+            <a:off x="8035206" y="3458586"/>
+            <a:ext cx="89138" cy="91440"/>
+          </a:xfrm>
+          <a:prstGeom prst="ellipse">
+            <a:avLst/>
+          </a:prstGeom>
+          <a:solidFill>
+            <a:srgbClr val="FFFF00"/>
+          </a:solidFill>
+          <a:ln>
+            <a:solidFill>
+              <a:schemeClr val="tx1"/>
+            </a:solidFill>
+          </a:ln>
+        </p:spPr>
+        <p:style>
+          <a:lnRef idx="2">
+            <a:schemeClr val="accent1">
+              <a:shade val="50000"/>
+            </a:schemeClr>
+          </a:lnRef>
+          <a:fillRef idx="1">
+            <a:schemeClr val="accent1"/>
+          </a:fillRef>
+          <a:effectRef idx="0">
+            <a:schemeClr val="accent1"/>
+          </a:effectRef>
+          <a:fontRef idx="minor">
+            <a:schemeClr val="lt1"/>
+          </a:fontRef>
+        </p:style>
+        <p:txBody>
+          <a:bodyPr rtlCol="0" anchor="ctr"/>
+          <a:lstStyle/>
+          <a:p>
+            <a:pPr algn="ctr"/>
+            <a:endParaRPr lang="en-US" sz="1300">
+              <a:solidFill>
+                <a:schemeClr val="bg1"/>
+              </a:solidFill>
+            </a:endParaRPr>
           </a:p>
         </p:txBody>
       </p:sp>
     </p:spTree>
     <p:extLst>
       <p:ext uri="{BB962C8B-B14F-4D97-AF65-F5344CB8AC3E}">
-        <p14:creationId xmlns:p14="http://schemas.microsoft.com/office/powerpoint/2010/main" val="3776460200"/>
+        <p14:creationId xmlns:p14="http://schemas.microsoft.com/office/powerpoint/2010/main" val="4254812889"/>
       </p:ext>
     </p:extLst>
   </p:cSld>

</xml_diff>

<commit_message>
Wing check on things to make fsp presentations
Weirdness with onedrive, look into it?
Don't think many of these files were modified strongly?
</commit_message>
<xml_diff>
--- a/Wing figures and images/Wing images.pptx
+++ b/Wing figures and images/Wing images.pptx
@@ -10,6 +10,9 @@
     <p:sldId id="258" r:id="rId4"/>
     <p:sldId id="259" r:id="rId5"/>
     <p:sldId id="260" r:id="rId6"/>
+    <p:sldId id="261" r:id="rId7"/>
+    <p:sldId id="262" r:id="rId8"/>
+    <p:sldId id="263" r:id="rId9"/>
   </p:sldIdLst>
   <p:sldSz cx="12192000" cy="6858000"/>
   <p:notesSz cx="6858000" cy="9144000"/>
@@ -116,8 +119,231 @@
 </p:presentation>
 </file>
 
-<file path=ppt/revisionInfo.xml><?xml version="1.0" encoding="utf-8"?>
-<p1510:revInfo xmlns:a="http://schemas.openxmlformats.org/drawingml/2006/main" xmlns:r="http://schemas.openxmlformats.org/officeDocument/2006/relationships" xmlns:p1510="http://schemas.microsoft.com/office/powerpoint/2015/10/main"/>
+<file path=ppt/changesInfos/changesInfo1.xml><?xml version="1.0" encoding="utf-8"?>
+<pc:chgInfo xmlns:a="http://schemas.openxmlformats.org/drawingml/2006/main" xmlns:r="http://schemas.openxmlformats.org/officeDocument/2006/relationships" xmlns:ac="http://schemas.microsoft.com/office/drawing/2013/main/command" xmlns:pc="http://schemas.microsoft.com/office/powerpoint/2013/main/command">
+  <pc:docChgLst>
+    <pc:chgData name="virgchu@gmail.com" userId="677acab2f67d70a2" providerId="LiveId" clId="{F7D6827F-3AFD-421F-AAB4-B002D707D973}"/>
+    <pc:docChg chg="addSld modSld">
+      <pc:chgData name="virgchu@gmail.com" userId="677acab2f67d70a2" providerId="LiveId" clId="{F7D6827F-3AFD-421F-AAB4-B002D707D973}" dt="2017-09-13T19:24:58.695" v="23"/>
+      <pc:docMkLst>
+        <pc:docMk/>
+      </pc:docMkLst>
+      <pc:sldChg chg="addSp delSp modSp add">
+        <pc:chgData name="virgchu@gmail.com" userId="677acab2f67d70a2" providerId="LiveId" clId="{F7D6827F-3AFD-421F-AAB4-B002D707D973}" dt="2017-09-13T19:17:59.043" v="9"/>
+        <pc:sldMkLst>
+          <pc:docMk/>
+          <pc:sldMk cId="308476257" sldId="261"/>
+        </pc:sldMkLst>
+        <pc:spChg chg="add mod">
+          <ac:chgData name="virgchu@gmail.com" userId="677acab2f67d70a2" providerId="LiveId" clId="{F7D6827F-3AFD-421F-AAB4-B002D707D973}" dt="2017-09-13T19:15:19.709" v="3"/>
+          <ac:spMkLst>
+            <pc:docMk/>
+            <pc:sldMk cId="308476257" sldId="261"/>
+            <ac:spMk id="7" creationId="{8CEF9D6F-BE92-470B-8DC5-66337F6A3D25}"/>
+          </ac:spMkLst>
+        </pc:spChg>
+        <pc:spChg chg="add">
+          <ac:chgData name="virgchu@gmail.com" userId="677acab2f67d70a2" providerId="LiveId" clId="{F7D6827F-3AFD-421F-AAB4-B002D707D973}" dt="2017-09-13T19:16:06.581" v="4"/>
+          <ac:spMkLst>
+            <pc:docMk/>
+            <pc:sldMk cId="308476257" sldId="261"/>
+            <ac:spMk id="8" creationId="{3FB2B192-D303-4AD9-861F-8EA8D9DD2F60}"/>
+          </ac:spMkLst>
+        </pc:spChg>
+        <pc:spChg chg="add">
+          <ac:chgData name="virgchu@gmail.com" userId="677acab2f67d70a2" providerId="LiveId" clId="{F7D6827F-3AFD-421F-AAB4-B002D707D973}" dt="2017-09-13T19:16:15.317" v="5"/>
+          <ac:spMkLst>
+            <pc:docMk/>
+            <pc:sldMk cId="308476257" sldId="261"/>
+            <ac:spMk id="9" creationId="{6DC6E586-253E-4320-A46C-ADF1B5C6F808}"/>
+          </ac:spMkLst>
+        </pc:spChg>
+        <pc:spChg chg="add">
+          <ac:chgData name="virgchu@gmail.com" userId="677acab2f67d70a2" providerId="LiveId" clId="{F7D6827F-3AFD-421F-AAB4-B002D707D973}" dt="2017-09-13T19:16:57.084" v="6"/>
+          <ac:spMkLst>
+            <pc:docMk/>
+            <pc:sldMk cId="308476257" sldId="261"/>
+            <ac:spMk id="10" creationId="{DC244EFF-2DF5-4DE8-8F3A-F8033960C363}"/>
+          </ac:spMkLst>
+        </pc:spChg>
+        <pc:spChg chg="add">
+          <ac:chgData name="virgchu@gmail.com" userId="677acab2f67d70a2" providerId="LiveId" clId="{F7D6827F-3AFD-421F-AAB4-B002D707D973}" dt="2017-09-13T19:17:59.043" v="9"/>
+          <ac:spMkLst>
+            <pc:docMk/>
+            <pc:sldMk cId="308476257" sldId="261"/>
+            <ac:spMk id="12" creationId="{9D586CBC-1A3E-449D-A5CB-5CDF8FC8D400}"/>
+          </ac:spMkLst>
+        </pc:spChg>
+        <pc:picChg chg="add">
+          <ac:chgData name="virgchu@gmail.com" userId="677acab2f67d70a2" providerId="LiveId" clId="{F7D6827F-3AFD-421F-AAB4-B002D707D973}" dt="2017-09-13T19:14:24.809" v="1"/>
+          <ac:picMkLst>
+            <pc:docMk/>
+            <pc:sldMk cId="308476257" sldId="261"/>
+            <ac:picMk id="4" creationId="{E0C9E166-E66C-4153-B74B-1DFFEFAF581E}"/>
+          </ac:picMkLst>
+        </pc:picChg>
+        <pc:picChg chg="add del">
+          <ac:chgData name="virgchu@gmail.com" userId="677acab2f67d70a2" providerId="LiveId" clId="{F7D6827F-3AFD-421F-AAB4-B002D707D973}" dt="2017-09-13T19:17:56.389" v="8"/>
+          <ac:picMkLst>
+            <pc:docMk/>
+            <pc:sldMk cId="308476257" sldId="261"/>
+            <ac:picMk id="11" creationId="{2A4BC68B-27AF-4D73-A212-4CD16DB7534F}"/>
+          </ac:picMkLst>
+        </pc:picChg>
+        <pc:cxnChg chg="add mod">
+          <ac:chgData name="virgchu@gmail.com" userId="677acab2f67d70a2" providerId="LiveId" clId="{F7D6827F-3AFD-421F-AAB4-B002D707D973}" dt="2017-09-13T19:14:55.380" v="2"/>
+          <ac:cxnSpMkLst>
+            <pc:docMk/>
+            <pc:sldMk cId="308476257" sldId="261"/>
+            <ac:cxnSpMk id="6" creationId="{1E0E8CA0-E580-4E19-92FE-8F32E8E878F1}"/>
+          </ac:cxnSpMkLst>
+        </pc:cxnChg>
+      </pc:sldChg>
+      <pc:sldChg chg="addSp add">
+        <pc:chgData name="virgchu@gmail.com" userId="677acab2f67d70a2" providerId="LiveId" clId="{F7D6827F-3AFD-421F-AAB4-B002D707D973}" dt="2017-09-13T19:20:13.535" v="12"/>
+        <pc:sldMkLst>
+          <pc:docMk/>
+          <pc:sldMk cId="324603706" sldId="262"/>
+        </pc:sldMkLst>
+        <pc:spChg chg="add">
+          <ac:chgData name="virgchu@gmail.com" userId="677acab2f67d70a2" providerId="LiveId" clId="{F7D6827F-3AFD-421F-AAB4-B002D707D973}" dt="2017-09-13T19:20:13.535" v="12"/>
+          <ac:spMkLst>
+            <pc:docMk/>
+            <pc:sldMk cId="324603706" sldId="262"/>
+            <ac:spMk id="5" creationId="{47591894-F0DB-44F4-9C25-8F32C5F27049}"/>
+          </ac:spMkLst>
+        </pc:spChg>
+        <pc:spChg chg="add">
+          <ac:chgData name="virgchu@gmail.com" userId="677acab2f67d70a2" providerId="LiveId" clId="{F7D6827F-3AFD-421F-AAB4-B002D707D973}" dt="2017-09-13T19:20:13.535" v="12"/>
+          <ac:spMkLst>
+            <pc:docMk/>
+            <pc:sldMk cId="324603706" sldId="262"/>
+            <ac:spMk id="6" creationId="{86DA92EA-A29A-4A2D-BAF3-6776A8F67691}"/>
+          </ac:spMkLst>
+        </pc:spChg>
+        <pc:spChg chg="add">
+          <ac:chgData name="virgchu@gmail.com" userId="677acab2f67d70a2" providerId="LiveId" clId="{F7D6827F-3AFD-421F-AAB4-B002D707D973}" dt="2017-09-13T19:20:13.535" v="12"/>
+          <ac:spMkLst>
+            <pc:docMk/>
+            <pc:sldMk cId="324603706" sldId="262"/>
+            <ac:spMk id="7" creationId="{3CF82DC5-2453-48BC-A797-35C8491FBF0C}"/>
+          </ac:spMkLst>
+        </pc:spChg>
+        <pc:picChg chg="add">
+          <ac:chgData name="virgchu@gmail.com" userId="677acab2f67d70a2" providerId="LiveId" clId="{F7D6827F-3AFD-421F-AAB4-B002D707D973}" dt="2017-09-13T19:19:56.957" v="11"/>
+          <ac:picMkLst>
+            <pc:docMk/>
+            <pc:sldMk cId="324603706" sldId="262"/>
+            <ac:picMk id="4" creationId="{1893E8AB-B82D-4CB4-82F4-74711191E5C1}"/>
+          </ac:picMkLst>
+        </pc:picChg>
+      </pc:sldChg>
+      <pc:sldChg chg="addSp modSp add">
+        <pc:chgData name="virgchu@gmail.com" userId="677acab2f67d70a2" providerId="LiveId" clId="{F7D6827F-3AFD-421F-AAB4-B002D707D973}" dt="2017-09-13T19:24:58.695" v="23"/>
+        <pc:sldMkLst>
+          <pc:docMk/>
+          <pc:sldMk cId="2780353573" sldId="263"/>
+        </pc:sldMkLst>
+        <pc:spChg chg="add">
+          <ac:chgData name="virgchu@gmail.com" userId="677acab2f67d70a2" providerId="LiveId" clId="{F7D6827F-3AFD-421F-AAB4-B002D707D973}" dt="2017-09-13T19:21:56.247" v="15"/>
+          <ac:spMkLst>
+            <pc:docMk/>
+            <pc:sldMk cId="2780353573" sldId="263"/>
+            <ac:spMk id="5" creationId="{5117D7E4-247D-45D5-AF94-0FCB6A9E9CAE}"/>
+          </ac:spMkLst>
+        </pc:spChg>
+        <pc:spChg chg="add">
+          <ac:chgData name="virgchu@gmail.com" userId="677acab2f67d70a2" providerId="LiveId" clId="{F7D6827F-3AFD-421F-AAB4-B002D707D973}" dt="2017-09-13T19:21:56.247" v="15"/>
+          <ac:spMkLst>
+            <pc:docMk/>
+            <pc:sldMk cId="2780353573" sldId="263"/>
+            <ac:spMk id="6" creationId="{DE59EA61-0613-4250-B952-8787A51B0C35}"/>
+          </ac:spMkLst>
+        </pc:spChg>
+        <pc:spChg chg="add">
+          <ac:chgData name="virgchu@gmail.com" userId="677acab2f67d70a2" providerId="LiveId" clId="{F7D6827F-3AFD-421F-AAB4-B002D707D973}" dt="2017-09-13T19:21:56.247" v="15"/>
+          <ac:spMkLst>
+            <pc:docMk/>
+            <pc:sldMk cId="2780353573" sldId="263"/>
+            <ac:spMk id="7" creationId="{32968E38-08A6-47C9-AA2C-ABDA90E5CCF1}"/>
+          </ac:spMkLst>
+        </pc:spChg>
+        <pc:picChg chg="add">
+          <ac:chgData name="virgchu@gmail.com" userId="677acab2f67d70a2" providerId="LiveId" clId="{F7D6827F-3AFD-421F-AAB4-B002D707D973}" dt="2017-09-13T19:21:45.054" v="14"/>
+          <ac:picMkLst>
+            <pc:docMk/>
+            <pc:sldMk cId="2780353573" sldId="263"/>
+            <ac:picMk id="4" creationId="{64555AEF-0AED-46C7-9C8E-F0B347B30FBD}"/>
+          </ac:picMkLst>
+        </pc:picChg>
+        <pc:cxnChg chg="add mod">
+          <ac:chgData name="virgchu@gmail.com" userId="677acab2f67d70a2" providerId="LiveId" clId="{F7D6827F-3AFD-421F-AAB4-B002D707D973}" dt="2017-09-13T19:22:49.635" v="16"/>
+          <ac:cxnSpMkLst>
+            <pc:docMk/>
+            <pc:sldMk cId="2780353573" sldId="263"/>
+            <ac:cxnSpMk id="9" creationId="{37ED6816-ADA7-4DE5-9D6C-7DAF3FB9ADC1}"/>
+          </ac:cxnSpMkLst>
+        </pc:cxnChg>
+        <pc:cxnChg chg="add">
+          <ac:chgData name="virgchu@gmail.com" userId="677acab2f67d70a2" providerId="LiveId" clId="{F7D6827F-3AFD-421F-AAB4-B002D707D973}" dt="2017-09-13T19:23:08.946" v="17"/>
+          <ac:cxnSpMkLst>
+            <pc:docMk/>
+            <pc:sldMk cId="2780353573" sldId="263"/>
+            <ac:cxnSpMk id="11" creationId="{270E0F23-1537-445A-84CB-5A9E197236BA}"/>
+          </ac:cxnSpMkLst>
+        </pc:cxnChg>
+        <pc:cxnChg chg="add">
+          <ac:chgData name="virgchu@gmail.com" userId="677acab2f67d70a2" providerId="LiveId" clId="{F7D6827F-3AFD-421F-AAB4-B002D707D973}" dt="2017-09-13T19:23:13.637" v="18"/>
+          <ac:cxnSpMkLst>
+            <pc:docMk/>
+            <pc:sldMk cId="2780353573" sldId="263"/>
+            <ac:cxnSpMk id="12" creationId="{A491A5BE-0BD4-4D50-868C-9E1B9D1C975D}"/>
+          </ac:cxnSpMkLst>
+        </pc:cxnChg>
+        <pc:cxnChg chg="add">
+          <ac:chgData name="virgchu@gmail.com" userId="677acab2f67d70a2" providerId="LiveId" clId="{F7D6827F-3AFD-421F-AAB4-B002D707D973}" dt="2017-09-13T19:23:20.255" v="19"/>
+          <ac:cxnSpMkLst>
+            <pc:docMk/>
+            <pc:sldMk cId="2780353573" sldId="263"/>
+            <ac:cxnSpMk id="13" creationId="{8FB72AAC-EF70-4381-9312-BDBC173F48E1}"/>
+          </ac:cxnSpMkLst>
+        </pc:cxnChg>
+        <pc:cxnChg chg="add">
+          <ac:chgData name="virgchu@gmail.com" userId="677acab2f67d70a2" providerId="LiveId" clId="{F7D6827F-3AFD-421F-AAB4-B002D707D973}" dt="2017-09-13T19:23:28.247" v="20"/>
+          <ac:cxnSpMkLst>
+            <pc:docMk/>
+            <pc:sldMk cId="2780353573" sldId="263"/>
+            <ac:cxnSpMk id="14" creationId="{59AB723B-B33F-4949-8201-0818D6126589}"/>
+          </ac:cxnSpMkLst>
+        </pc:cxnChg>
+        <pc:cxnChg chg="add">
+          <ac:chgData name="virgchu@gmail.com" userId="677acab2f67d70a2" providerId="LiveId" clId="{F7D6827F-3AFD-421F-AAB4-B002D707D973}" dt="2017-09-13T19:23:55.164" v="21"/>
+          <ac:cxnSpMkLst>
+            <pc:docMk/>
+            <pc:sldMk cId="2780353573" sldId="263"/>
+            <ac:cxnSpMk id="15" creationId="{80667555-B72B-4B91-8953-042DCDEC87E6}"/>
+          </ac:cxnSpMkLst>
+        </pc:cxnChg>
+        <pc:cxnChg chg="add">
+          <ac:chgData name="virgchu@gmail.com" userId="677acab2f67d70a2" providerId="LiveId" clId="{F7D6827F-3AFD-421F-AAB4-B002D707D973}" dt="2017-09-13T19:24:04.594" v="22"/>
+          <ac:cxnSpMkLst>
+            <pc:docMk/>
+            <pc:sldMk cId="2780353573" sldId="263"/>
+            <ac:cxnSpMk id="16" creationId="{8E26BE6A-DF0C-459B-9425-E228B2C572E1}"/>
+          </ac:cxnSpMkLst>
+        </pc:cxnChg>
+        <pc:cxnChg chg="add">
+          <ac:chgData name="virgchu@gmail.com" userId="677acab2f67d70a2" providerId="LiveId" clId="{F7D6827F-3AFD-421F-AAB4-B002D707D973}" dt="2017-09-13T19:24:58.695" v="23"/>
+          <ac:cxnSpMkLst>
+            <pc:docMk/>
+            <pc:sldMk cId="2780353573" sldId="263"/>
+            <ac:cxnSpMk id="17" creationId="{7FCBA8E7-4A34-4F80-B5B2-EE39D3F802C8}"/>
+          </ac:cxnSpMkLst>
+        </pc:cxnChg>
+      </pc:sldChg>
+    </pc:docChg>
+  </pc:docChgLst>
+</pc:chgInfo>
 </file>
 
 <file path=ppt/slideLayouts/slideLayout1.xml><?xml version="1.0" encoding="utf-8"?>
@@ -249,7 +475,7 @@
           <a:p>
             <a:fld id="{B012F8CE-8D55-49DF-A366-11CAB4E48BBF}" type="datetimeFigureOut">
               <a:rPr lang="en-US" smtClean="0"/>
-              <a:t>8/25/2017</a:t>
+              <a:t>9/13/2017</a:t>
             </a:fld>
             <a:endParaRPr lang="en-US"/>
           </a:p>
@@ -417,7 +643,7 @@
           <a:p>
             <a:fld id="{B012F8CE-8D55-49DF-A366-11CAB4E48BBF}" type="datetimeFigureOut">
               <a:rPr lang="en-US" smtClean="0"/>
-              <a:t>8/25/2017</a:t>
+              <a:t>9/13/2017</a:t>
             </a:fld>
             <a:endParaRPr lang="en-US"/>
           </a:p>
@@ -595,7 +821,7 @@
           <a:p>
             <a:fld id="{B012F8CE-8D55-49DF-A366-11CAB4E48BBF}" type="datetimeFigureOut">
               <a:rPr lang="en-US" smtClean="0"/>
-              <a:t>8/25/2017</a:t>
+              <a:t>9/13/2017</a:t>
             </a:fld>
             <a:endParaRPr lang="en-US"/>
           </a:p>
@@ -763,7 +989,7 @@
           <a:p>
             <a:fld id="{B012F8CE-8D55-49DF-A366-11CAB4E48BBF}" type="datetimeFigureOut">
               <a:rPr lang="en-US" smtClean="0"/>
-              <a:t>8/25/2017</a:t>
+              <a:t>9/13/2017</a:t>
             </a:fld>
             <a:endParaRPr lang="en-US"/>
           </a:p>
@@ -1008,7 +1234,7 @@
           <a:p>
             <a:fld id="{B012F8CE-8D55-49DF-A366-11CAB4E48BBF}" type="datetimeFigureOut">
               <a:rPr lang="en-US" smtClean="0"/>
-              <a:t>8/25/2017</a:t>
+              <a:t>9/13/2017</a:t>
             </a:fld>
             <a:endParaRPr lang="en-US"/>
           </a:p>
@@ -1237,7 +1463,7 @@
           <a:p>
             <a:fld id="{B012F8CE-8D55-49DF-A366-11CAB4E48BBF}" type="datetimeFigureOut">
               <a:rPr lang="en-US" smtClean="0"/>
-              <a:t>8/25/2017</a:t>
+              <a:t>9/13/2017</a:t>
             </a:fld>
             <a:endParaRPr lang="en-US"/>
           </a:p>
@@ -1601,7 +1827,7 @@
           <a:p>
             <a:fld id="{B012F8CE-8D55-49DF-A366-11CAB4E48BBF}" type="datetimeFigureOut">
               <a:rPr lang="en-US" smtClean="0"/>
-              <a:t>8/25/2017</a:t>
+              <a:t>9/13/2017</a:t>
             </a:fld>
             <a:endParaRPr lang="en-US"/>
           </a:p>
@@ -1718,7 +1944,7 @@
           <a:p>
             <a:fld id="{B012F8CE-8D55-49DF-A366-11CAB4E48BBF}" type="datetimeFigureOut">
               <a:rPr lang="en-US" smtClean="0"/>
-              <a:t>8/25/2017</a:t>
+              <a:t>9/13/2017</a:t>
             </a:fld>
             <a:endParaRPr lang="en-US"/>
           </a:p>
@@ -1813,7 +2039,7 @@
           <a:p>
             <a:fld id="{B012F8CE-8D55-49DF-A366-11CAB4E48BBF}" type="datetimeFigureOut">
               <a:rPr lang="en-US" smtClean="0"/>
-              <a:t>8/25/2017</a:t>
+              <a:t>9/13/2017</a:t>
             </a:fld>
             <a:endParaRPr lang="en-US"/>
           </a:p>
@@ -2088,7 +2314,7 @@
           <a:p>
             <a:fld id="{B012F8CE-8D55-49DF-A366-11CAB4E48BBF}" type="datetimeFigureOut">
               <a:rPr lang="en-US" smtClean="0"/>
-              <a:t>8/25/2017</a:t>
+              <a:t>9/13/2017</a:t>
             </a:fld>
             <a:endParaRPr lang="en-US"/>
           </a:p>
@@ -2340,7 +2566,7 @@
           <a:p>
             <a:fld id="{B012F8CE-8D55-49DF-A366-11CAB4E48BBF}" type="datetimeFigureOut">
               <a:rPr lang="en-US" smtClean="0"/>
-              <a:t>8/25/2017</a:t>
+              <a:t>9/13/2017</a:t>
             </a:fld>
             <a:endParaRPr lang="en-US"/>
           </a:p>
@@ -2551,7 +2777,7 @@
           <a:p>
             <a:fld id="{B012F8CE-8D55-49DF-A366-11CAB4E48BBF}" type="datetimeFigureOut">
               <a:rPr lang="en-US" smtClean="0"/>
-              <a:t>8/25/2017</a:t>
+              <a:t>9/13/2017</a:t>
             </a:fld>
             <a:endParaRPr lang="en-US"/>
           </a:p>
@@ -2971,7 +3197,7 @@
           <a:bodyPr/>
           <a:lstStyle/>
           <a:p>
-            <a:endParaRPr lang="en-US"/>
+            <a:endParaRPr lang="en-US" dirty="0"/>
           </a:p>
         </p:txBody>
       </p:sp>
@@ -6706,7 +6932,6 @@
               <a:rPr lang="en-US" dirty="0"/>
               <a:t>13 and 18 landmarks</a:t>
             </a:r>
-            <a:endParaRPr lang="en-US" dirty="0"/>
           </a:p>
         </p:txBody>
       </p:sp>
@@ -8293,6 +8518,1181 @@
     <p:extLst>
       <p:ext uri="{BB962C8B-B14F-4D97-AF65-F5344CB8AC3E}">
         <p14:creationId xmlns:p14="http://schemas.microsoft.com/office/powerpoint/2010/main" val="4254812889"/>
+      </p:ext>
+    </p:extLst>
+  </p:cSld>
+  <p:clrMapOvr>
+    <a:masterClrMapping/>
+  </p:clrMapOvr>
+</p:sld>
+</file>
+
+<file path=ppt/slides/slide6.xml><?xml version="1.0" encoding="utf-8"?>
+<p:sld xmlns:a="http://schemas.openxmlformats.org/drawingml/2006/main" xmlns:r="http://schemas.openxmlformats.org/officeDocument/2006/relationships" xmlns:p="http://schemas.openxmlformats.org/presentationml/2006/main">
+  <p:cSld>
+    <p:spTree>
+      <p:nvGrpSpPr>
+        <p:cNvPr id="1" name=""/>
+        <p:cNvGrpSpPr/>
+        <p:nvPr/>
+      </p:nvGrpSpPr>
+      <p:grpSpPr>
+        <a:xfrm>
+          <a:off x="0" y="0"/>
+          <a:ext cx="0" cy="0"/>
+          <a:chOff x="0" y="0"/>
+          <a:chExt cx="0" cy="0"/>
+        </a:xfrm>
+      </p:grpSpPr>
+      <p:sp>
+        <p:nvSpPr>
+          <p:cNvPr id="2" name="Title 1">
+            <a:extLst>
+              <a:ext uri="{FF2B5EF4-FFF2-40B4-BE49-F238E27FC236}">
+                <a16:creationId xmlns:a16="http://schemas.microsoft.com/office/drawing/2014/main" id="{7A2001C1-6432-44AF-90A4-FF63C9A62257}"/>
+              </a:ext>
+            </a:extLst>
+          </p:cNvPr>
+          <p:cNvSpPr>
+            <a:spLocks noGrp="1"/>
+          </p:cNvSpPr>
+          <p:nvPr>
+            <p:ph type="title"/>
+          </p:nvPr>
+        </p:nvSpPr>
+        <p:spPr/>
+        <p:txBody>
+          <a:bodyPr/>
+          <a:lstStyle/>
+          <a:p>
+            <a:endParaRPr lang="en-US"/>
+          </a:p>
+        </p:txBody>
+      </p:sp>
+      <p:sp>
+        <p:nvSpPr>
+          <p:cNvPr id="3" name="Content Placeholder 2">
+            <a:extLst>
+              <a:ext uri="{FF2B5EF4-FFF2-40B4-BE49-F238E27FC236}">
+                <a16:creationId xmlns:a16="http://schemas.microsoft.com/office/drawing/2014/main" id="{4052DEAC-9578-4F81-BD8E-E356213D70FD}"/>
+              </a:ext>
+            </a:extLst>
+          </p:cNvPr>
+          <p:cNvSpPr>
+            <a:spLocks noGrp="1"/>
+          </p:cNvSpPr>
+          <p:nvPr>
+            <p:ph idx="1"/>
+          </p:nvPr>
+        </p:nvSpPr>
+        <p:spPr/>
+        <p:txBody>
+          <a:bodyPr/>
+          <a:lstStyle/>
+          <a:p>
+            <a:endParaRPr lang="en-US" dirty="0"/>
+          </a:p>
+        </p:txBody>
+      </p:sp>
+      <p:pic>
+        <p:nvPicPr>
+          <p:cNvPr id="4" name="Content Placeholder 4">
+            <a:extLst>
+              <a:ext uri="{FF2B5EF4-FFF2-40B4-BE49-F238E27FC236}">
+                <a16:creationId xmlns:a16="http://schemas.microsoft.com/office/drawing/2014/main" id="{E0C9E166-E66C-4153-B74B-1DFFEFAF581E}"/>
+              </a:ext>
+            </a:extLst>
+          </p:cNvPr>
+          <p:cNvPicPr>
+            <a:picLocks noChangeAspect="1"/>
+          </p:cNvPicPr>
+          <p:nvPr/>
+        </p:nvPicPr>
+        <p:blipFill>
+          <a:blip r:embed="rId2">
+            <a:extLst>
+              <a:ext uri="{28A0092B-C50C-407E-A947-70E740481C1C}">
+                <a14:useLocalDpi xmlns:a14="http://schemas.microsoft.com/office/drawing/2010/main" val="0"/>
+              </a:ext>
+            </a:extLst>
+          </a:blip>
+          <a:stretch>
+            <a:fillRect/>
+          </a:stretch>
+        </p:blipFill>
+        <p:spPr>
+          <a:xfrm>
+            <a:off x="3466013" y="1920805"/>
+            <a:ext cx="7249163" cy="4351338"/>
+          </a:xfrm>
+          <a:prstGeom prst="rect">
+            <a:avLst/>
+          </a:prstGeom>
+        </p:spPr>
+      </p:pic>
+      <p:sp>
+        <p:nvSpPr>
+          <p:cNvPr id="7" name="Left Bracket 6">
+            <a:extLst>
+              <a:ext uri="{FF2B5EF4-FFF2-40B4-BE49-F238E27FC236}">
+                <a16:creationId xmlns:a16="http://schemas.microsoft.com/office/drawing/2014/main" id="{8CEF9D6F-BE92-470B-8DC5-66337F6A3D25}"/>
+              </a:ext>
+            </a:extLst>
+          </p:cNvPr>
+          <p:cNvSpPr/>
+          <p:nvPr/>
+        </p:nvSpPr>
+        <p:spPr>
+          <a:xfrm rot="5400000">
+            <a:off x="6373470" y="1113683"/>
+            <a:ext cx="112310" cy="3291841"/>
+          </a:xfrm>
+          <a:prstGeom prst="leftBracket">
+            <a:avLst/>
+          </a:prstGeom>
+          <a:ln w="12700"/>
+        </p:spPr>
+        <p:style>
+          <a:lnRef idx="1">
+            <a:schemeClr val="dk1"/>
+          </a:lnRef>
+          <a:fillRef idx="0">
+            <a:schemeClr val="dk1"/>
+          </a:fillRef>
+          <a:effectRef idx="0">
+            <a:schemeClr val="dk1"/>
+          </a:effectRef>
+          <a:fontRef idx="minor">
+            <a:schemeClr val="tx1"/>
+          </a:fontRef>
+        </p:style>
+        <p:txBody>
+          <a:bodyPr rtlCol="0" anchor="ctr"/>
+          <a:lstStyle/>
+          <a:p>
+            <a:pPr algn="ctr"/>
+            <a:endParaRPr lang="en-US"/>
+          </a:p>
+        </p:txBody>
+      </p:sp>
+      <p:sp>
+        <p:nvSpPr>
+          <p:cNvPr id="8" name="Left Bracket 7">
+            <a:extLst>
+              <a:ext uri="{FF2B5EF4-FFF2-40B4-BE49-F238E27FC236}">
+                <a16:creationId xmlns:a16="http://schemas.microsoft.com/office/drawing/2014/main" id="{3FB2B192-D303-4AD9-861F-8EA8D9DD2F60}"/>
+              </a:ext>
+            </a:extLst>
+          </p:cNvPr>
+          <p:cNvSpPr/>
+          <p:nvPr/>
+        </p:nvSpPr>
+        <p:spPr>
+          <a:xfrm rot="5400000">
+            <a:off x="6827568" y="1713692"/>
+            <a:ext cx="80741" cy="2415211"/>
+          </a:xfrm>
+          <a:prstGeom prst="leftBracket">
+            <a:avLst/>
+          </a:prstGeom>
+          <a:ln w="12700"/>
+        </p:spPr>
+        <p:style>
+          <a:lnRef idx="1">
+            <a:schemeClr val="dk1"/>
+          </a:lnRef>
+          <a:fillRef idx="0">
+            <a:schemeClr val="dk1"/>
+          </a:fillRef>
+          <a:effectRef idx="0">
+            <a:schemeClr val="dk1"/>
+          </a:effectRef>
+          <a:fontRef idx="minor">
+            <a:schemeClr val="tx1"/>
+          </a:fontRef>
+        </p:style>
+        <p:txBody>
+          <a:bodyPr rtlCol="0" anchor="ctr"/>
+          <a:lstStyle/>
+          <a:p>
+            <a:pPr algn="ctr"/>
+            <a:endParaRPr lang="en-US"/>
+          </a:p>
+        </p:txBody>
+      </p:sp>
+      <p:sp>
+        <p:nvSpPr>
+          <p:cNvPr id="9" name="Left Bracket 8">
+            <a:extLst>
+              <a:ext uri="{FF2B5EF4-FFF2-40B4-BE49-F238E27FC236}">
+                <a16:creationId xmlns:a16="http://schemas.microsoft.com/office/drawing/2014/main" id="{6DC6E586-253E-4320-A46C-ADF1B5C6F808}"/>
+              </a:ext>
+            </a:extLst>
+          </p:cNvPr>
+          <p:cNvSpPr/>
+          <p:nvPr/>
+        </p:nvSpPr>
+        <p:spPr>
+          <a:xfrm rot="5400000">
+            <a:off x="7197305" y="2332103"/>
+            <a:ext cx="156276" cy="1600202"/>
+          </a:xfrm>
+          <a:prstGeom prst="leftBracket">
+            <a:avLst/>
+          </a:prstGeom>
+          <a:ln w="12700"/>
+        </p:spPr>
+        <p:style>
+          <a:lnRef idx="1">
+            <a:schemeClr val="dk1"/>
+          </a:lnRef>
+          <a:fillRef idx="0">
+            <a:schemeClr val="dk1"/>
+          </a:fillRef>
+          <a:effectRef idx="0">
+            <a:schemeClr val="dk1"/>
+          </a:effectRef>
+          <a:fontRef idx="minor">
+            <a:schemeClr val="tx1"/>
+          </a:fontRef>
+        </p:style>
+        <p:txBody>
+          <a:bodyPr rtlCol="0" anchor="ctr"/>
+          <a:lstStyle/>
+          <a:p>
+            <a:pPr algn="ctr"/>
+            <a:endParaRPr lang="en-US"/>
+          </a:p>
+        </p:txBody>
+      </p:sp>
+      <p:sp>
+        <p:nvSpPr>
+          <p:cNvPr id="10" name="Left Bracket 9">
+            <a:extLst>
+              <a:ext uri="{FF2B5EF4-FFF2-40B4-BE49-F238E27FC236}">
+                <a16:creationId xmlns:a16="http://schemas.microsoft.com/office/drawing/2014/main" id="{DC244EFF-2DF5-4DE8-8F3A-F8033960C363}"/>
+              </a:ext>
+            </a:extLst>
+          </p:cNvPr>
+          <p:cNvSpPr/>
+          <p:nvPr/>
+        </p:nvSpPr>
+        <p:spPr>
+          <a:xfrm rot="5400000">
+            <a:off x="6771729" y="715423"/>
+            <a:ext cx="85081" cy="4061132"/>
+          </a:xfrm>
+          <a:prstGeom prst="leftBracket">
+            <a:avLst/>
+          </a:prstGeom>
+          <a:ln w="12700"/>
+        </p:spPr>
+        <p:style>
+          <a:lnRef idx="1">
+            <a:schemeClr val="dk1"/>
+          </a:lnRef>
+          <a:fillRef idx="0">
+            <a:schemeClr val="dk1"/>
+          </a:fillRef>
+          <a:effectRef idx="0">
+            <a:schemeClr val="dk1"/>
+          </a:effectRef>
+          <a:fontRef idx="minor">
+            <a:schemeClr val="tx1"/>
+          </a:fontRef>
+        </p:style>
+        <p:txBody>
+          <a:bodyPr rtlCol="0" anchor="ctr"/>
+          <a:lstStyle/>
+          <a:p>
+            <a:pPr algn="ctr"/>
+            <a:endParaRPr lang="en-US"/>
+          </a:p>
+        </p:txBody>
+      </p:sp>
+      <p:sp>
+        <p:nvSpPr>
+          <p:cNvPr id="12" name="Left Bracket 11">
+            <a:extLst>
+              <a:ext uri="{FF2B5EF4-FFF2-40B4-BE49-F238E27FC236}">
+                <a16:creationId xmlns:a16="http://schemas.microsoft.com/office/drawing/2014/main" id="{9D586CBC-1A3E-449D-A5CB-5CDF8FC8D400}"/>
+              </a:ext>
+            </a:extLst>
+          </p:cNvPr>
+          <p:cNvSpPr/>
+          <p:nvPr/>
+        </p:nvSpPr>
+        <p:spPr>
+          <a:xfrm rot="5400000">
+            <a:off x="7642577" y="1888999"/>
+            <a:ext cx="80741" cy="2415211"/>
+          </a:xfrm>
+          <a:prstGeom prst="leftBracket">
+            <a:avLst/>
+          </a:prstGeom>
+          <a:ln w="12700"/>
+        </p:spPr>
+        <p:style>
+          <a:lnRef idx="1">
+            <a:schemeClr val="dk1"/>
+          </a:lnRef>
+          <a:fillRef idx="0">
+            <a:schemeClr val="dk1"/>
+          </a:fillRef>
+          <a:effectRef idx="0">
+            <a:schemeClr val="dk1"/>
+          </a:effectRef>
+          <a:fontRef idx="minor">
+            <a:schemeClr val="tx1"/>
+          </a:fontRef>
+        </p:style>
+        <p:txBody>
+          <a:bodyPr rtlCol="0" anchor="ctr"/>
+          <a:lstStyle/>
+          <a:p>
+            <a:pPr algn="ctr"/>
+            <a:endParaRPr lang="en-US"/>
+          </a:p>
+        </p:txBody>
+      </p:sp>
+    </p:spTree>
+    <p:extLst>
+      <p:ext uri="{BB962C8B-B14F-4D97-AF65-F5344CB8AC3E}">
+        <p14:creationId xmlns:p14="http://schemas.microsoft.com/office/powerpoint/2010/main" val="308476257"/>
+      </p:ext>
+    </p:extLst>
+  </p:cSld>
+  <p:clrMapOvr>
+    <a:masterClrMapping/>
+  </p:clrMapOvr>
+</p:sld>
+</file>
+
+<file path=ppt/slides/slide7.xml><?xml version="1.0" encoding="utf-8"?>
+<p:sld xmlns:a="http://schemas.openxmlformats.org/drawingml/2006/main" xmlns:r="http://schemas.openxmlformats.org/officeDocument/2006/relationships" xmlns:p="http://schemas.openxmlformats.org/presentationml/2006/main">
+  <p:cSld>
+    <p:spTree>
+      <p:nvGrpSpPr>
+        <p:cNvPr id="1" name=""/>
+        <p:cNvGrpSpPr/>
+        <p:nvPr/>
+      </p:nvGrpSpPr>
+      <p:grpSpPr>
+        <a:xfrm>
+          <a:off x="0" y="0"/>
+          <a:ext cx="0" cy="0"/>
+          <a:chOff x="0" y="0"/>
+          <a:chExt cx="0" cy="0"/>
+        </a:xfrm>
+      </p:grpSpPr>
+      <p:sp>
+        <p:nvSpPr>
+          <p:cNvPr id="2" name="Title 1">
+            <a:extLst>
+              <a:ext uri="{FF2B5EF4-FFF2-40B4-BE49-F238E27FC236}">
+                <a16:creationId xmlns:a16="http://schemas.microsoft.com/office/drawing/2014/main" id="{74A8B599-AFC3-4E1A-AC81-EB9103F70B83}"/>
+              </a:ext>
+            </a:extLst>
+          </p:cNvPr>
+          <p:cNvSpPr>
+            <a:spLocks noGrp="1"/>
+          </p:cNvSpPr>
+          <p:nvPr>
+            <p:ph type="title"/>
+          </p:nvPr>
+        </p:nvSpPr>
+        <p:spPr/>
+        <p:txBody>
+          <a:bodyPr/>
+          <a:lstStyle/>
+          <a:p>
+            <a:endParaRPr lang="en-US"/>
+          </a:p>
+        </p:txBody>
+      </p:sp>
+      <p:sp>
+        <p:nvSpPr>
+          <p:cNvPr id="3" name="Content Placeholder 2">
+            <a:extLst>
+              <a:ext uri="{FF2B5EF4-FFF2-40B4-BE49-F238E27FC236}">
+                <a16:creationId xmlns:a16="http://schemas.microsoft.com/office/drawing/2014/main" id="{F763287F-2020-44B4-9BEC-1BB05E69651F}"/>
+              </a:ext>
+            </a:extLst>
+          </p:cNvPr>
+          <p:cNvSpPr>
+            <a:spLocks noGrp="1"/>
+          </p:cNvSpPr>
+          <p:nvPr>
+            <p:ph idx="1"/>
+          </p:nvPr>
+        </p:nvSpPr>
+        <p:spPr/>
+        <p:txBody>
+          <a:bodyPr/>
+          <a:lstStyle/>
+          <a:p>
+            <a:endParaRPr lang="en-US"/>
+          </a:p>
+        </p:txBody>
+      </p:sp>
+      <p:pic>
+        <p:nvPicPr>
+          <p:cNvPr id="4" name="Picture 3">
+            <a:extLst>
+              <a:ext uri="{FF2B5EF4-FFF2-40B4-BE49-F238E27FC236}">
+                <a16:creationId xmlns:a16="http://schemas.microsoft.com/office/drawing/2014/main" id="{1893E8AB-B82D-4CB4-82F4-74711191E5C1}"/>
+              </a:ext>
+            </a:extLst>
+          </p:cNvPr>
+          <p:cNvPicPr>
+            <a:picLocks noChangeAspect="1"/>
+          </p:cNvPicPr>
+          <p:nvPr/>
+        </p:nvPicPr>
+        <p:blipFill>
+          <a:blip r:embed="rId2"/>
+          <a:stretch>
+            <a:fillRect/>
+          </a:stretch>
+        </p:blipFill>
+        <p:spPr>
+          <a:xfrm>
+            <a:off x="4181475" y="1383689"/>
+            <a:ext cx="7172325" cy="5133975"/>
+          </a:xfrm>
+          <a:prstGeom prst="rect">
+            <a:avLst/>
+          </a:prstGeom>
+        </p:spPr>
+      </p:pic>
+      <p:sp>
+        <p:nvSpPr>
+          <p:cNvPr id="5" name="Left Bracket 4">
+            <a:extLst>
+              <a:ext uri="{FF2B5EF4-FFF2-40B4-BE49-F238E27FC236}">
+                <a16:creationId xmlns:a16="http://schemas.microsoft.com/office/drawing/2014/main" id="{47591894-F0DB-44F4-9C25-8F32C5F27049}"/>
+              </a:ext>
+            </a:extLst>
+          </p:cNvPr>
+          <p:cNvSpPr/>
+          <p:nvPr/>
+        </p:nvSpPr>
+        <p:spPr>
+          <a:xfrm rot="5400000">
+            <a:off x="7536815" y="1848557"/>
+            <a:ext cx="80741" cy="2415211"/>
+          </a:xfrm>
+          <a:prstGeom prst="leftBracket">
+            <a:avLst/>
+          </a:prstGeom>
+          <a:ln w="12700"/>
+        </p:spPr>
+        <p:style>
+          <a:lnRef idx="1">
+            <a:schemeClr val="dk1"/>
+          </a:lnRef>
+          <a:fillRef idx="0">
+            <a:schemeClr val="dk1"/>
+          </a:fillRef>
+          <a:effectRef idx="0">
+            <a:schemeClr val="dk1"/>
+          </a:effectRef>
+          <a:fontRef idx="minor">
+            <a:schemeClr val="tx1"/>
+          </a:fontRef>
+        </p:style>
+        <p:txBody>
+          <a:bodyPr rtlCol="0" anchor="ctr"/>
+          <a:lstStyle/>
+          <a:p>
+            <a:pPr algn="ctr"/>
+            <a:endParaRPr lang="en-US"/>
+          </a:p>
+        </p:txBody>
+      </p:sp>
+      <p:sp>
+        <p:nvSpPr>
+          <p:cNvPr id="6" name="Left Bracket 5">
+            <a:extLst>
+              <a:ext uri="{FF2B5EF4-FFF2-40B4-BE49-F238E27FC236}">
+                <a16:creationId xmlns:a16="http://schemas.microsoft.com/office/drawing/2014/main" id="{86DA92EA-A29A-4A2D-BAF3-6776A8F67691}"/>
+              </a:ext>
+            </a:extLst>
+          </p:cNvPr>
+          <p:cNvSpPr/>
+          <p:nvPr/>
+        </p:nvSpPr>
+        <p:spPr>
+          <a:xfrm rot="5400000">
+            <a:off x="7912504" y="221223"/>
+            <a:ext cx="166214" cy="4971529"/>
+          </a:xfrm>
+          <a:prstGeom prst="leftBracket">
+            <a:avLst/>
+          </a:prstGeom>
+          <a:ln w="12700"/>
+        </p:spPr>
+        <p:style>
+          <a:lnRef idx="1">
+            <a:schemeClr val="dk1"/>
+          </a:lnRef>
+          <a:fillRef idx="0">
+            <a:schemeClr val="dk1"/>
+          </a:fillRef>
+          <a:effectRef idx="0">
+            <a:schemeClr val="dk1"/>
+          </a:effectRef>
+          <a:fontRef idx="minor">
+            <a:schemeClr val="tx1"/>
+          </a:fontRef>
+        </p:style>
+        <p:txBody>
+          <a:bodyPr rtlCol="0" anchor="ctr"/>
+          <a:lstStyle/>
+          <a:p>
+            <a:pPr algn="ctr"/>
+            <a:endParaRPr lang="en-US"/>
+          </a:p>
+        </p:txBody>
+      </p:sp>
+      <p:sp>
+        <p:nvSpPr>
+          <p:cNvPr id="7" name="Left Bracket 6">
+            <a:extLst>
+              <a:ext uri="{FF2B5EF4-FFF2-40B4-BE49-F238E27FC236}">
+                <a16:creationId xmlns:a16="http://schemas.microsoft.com/office/drawing/2014/main" id="{3CF82DC5-2453-48BC-A797-35C8491FBF0C}"/>
+              </a:ext>
+            </a:extLst>
+          </p:cNvPr>
+          <p:cNvSpPr/>
+          <p:nvPr/>
+        </p:nvSpPr>
+        <p:spPr>
+          <a:xfrm rot="5400000">
+            <a:off x="8410439" y="2269999"/>
+            <a:ext cx="80741" cy="2415211"/>
+          </a:xfrm>
+          <a:prstGeom prst="leftBracket">
+            <a:avLst/>
+          </a:prstGeom>
+          <a:ln w="12700"/>
+        </p:spPr>
+        <p:style>
+          <a:lnRef idx="1">
+            <a:schemeClr val="dk1"/>
+          </a:lnRef>
+          <a:fillRef idx="0">
+            <a:schemeClr val="dk1"/>
+          </a:fillRef>
+          <a:effectRef idx="0">
+            <a:schemeClr val="dk1"/>
+          </a:effectRef>
+          <a:fontRef idx="minor">
+            <a:schemeClr val="tx1"/>
+          </a:fontRef>
+        </p:style>
+        <p:txBody>
+          <a:bodyPr rtlCol="0" anchor="ctr"/>
+          <a:lstStyle/>
+          <a:p>
+            <a:pPr algn="ctr"/>
+            <a:endParaRPr lang="en-US"/>
+          </a:p>
+        </p:txBody>
+      </p:sp>
+    </p:spTree>
+    <p:extLst>
+      <p:ext uri="{BB962C8B-B14F-4D97-AF65-F5344CB8AC3E}">
+        <p14:creationId xmlns:p14="http://schemas.microsoft.com/office/powerpoint/2010/main" val="324603706"/>
+      </p:ext>
+    </p:extLst>
+  </p:cSld>
+  <p:clrMapOvr>
+    <a:masterClrMapping/>
+  </p:clrMapOvr>
+</p:sld>
+</file>
+
+<file path=ppt/slides/slide8.xml><?xml version="1.0" encoding="utf-8"?>
+<p:sld xmlns:a="http://schemas.openxmlformats.org/drawingml/2006/main" xmlns:r="http://schemas.openxmlformats.org/officeDocument/2006/relationships" xmlns:p="http://schemas.openxmlformats.org/presentationml/2006/main">
+  <p:cSld>
+    <p:spTree>
+      <p:nvGrpSpPr>
+        <p:cNvPr id="1" name=""/>
+        <p:cNvGrpSpPr/>
+        <p:nvPr/>
+      </p:nvGrpSpPr>
+      <p:grpSpPr>
+        <a:xfrm>
+          <a:off x="0" y="0"/>
+          <a:ext cx="0" cy="0"/>
+          <a:chOff x="0" y="0"/>
+          <a:chExt cx="0" cy="0"/>
+        </a:xfrm>
+      </p:grpSpPr>
+      <p:sp>
+        <p:nvSpPr>
+          <p:cNvPr id="2" name="Title 1">
+            <a:extLst>
+              <a:ext uri="{FF2B5EF4-FFF2-40B4-BE49-F238E27FC236}">
+                <a16:creationId xmlns:a16="http://schemas.microsoft.com/office/drawing/2014/main" id="{9FE73809-CD54-4380-B626-33C7BE1AB16A}"/>
+              </a:ext>
+            </a:extLst>
+          </p:cNvPr>
+          <p:cNvSpPr>
+            <a:spLocks noGrp="1"/>
+          </p:cNvSpPr>
+          <p:nvPr>
+            <p:ph type="title"/>
+          </p:nvPr>
+        </p:nvSpPr>
+        <p:spPr/>
+        <p:txBody>
+          <a:bodyPr/>
+          <a:lstStyle/>
+          <a:p>
+            <a:endParaRPr lang="en-US" dirty="0"/>
+          </a:p>
+        </p:txBody>
+      </p:sp>
+      <p:sp>
+        <p:nvSpPr>
+          <p:cNvPr id="3" name="Content Placeholder 2">
+            <a:extLst>
+              <a:ext uri="{FF2B5EF4-FFF2-40B4-BE49-F238E27FC236}">
+                <a16:creationId xmlns:a16="http://schemas.microsoft.com/office/drawing/2014/main" id="{9FCA65C4-39D5-481F-8890-9414E8DB41E1}"/>
+              </a:ext>
+            </a:extLst>
+          </p:cNvPr>
+          <p:cNvSpPr>
+            <a:spLocks noGrp="1"/>
+          </p:cNvSpPr>
+          <p:nvPr>
+            <p:ph idx="1"/>
+          </p:nvPr>
+        </p:nvSpPr>
+        <p:spPr/>
+        <p:txBody>
+          <a:bodyPr/>
+          <a:lstStyle/>
+          <a:p>
+            <a:endParaRPr lang="en-US" dirty="0"/>
+          </a:p>
+        </p:txBody>
+      </p:sp>
+      <p:pic>
+        <p:nvPicPr>
+          <p:cNvPr id="4" name="Picture 3">
+            <a:extLst>
+              <a:ext uri="{FF2B5EF4-FFF2-40B4-BE49-F238E27FC236}">
+                <a16:creationId xmlns:a16="http://schemas.microsoft.com/office/drawing/2014/main" id="{64555AEF-0AED-46C7-9C8E-F0B347B30FBD}"/>
+              </a:ext>
+            </a:extLst>
+          </p:cNvPr>
+          <p:cNvPicPr>
+            <a:picLocks noChangeAspect="1"/>
+          </p:cNvPicPr>
+          <p:nvPr/>
+        </p:nvPicPr>
+        <p:blipFill>
+          <a:blip r:embed="rId2"/>
+          <a:stretch>
+            <a:fillRect/>
+          </a:stretch>
+        </p:blipFill>
+        <p:spPr>
+          <a:xfrm>
+            <a:off x="4055817" y="1910494"/>
+            <a:ext cx="7210425" cy="4619625"/>
+          </a:xfrm>
+          <a:prstGeom prst="rect">
+            <a:avLst/>
+          </a:prstGeom>
+        </p:spPr>
+      </p:pic>
+      <p:sp>
+        <p:nvSpPr>
+          <p:cNvPr id="5" name="Left Bracket 4">
+            <a:extLst>
+              <a:ext uri="{FF2B5EF4-FFF2-40B4-BE49-F238E27FC236}">
+                <a16:creationId xmlns:a16="http://schemas.microsoft.com/office/drawing/2014/main" id="{5117D7E4-247D-45D5-AF94-0FCB6A9E9CAE}"/>
+              </a:ext>
+            </a:extLst>
+          </p:cNvPr>
+          <p:cNvSpPr/>
+          <p:nvPr/>
+        </p:nvSpPr>
+        <p:spPr>
+          <a:xfrm rot="5400000">
+            <a:off x="7117834" y="1508596"/>
+            <a:ext cx="159760" cy="3174152"/>
+          </a:xfrm>
+          <a:prstGeom prst="leftBracket">
+            <a:avLst/>
+          </a:prstGeom>
+          <a:ln w="19050"/>
+        </p:spPr>
+        <p:style>
+          <a:lnRef idx="1">
+            <a:schemeClr val="dk1"/>
+          </a:lnRef>
+          <a:fillRef idx="0">
+            <a:schemeClr val="dk1"/>
+          </a:fillRef>
+          <a:effectRef idx="0">
+            <a:schemeClr val="dk1"/>
+          </a:effectRef>
+          <a:fontRef idx="minor">
+            <a:schemeClr val="tx1"/>
+          </a:fontRef>
+        </p:style>
+        <p:txBody>
+          <a:bodyPr rtlCol="0" anchor="ctr"/>
+          <a:lstStyle/>
+          <a:p>
+            <a:pPr algn="ctr"/>
+            <a:endParaRPr lang="en-US"/>
+          </a:p>
+        </p:txBody>
+      </p:sp>
+      <p:sp>
+        <p:nvSpPr>
+          <p:cNvPr id="6" name="Left Bracket 5">
+            <a:extLst>
+              <a:ext uri="{FF2B5EF4-FFF2-40B4-BE49-F238E27FC236}">
+                <a16:creationId xmlns:a16="http://schemas.microsoft.com/office/drawing/2014/main" id="{DE59EA61-0613-4250-B952-8787A51B0C35}"/>
+              </a:ext>
+            </a:extLst>
+          </p:cNvPr>
+          <p:cNvSpPr/>
+          <p:nvPr/>
+        </p:nvSpPr>
+        <p:spPr>
+          <a:xfrm rot="5400000">
+            <a:off x="7959953" y="274565"/>
+            <a:ext cx="172107" cy="4870737"/>
+          </a:xfrm>
+          <a:prstGeom prst="leftBracket">
+            <a:avLst/>
+          </a:prstGeom>
+          <a:ln w="19050"/>
+        </p:spPr>
+        <p:style>
+          <a:lnRef idx="1">
+            <a:schemeClr val="dk1"/>
+          </a:lnRef>
+          <a:fillRef idx="0">
+            <a:schemeClr val="dk1"/>
+          </a:fillRef>
+          <a:effectRef idx="0">
+            <a:schemeClr val="dk1"/>
+          </a:effectRef>
+          <a:fontRef idx="minor">
+            <a:schemeClr val="tx1"/>
+          </a:fontRef>
+        </p:style>
+        <p:txBody>
+          <a:bodyPr rtlCol="0" anchor="ctr"/>
+          <a:lstStyle/>
+          <a:p>
+            <a:pPr algn="ctr"/>
+            <a:endParaRPr lang="en-US"/>
+          </a:p>
+        </p:txBody>
+      </p:sp>
+      <p:sp>
+        <p:nvSpPr>
+          <p:cNvPr id="7" name="Left Bracket 6">
+            <a:extLst>
+              <a:ext uri="{FF2B5EF4-FFF2-40B4-BE49-F238E27FC236}">
+                <a16:creationId xmlns:a16="http://schemas.microsoft.com/office/drawing/2014/main" id="{32968E38-08A6-47C9-AA2C-ABDA90E5CCF1}"/>
+              </a:ext>
+            </a:extLst>
+          </p:cNvPr>
+          <p:cNvSpPr/>
+          <p:nvPr/>
+        </p:nvSpPr>
+        <p:spPr>
+          <a:xfrm rot="5400000">
+            <a:off x="7554159" y="1493712"/>
+            <a:ext cx="160731" cy="4047776"/>
+          </a:xfrm>
+          <a:prstGeom prst="leftBracket">
+            <a:avLst/>
+          </a:prstGeom>
+          <a:ln w="19050"/>
+        </p:spPr>
+        <p:style>
+          <a:lnRef idx="1">
+            <a:schemeClr val="dk1"/>
+          </a:lnRef>
+          <a:fillRef idx="0">
+            <a:schemeClr val="dk1"/>
+          </a:fillRef>
+          <a:effectRef idx="0">
+            <a:schemeClr val="dk1"/>
+          </a:effectRef>
+          <a:fontRef idx="minor">
+            <a:schemeClr val="tx1"/>
+          </a:fontRef>
+        </p:style>
+        <p:txBody>
+          <a:bodyPr rtlCol="0" anchor="ctr"/>
+          <a:lstStyle/>
+          <a:p>
+            <a:pPr algn="ctr"/>
+            <a:endParaRPr lang="en-US"/>
+          </a:p>
+        </p:txBody>
+      </p:sp>
+      <p:cxnSp>
+        <p:nvCxnSpPr>
+          <p:cNvPr id="9" name="Straight Connector 8">
+            <a:extLst>
+              <a:ext uri="{FF2B5EF4-FFF2-40B4-BE49-F238E27FC236}">
+                <a16:creationId xmlns:a16="http://schemas.microsoft.com/office/drawing/2014/main" id="{37ED6816-ADA7-4DE5-9D6C-7DAF3FB9ADC1}"/>
+              </a:ext>
+            </a:extLst>
+          </p:cNvPr>
+          <p:cNvCxnSpPr>
+            <a:cxnSpLocks/>
+          </p:cNvCxnSpPr>
+          <p:nvPr/>
+        </p:nvCxnSpPr>
+        <p:spPr>
+          <a:xfrm>
+            <a:off x="6420678" y="2632816"/>
+            <a:ext cx="0" cy="163171"/>
+          </a:xfrm>
+          <a:prstGeom prst="line">
+            <a:avLst/>
+          </a:prstGeom>
+          <a:ln w="19050">
+            <a:solidFill>
+              <a:schemeClr val="tx1"/>
+            </a:solidFill>
+          </a:ln>
+        </p:spPr>
+        <p:style>
+          <a:lnRef idx="1">
+            <a:schemeClr val="accent1"/>
+          </a:lnRef>
+          <a:fillRef idx="0">
+            <a:schemeClr val="accent1"/>
+          </a:fillRef>
+          <a:effectRef idx="0">
+            <a:schemeClr val="accent1"/>
+          </a:effectRef>
+          <a:fontRef idx="minor">
+            <a:schemeClr val="tx1"/>
+          </a:fontRef>
+        </p:style>
+      </p:cxnSp>
+      <p:cxnSp>
+        <p:nvCxnSpPr>
+          <p:cNvPr id="11" name="Straight Connector 10">
+            <a:extLst>
+              <a:ext uri="{FF2B5EF4-FFF2-40B4-BE49-F238E27FC236}">
+                <a16:creationId xmlns:a16="http://schemas.microsoft.com/office/drawing/2014/main" id="{270E0F23-1537-445A-84CB-5A9E197236BA}"/>
+              </a:ext>
+            </a:extLst>
+          </p:cNvPr>
+          <p:cNvCxnSpPr>
+            <a:cxnSpLocks/>
+          </p:cNvCxnSpPr>
+          <p:nvPr/>
+        </p:nvCxnSpPr>
+        <p:spPr>
+          <a:xfrm>
+            <a:off x="7243204" y="2632816"/>
+            <a:ext cx="0" cy="163171"/>
+          </a:xfrm>
+          <a:prstGeom prst="line">
+            <a:avLst/>
+          </a:prstGeom>
+          <a:ln w="19050">
+            <a:solidFill>
+              <a:schemeClr val="tx1"/>
+            </a:solidFill>
+          </a:ln>
+        </p:spPr>
+        <p:style>
+          <a:lnRef idx="1">
+            <a:schemeClr val="accent1"/>
+          </a:lnRef>
+          <a:fillRef idx="0">
+            <a:schemeClr val="accent1"/>
+          </a:fillRef>
+          <a:effectRef idx="0">
+            <a:schemeClr val="accent1"/>
+          </a:effectRef>
+          <a:fontRef idx="minor">
+            <a:schemeClr val="tx1"/>
+          </a:fontRef>
+        </p:style>
+      </p:cxnSp>
+      <p:cxnSp>
+        <p:nvCxnSpPr>
+          <p:cNvPr id="12" name="Straight Connector 11">
+            <a:extLst>
+              <a:ext uri="{FF2B5EF4-FFF2-40B4-BE49-F238E27FC236}">
+                <a16:creationId xmlns:a16="http://schemas.microsoft.com/office/drawing/2014/main" id="{A491A5BE-0BD4-4D50-868C-9E1B9D1C975D}"/>
+              </a:ext>
+            </a:extLst>
+          </p:cNvPr>
+          <p:cNvCxnSpPr>
+            <a:cxnSpLocks/>
+          </p:cNvCxnSpPr>
+          <p:nvPr/>
+        </p:nvCxnSpPr>
+        <p:spPr>
+          <a:xfrm>
+            <a:off x="8049039" y="2632816"/>
+            <a:ext cx="0" cy="163171"/>
+          </a:xfrm>
+          <a:prstGeom prst="line">
+            <a:avLst/>
+          </a:prstGeom>
+          <a:ln w="19050">
+            <a:solidFill>
+              <a:schemeClr val="tx1"/>
+            </a:solidFill>
+          </a:ln>
+        </p:spPr>
+        <p:style>
+          <a:lnRef idx="1">
+            <a:schemeClr val="accent1"/>
+          </a:lnRef>
+          <a:fillRef idx="0">
+            <a:schemeClr val="accent1"/>
+          </a:fillRef>
+          <a:effectRef idx="0">
+            <a:schemeClr val="accent1"/>
+          </a:effectRef>
+          <a:fontRef idx="minor">
+            <a:schemeClr val="tx1"/>
+          </a:fontRef>
+        </p:style>
+      </p:cxnSp>
+      <p:cxnSp>
+        <p:nvCxnSpPr>
+          <p:cNvPr id="13" name="Straight Connector 12">
+            <a:extLst>
+              <a:ext uri="{FF2B5EF4-FFF2-40B4-BE49-F238E27FC236}">
+                <a16:creationId xmlns:a16="http://schemas.microsoft.com/office/drawing/2014/main" id="{8FB72AAC-EF70-4381-9312-BDBC173F48E1}"/>
+              </a:ext>
+            </a:extLst>
+          </p:cNvPr>
+          <p:cNvCxnSpPr>
+            <a:cxnSpLocks/>
+          </p:cNvCxnSpPr>
+          <p:nvPr/>
+        </p:nvCxnSpPr>
+        <p:spPr>
+          <a:xfrm>
+            <a:off x="8844169" y="2632816"/>
+            <a:ext cx="0" cy="163171"/>
+          </a:xfrm>
+          <a:prstGeom prst="line">
+            <a:avLst/>
+          </a:prstGeom>
+          <a:ln w="19050">
+            <a:solidFill>
+              <a:schemeClr val="tx1"/>
+            </a:solidFill>
+          </a:ln>
+        </p:spPr>
+        <p:style>
+          <a:lnRef idx="1">
+            <a:schemeClr val="accent1"/>
+          </a:lnRef>
+          <a:fillRef idx="0">
+            <a:schemeClr val="accent1"/>
+          </a:fillRef>
+          <a:effectRef idx="0">
+            <a:schemeClr val="accent1"/>
+          </a:effectRef>
+          <a:fontRef idx="minor">
+            <a:schemeClr val="tx1"/>
+          </a:fontRef>
+        </p:style>
+      </p:cxnSp>
+      <p:cxnSp>
+        <p:nvCxnSpPr>
+          <p:cNvPr id="14" name="Straight Connector 13">
+            <a:extLst>
+              <a:ext uri="{FF2B5EF4-FFF2-40B4-BE49-F238E27FC236}">
+                <a16:creationId xmlns:a16="http://schemas.microsoft.com/office/drawing/2014/main" id="{59AB723B-B33F-4949-8201-0818D6126589}"/>
+              </a:ext>
+            </a:extLst>
+          </p:cNvPr>
+          <p:cNvCxnSpPr>
+            <a:cxnSpLocks/>
+          </p:cNvCxnSpPr>
+          <p:nvPr/>
+        </p:nvCxnSpPr>
+        <p:spPr>
+          <a:xfrm>
+            <a:off x="9671667" y="2632816"/>
+            <a:ext cx="0" cy="163171"/>
+          </a:xfrm>
+          <a:prstGeom prst="line">
+            <a:avLst/>
+          </a:prstGeom>
+          <a:ln w="19050">
+            <a:solidFill>
+              <a:schemeClr val="tx1"/>
+            </a:solidFill>
+          </a:ln>
+        </p:spPr>
+        <p:style>
+          <a:lnRef idx="1">
+            <a:schemeClr val="accent1"/>
+          </a:lnRef>
+          <a:fillRef idx="0">
+            <a:schemeClr val="accent1"/>
+          </a:fillRef>
+          <a:effectRef idx="0">
+            <a:schemeClr val="accent1"/>
+          </a:effectRef>
+          <a:fontRef idx="minor">
+            <a:schemeClr val="tx1"/>
+          </a:fontRef>
+        </p:style>
+      </p:cxnSp>
+      <p:cxnSp>
+        <p:nvCxnSpPr>
+          <p:cNvPr id="15" name="Straight Connector 14">
+            <a:extLst>
+              <a:ext uri="{FF2B5EF4-FFF2-40B4-BE49-F238E27FC236}">
+                <a16:creationId xmlns:a16="http://schemas.microsoft.com/office/drawing/2014/main" id="{80667555-B72B-4B91-8953-042DCDEC87E6}"/>
+              </a:ext>
+            </a:extLst>
+          </p:cNvPr>
+          <p:cNvCxnSpPr>
+            <a:cxnSpLocks/>
+          </p:cNvCxnSpPr>
+          <p:nvPr/>
+        </p:nvCxnSpPr>
+        <p:spPr>
+          <a:xfrm>
+            <a:off x="6420678" y="3015792"/>
+            <a:ext cx="0" cy="163171"/>
+          </a:xfrm>
+          <a:prstGeom prst="line">
+            <a:avLst/>
+          </a:prstGeom>
+          <a:ln w="19050">
+            <a:solidFill>
+              <a:schemeClr val="tx1"/>
+            </a:solidFill>
+          </a:ln>
+        </p:spPr>
+        <p:style>
+          <a:lnRef idx="1">
+            <a:schemeClr val="accent1"/>
+          </a:lnRef>
+          <a:fillRef idx="0">
+            <a:schemeClr val="accent1"/>
+          </a:fillRef>
+          <a:effectRef idx="0">
+            <a:schemeClr val="accent1"/>
+          </a:effectRef>
+          <a:fontRef idx="minor">
+            <a:schemeClr val="tx1"/>
+          </a:fontRef>
+        </p:style>
+      </p:cxnSp>
+      <p:cxnSp>
+        <p:nvCxnSpPr>
+          <p:cNvPr id="16" name="Straight Connector 15">
+            <a:extLst>
+              <a:ext uri="{FF2B5EF4-FFF2-40B4-BE49-F238E27FC236}">
+                <a16:creationId xmlns:a16="http://schemas.microsoft.com/office/drawing/2014/main" id="{8E26BE6A-DF0C-459B-9425-E228B2C572E1}"/>
+              </a:ext>
+            </a:extLst>
+          </p:cNvPr>
+          <p:cNvCxnSpPr>
+            <a:cxnSpLocks/>
+          </p:cNvCxnSpPr>
+          <p:nvPr/>
+        </p:nvCxnSpPr>
+        <p:spPr>
+          <a:xfrm>
+            <a:off x="7243204" y="3015792"/>
+            <a:ext cx="0" cy="163171"/>
+          </a:xfrm>
+          <a:prstGeom prst="line">
+            <a:avLst/>
+          </a:prstGeom>
+          <a:ln w="19050">
+            <a:solidFill>
+              <a:schemeClr val="tx1"/>
+            </a:solidFill>
+          </a:ln>
+        </p:spPr>
+        <p:style>
+          <a:lnRef idx="1">
+            <a:schemeClr val="accent1"/>
+          </a:lnRef>
+          <a:fillRef idx="0">
+            <a:schemeClr val="accent1"/>
+          </a:fillRef>
+          <a:effectRef idx="0">
+            <a:schemeClr val="accent1"/>
+          </a:effectRef>
+          <a:fontRef idx="minor">
+            <a:schemeClr val="tx1"/>
+          </a:fontRef>
+        </p:style>
+      </p:cxnSp>
+      <p:cxnSp>
+        <p:nvCxnSpPr>
+          <p:cNvPr id="17" name="Straight Connector 16">
+            <a:extLst>
+              <a:ext uri="{FF2B5EF4-FFF2-40B4-BE49-F238E27FC236}">
+                <a16:creationId xmlns:a16="http://schemas.microsoft.com/office/drawing/2014/main" id="{7FCBA8E7-4A34-4F80-B5B2-EE39D3F802C8}"/>
+              </a:ext>
+            </a:extLst>
+          </p:cNvPr>
+          <p:cNvCxnSpPr>
+            <a:cxnSpLocks/>
+          </p:cNvCxnSpPr>
+          <p:nvPr/>
+        </p:nvCxnSpPr>
+        <p:spPr>
+          <a:xfrm>
+            <a:off x="7251486" y="3437234"/>
+            <a:ext cx="0" cy="163171"/>
+          </a:xfrm>
+          <a:prstGeom prst="line">
+            <a:avLst/>
+          </a:prstGeom>
+          <a:ln w="19050">
+            <a:solidFill>
+              <a:schemeClr val="tx1"/>
+            </a:solidFill>
+          </a:ln>
+        </p:spPr>
+        <p:style>
+          <a:lnRef idx="1">
+            <a:schemeClr val="accent1"/>
+          </a:lnRef>
+          <a:fillRef idx="0">
+            <a:schemeClr val="accent1"/>
+          </a:fillRef>
+          <a:effectRef idx="0">
+            <a:schemeClr val="accent1"/>
+          </a:effectRef>
+          <a:fontRef idx="minor">
+            <a:schemeClr val="tx1"/>
+          </a:fontRef>
+        </p:style>
+      </p:cxnSp>
+    </p:spTree>
+    <p:extLst>
+      <p:ext uri="{BB962C8B-B14F-4D97-AF65-F5344CB8AC3E}">
+        <p14:creationId xmlns:p14="http://schemas.microsoft.com/office/powerpoint/2010/main" val="2780353573"/>
       </p:ext>
     </p:extLst>
   </p:cSld>

</xml_diff>